<commit_message>
updated with interactive student work
</commit_message>
<xml_diff>
--- a/Slides/On-Campus/11_01_FunctionsPart3.pptx
+++ b/Slides/On-Campus/11_01_FunctionsPart3.pptx
@@ -5,10 +5,10 @@
     <p:sldMasterId id="2147483648" r:id="rId1"/>
   </p:sldMasterIdLst>
   <p:notesMasterIdLst>
-    <p:notesMasterId r:id="rId15"/>
+    <p:notesMasterId r:id="rId16"/>
   </p:notesMasterIdLst>
   <p:handoutMasterIdLst>
-    <p:handoutMasterId r:id="rId16"/>
+    <p:handoutMasterId r:id="rId17"/>
   </p:handoutMasterIdLst>
   <p:sldIdLst>
     <p:sldId id="262" r:id="rId2"/>
@@ -21,9 +21,10 @@
     <p:sldId id="256" r:id="rId9"/>
     <p:sldId id="257" r:id="rId10"/>
     <p:sldId id="258" r:id="rId11"/>
-    <p:sldId id="259" r:id="rId12"/>
-    <p:sldId id="260" r:id="rId13"/>
-    <p:sldId id="261" r:id="rId14"/>
+    <p:sldId id="260" r:id="rId12"/>
+    <p:sldId id="259" r:id="rId13"/>
+    <p:sldId id="269" r:id="rId14"/>
+    <p:sldId id="261" r:id="rId15"/>
   </p:sldIdLst>
   <p:sldSz cx="13817600" cy="7772400"/>
   <p:notesSz cx="6858000" cy="9144000"/>
@@ -226,7 +227,7 @@
           <a:p>
             <a:fld id="{4D7E51A5-B478-1E40-8CBB-0DAA8831E99D}" type="datetimeFigureOut">
               <a:rPr lang="en-US" smtClean="0"/>
-              <a:t>10/16/2021</a:t>
+              <a:t>11/2/2021</a:t>
             </a:fld>
             <a:endParaRPr lang="en-US"/>
           </a:p>
@@ -391,7 +392,7 @@
           <a:p>
             <a:fld id="{D0ED587F-861E-6740-9643-E3DDAE89B8D6}" type="datetimeFigureOut">
               <a:rPr lang="en-US" smtClean="0"/>
-              <a:t>10/16/2021</a:t>
+              <a:t>11/1/2021</a:t>
             </a:fld>
             <a:endParaRPr lang="en-US"/>
           </a:p>
@@ -9655,6 +9656,118 @@
           </a:p>
         </p:txBody>
       </p:sp>
+      <p:cxnSp>
+        <p:nvCxnSpPr>
+          <p:cNvPr id="4" name="Straight Connector 3">
+            <a:extLst>
+              <a:ext uri="{FF2B5EF4-FFF2-40B4-BE49-F238E27FC236}">
+                <a16:creationId xmlns:a16="http://schemas.microsoft.com/office/drawing/2014/main" id="{3B1BAA51-D29C-4812-9FDE-DFC3107096F0}"/>
+              </a:ext>
+            </a:extLst>
+          </p:cNvPr>
+          <p:cNvCxnSpPr/>
+          <p:nvPr/>
+        </p:nvCxnSpPr>
+        <p:spPr>
+          <a:xfrm>
+            <a:off x="4717144" y="2409370"/>
+            <a:ext cx="1059543" cy="0"/>
+          </a:xfrm>
+          <a:prstGeom prst="line">
+            <a:avLst/>
+          </a:prstGeom>
+        </p:spPr>
+        <p:style>
+          <a:lnRef idx="3">
+            <a:schemeClr val="accent5"/>
+          </a:lnRef>
+          <a:fillRef idx="0">
+            <a:schemeClr val="accent5"/>
+          </a:fillRef>
+          <a:effectRef idx="2">
+            <a:schemeClr val="accent5"/>
+          </a:effectRef>
+          <a:fontRef idx="minor">
+            <a:schemeClr val="tx1"/>
+          </a:fontRef>
+        </p:style>
+      </p:cxnSp>
+      <p:cxnSp>
+        <p:nvCxnSpPr>
+          <p:cNvPr id="9" name="Straight Connector 8">
+            <a:extLst>
+              <a:ext uri="{FF2B5EF4-FFF2-40B4-BE49-F238E27FC236}">
+                <a16:creationId xmlns:a16="http://schemas.microsoft.com/office/drawing/2014/main" id="{C63068BC-A3BE-417D-80E9-592314CD13AF}"/>
+              </a:ext>
+            </a:extLst>
+          </p:cNvPr>
+          <p:cNvCxnSpPr>
+            <a:cxnSpLocks/>
+          </p:cNvCxnSpPr>
+          <p:nvPr/>
+        </p:nvCxnSpPr>
+        <p:spPr>
+          <a:xfrm>
+            <a:off x="6204858" y="2409370"/>
+            <a:ext cx="1531256" cy="0"/>
+          </a:xfrm>
+          <a:prstGeom prst="line">
+            <a:avLst/>
+          </a:prstGeom>
+        </p:spPr>
+        <p:style>
+          <a:lnRef idx="3">
+            <a:schemeClr val="accent5"/>
+          </a:lnRef>
+          <a:fillRef idx="0">
+            <a:schemeClr val="accent5"/>
+          </a:fillRef>
+          <a:effectRef idx="2">
+            <a:schemeClr val="accent5"/>
+          </a:effectRef>
+          <a:fontRef idx="minor">
+            <a:schemeClr val="tx1"/>
+          </a:fontRef>
+        </p:style>
+      </p:cxnSp>
+      <p:cxnSp>
+        <p:nvCxnSpPr>
+          <p:cNvPr id="10" name="Straight Connector 9">
+            <a:extLst>
+              <a:ext uri="{FF2B5EF4-FFF2-40B4-BE49-F238E27FC236}">
+                <a16:creationId xmlns:a16="http://schemas.microsoft.com/office/drawing/2014/main" id="{06C36B33-D887-429B-9E87-4F2AFB8E3AC1}"/>
+              </a:ext>
+            </a:extLst>
+          </p:cNvPr>
+          <p:cNvCxnSpPr>
+            <a:cxnSpLocks/>
+          </p:cNvCxnSpPr>
+          <p:nvPr/>
+        </p:nvCxnSpPr>
+        <p:spPr>
+          <a:xfrm>
+            <a:off x="1814286" y="3628570"/>
+            <a:ext cx="7010400" cy="0"/>
+          </a:xfrm>
+          <a:prstGeom prst="line">
+            <a:avLst/>
+          </a:prstGeom>
+        </p:spPr>
+        <p:style>
+          <a:lnRef idx="3">
+            <a:schemeClr val="accent5"/>
+          </a:lnRef>
+          <a:fillRef idx="0">
+            <a:schemeClr val="accent5"/>
+          </a:fillRef>
+          <a:effectRef idx="2">
+            <a:schemeClr val="accent5"/>
+          </a:effectRef>
+          <a:fontRef idx="minor">
+            <a:schemeClr val="tx1"/>
+          </a:fontRef>
+        </p:style>
+      </p:cxnSp>
     </p:spTree>
     <p:extLst>
       <p:ext uri="{BB962C8B-B14F-4D97-AF65-F5344CB8AC3E}">
@@ -9677,6 +9790,195 @@
       </p:transition>
     </mc:Fallback>
   </mc:AlternateContent>
+  <p:timing>
+    <p:tnLst>
+      <p:par>
+        <p:cTn id="1" dur="indefinite" restart="never" nodeType="tmRoot">
+          <p:childTnLst>
+            <p:seq concurrent="1" nextAc="seek">
+              <p:cTn id="2" dur="indefinite" nodeType="mainSeq">
+                <p:childTnLst>
+                  <p:par>
+                    <p:cTn id="3" fill="hold">
+                      <p:stCondLst>
+                        <p:cond delay="indefinite"/>
+                      </p:stCondLst>
+                      <p:childTnLst>
+                        <p:par>
+                          <p:cTn id="4" fill="hold">
+                            <p:stCondLst>
+                              <p:cond delay="0"/>
+                            </p:stCondLst>
+                            <p:childTnLst>
+                              <p:par>
+                                <p:cTn id="5" presetID="10" presetClass="entr" presetSubtype="0" fill="hold" nodeType="clickEffect">
+                                  <p:stCondLst>
+                                    <p:cond delay="0"/>
+                                  </p:stCondLst>
+                                  <p:childTnLst>
+                                    <p:set>
+                                      <p:cBhvr>
+                                        <p:cTn id="6" dur="1" fill="hold">
+                                          <p:stCondLst>
+                                            <p:cond delay="0"/>
+                                          </p:stCondLst>
+                                        </p:cTn>
+                                        <p:tgtEl>
+                                          <p:spTgt spid="4"/>
+                                        </p:tgtEl>
+                                        <p:attrNameLst>
+                                          <p:attrName>style.visibility</p:attrName>
+                                        </p:attrNameLst>
+                                      </p:cBhvr>
+                                      <p:to>
+                                        <p:strVal val="visible"/>
+                                      </p:to>
+                                    </p:set>
+                                    <p:animEffect transition="in" filter="fade">
+                                      <p:cBhvr>
+                                        <p:cTn id="7" dur="500"/>
+                                        <p:tgtEl>
+                                          <p:spTgt spid="4"/>
+                                        </p:tgtEl>
+                                      </p:cBhvr>
+                                    </p:animEffect>
+                                  </p:childTnLst>
+                                </p:cTn>
+                              </p:par>
+                            </p:childTnLst>
+                          </p:cTn>
+                        </p:par>
+                      </p:childTnLst>
+                    </p:cTn>
+                  </p:par>
+                  <p:par>
+                    <p:cTn id="8" fill="hold">
+                      <p:stCondLst>
+                        <p:cond delay="indefinite"/>
+                      </p:stCondLst>
+                      <p:childTnLst>
+                        <p:par>
+                          <p:cTn id="9" fill="hold">
+                            <p:stCondLst>
+                              <p:cond delay="0"/>
+                            </p:stCondLst>
+                            <p:childTnLst>
+                              <p:par>
+                                <p:cTn id="10" presetID="10" presetClass="entr" presetSubtype="0" fill="hold" nodeType="clickEffect">
+                                  <p:stCondLst>
+                                    <p:cond delay="0"/>
+                                  </p:stCondLst>
+                                  <p:childTnLst>
+                                    <p:set>
+                                      <p:cBhvr>
+                                        <p:cTn id="11" dur="1" fill="hold">
+                                          <p:stCondLst>
+                                            <p:cond delay="0"/>
+                                          </p:stCondLst>
+                                        </p:cTn>
+                                        <p:tgtEl>
+                                          <p:spTgt spid="9"/>
+                                        </p:tgtEl>
+                                        <p:attrNameLst>
+                                          <p:attrName>style.visibility</p:attrName>
+                                        </p:attrNameLst>
+                                      </p:cBhvr>
+                                      <p:to>
+                                        <p:strVal val="visible"/>
+                                      </p:to>
+                                    </p:set>
+                                    <p:animEffect transition="in" filter="fade">
+                                      <p:cBhvr>
+                                        <p:cTn id="12" dur="500"/>
+                                        <p:tgtEl>
+                                          <p:spTgt spid="9"/>
+                                        </p:tgtEl>
+                                      </p:cBhvr>
+                                    </p:animEffect>
+                                  </p:childTnLst>
+                                </p:cTn>
+                              </p:par>
+                            </p:childTnLst>
+                          </p:cTn>
+                        </p:par>
+                      </p:childTnLst>
+                    </p:cTn>
+                  </p:par>
+                  <p:par>
+                    <p:cTn id="13" fill="hold">
+                      <p:stCondLst>
+                        <p:cond delay="indefinite"/>
+                      </p:stCondLst>
+                      <p:childTnLst>
+                        <p:par>
+                          <p:cTn id="14" fill="hold">
+                            <p:stCondLst>
+                              <p:cond delay="0"/>
+                            </p:stCondLst>
+                            <p:childTnLst>
+                              <p:par>
+                                <p:cTn id="15" presetID="10" presetClass="entr" presetSubtype="0" fill="hold" nodeType="clickEffect">
+                                  <p:stCondLst>
+                                    <p:cond delay="0"/>
+                                  </p:stCondLst>
+                                  <p:childTnLst>
+                                    <p:set>
+                                      <p:cBhvr>
+                                        <p:cTn id="16" dur="1" fill="hold">
+                                          <p:stCondLst>
+                                            <p:cond delay="0"/>
+                                          </p:stCondLst>
+                                        </p:cTn>
+                                        <p:tgtEl>
+                                          <p:spTgt spid="10"/>
+                                        </p:tgtEl>
+                                        <p:attrNameLst>
+                                          <p:attrName>style.visibility</p:attrName>
+                                        </p:attrNameLst>
+                                      </p:cBhvr>
+                                      <p:to>
+                                        <p:strVal val="visible"/>
+                                      </p:to>
+                                    </p:set>
+                                    <p:animEffect transition="in" filter="fade">
+                                      <p:cBhvr>
+                                        <p:cTn id="17" dur="500"/>
+                                        <p:tgtEl>
+                                          <p:spTgt spid="10"/>
+                                        </p:tgtEl>
+                                      </p:cBhvr>
+                                    </p:animEffect>
+                                  </p:childTnLst>
+                                </p:cTn>
+                              </p:par>
+                            </p:childTnLst>
+                          </p:cTn>
+                        </p:par>
+                      </p:childTnLst>
+                    </p:cTn>
+                  </p:par>
+                </p:childTnLst>
+              </p:cTn>
+              <p:prevCondLst>
+                <p:cond evt="onPrev" delay="0">
+                  <p:tgtEl>
+                    <p:sldTgt/>
+                  </p:tgtEl>
+                </p:cond>
+              </p:prevCondLst>
+              <p:nextCondLst>
+                <p:cond evt="onNext" delay="0">
+                  <p:tgtEl>
+                    <p:sldTgt/>
+                  </p:tgtEl>
+                </p:cond>
+              </p:nextCondLst>
+            </p:seq>
+          </p:childTnLst>
+        </p:cTn>
+      </p:par>
+    </p:tnLst>
+  </p:timing>
 </p:sld>
 </file>
 
@@ -9702,7 +10004,7 @@
           <p:cNvPr id="2" name="Title 1">
             <a:extLst>
               <a:ext uri="{FF2B5EF4-FFF2-40B4-BE49-F238E27FC236}">
-                <a16:creationId xmlns:a16="http://schemas.microsoft.com/office/drawing/2014/main" id="{51BC3C42-0BCD-474D-A9CE-E0012F92D69A}"/>
+                <a16:creationId xmlns:a16="http://schemas.microsoft.com/office/drawing/2014/main" id="{218EFCC6-0CB3-444F-9315-CC1A11920122}"/>
               </a:ext>
             </a:extLst>
           </p:cNvPr>
@@ -9720,72 +10022,17 @@
           <a:p>
             <a:r>
               <a:rPr lang="en-US" dirty="0"/>
-              <a:t>Functions List</a:t>
+              <a:t>Functions as Parameters! </a:t>
             </a:r>
           </a:p>
         </p:txBody>
       </p:sp>
       <p:sp>
         <p:nvSpPr>
-          <p:cNvPr id="3" name="Text Placeholder 2">
+          <p:cNvPr id="7" name="TextBox 6">
             <a:extLst>
               <a:ext uri="{FF2B5EF4-FFF2-40B4-BE49-F238E27FC236}">
-                <a16:creationId xmlns:a16="http://schemas.microsoft.com/office/drawing/2014/main" id="{742F3268-ED83-5E43-BC58-7EC31A5C9397}"/>
-              </a:ext>
-            </a:extLst>
-          </p:cNvPr>
-          <p:cNvSpPr>
-            <a:spLocks noGrp="1"/>
-          </p:cNvSpPr>
-          <p:nvPr>
-            <p:ph type="body" sz="quarter" idx="10"/>
-          </p:nvPr>
-        </p:nvSpPr>
-        <p:spPr>
-          <a:xfrm>
-            <a:off x="628075" y="1776683"/>
-            <a:ext cx="5645725" cy="1230145"/>
-          </a:xfrm>
-        </p:spPr>
-        <p:txBody>
-          <a:bodyPr/>
-          <a:lstStyle/>
-          <a:p>
-            <a:r>
-              <a:rPr lang="en-US" dirty="0"/>
-              <a:t>*</a:t>
-            </a:r>
-            <a:r>
-              <a:rPr lang="en-US" dirty="0" err="1"/>
-              <a:t>args</a:t>
-            </a:r>
-            <a:r>
-              <a:rPr lang="en-US" dirty="0"/>
-              <a:t> says – all values store in this list!</a:t>
-            </a:r>
-          </a:p>
-          <a:p>
-            <a:pPr lvl="1"/>
-            <a:r>
-              <a:rPr lang="en-US" dirty="0"/>
-              <a:t>You can then use it as a list directly</a:t>
-            </a:r>
-          </a:p>
-          <a:p>
-            <a:pPr lvl="1"/>
-            <a:r>
-              <a:rPr lang="en-US" dirty="0"/>
-              <a:t>We do that with Print!</a:t>
-            </a:r>
-          </a:p>
-        </p:txBody>
-      </p:sp>
-      <p:sp>
-        <p:nvSpPr>
-          <p:cNvPr id="5" name="TextBox 4">
-            <a:extLst>
-              <a:ext uri="{FF2B5EF4-FFF2-40B4-BE49-F238E27FC236}">
-                <a16:creationId xmlns:a16="http://schemas.microsoft.com/office/drawing/2014/main" id="{47A8ABBF-0B34-CE4B-97DC-DA0F5C84AF9E}"/>
+                <a16:creationId xmlns:a16="http://schemas.microsoft.com/office/drawing/2014/main" id="{380B0752-897E-3649-A71A-6914E229E4CE}"/>
               </a:ext>
             </a:extLst>
           </p:cNvPr>
@@ -9794,8 +10041,8 @@
         </p:nvSpPr>
         <p:spPr>
           <a:xfrm>
-            <a:off x="723900" y="3332828"/>
-            <a:ext cx="12865100" cy="2031325"/>
+            <a:off x="1409699" y="1708020"/>
+            <a:ext cx="10462987" cy="4708981"/>
           </a:xfrm>
           <a:prstGeom prst="rect">
             <a:avLst/>
@@ -9809,7 +10056,7 @@
           <a:lstStyle/>
           <a:p>
             <a:r>
-              <a:rPr lang="en-US" sz="1800" dirty="0">
+              <a:rPr lang="en-US" dirty="0">
                 <a:solidFill>
                   <a:srgbClr val="CC7832"/>
                 </a:solidFill>
@@ -9820,7 +10067,7 @@
               <a:t>def </a:t>
             </a:r>
             <a:r>
-              <a:rPr lang="en-US" sz="1800" dirty="0" err="1">
+              <a:rPr lang="en-US" dirty="0" err="1">
                 <a:solidFill>
                   <a:srgbClr val="FFC66D"/>
                 </a:solidFill>
@@ -9828,44 +10075,116 @@
                 <a:latin typeface="Consolas" panose="020B0609020204030204" pitchFamily="49" charset="0"/>
                 <a:cs typeface="Consolas" panose="020B0609020204030204" pitchFamily="49" charset="0"/>
               </a:rPr>
-              <a:t>print_hello</a:t>
-            </a:r>
-            <a:r>
-              <a:rPr lang="en-US" sz="1800" dirty="0">
-                <a:latin typeface="Consolas" panose="020B0609020204030204" pitchFamily="49" charset="0"/>
-                <a:cs typeface="Consolas" panose="020B0609020204030204" pitchFamily="49" charset="0"/>
-              </a:rPr>
-              <a:t>(*</a:t>
-            </a:r>
-            <a:r>
-              <a:rPr lang="en-US" sz="1800" dirty="0" err="1">
-                <a:latin typeface="Consolas" panose="020B0609020204030204" pitchFamily="49" charset="0"/>
-                <a:cs typeface="Consolas" panose="020B0609020204030204" pitchFamily="49" charset="0"/>
-              </a:rPr>
-              <a:t>args</a:t>
-            </a:r>
-            <a:r>
-              <a:rPr lang="en-US" sz="1800" dirty="0">
+              <a:t>sort_list</a:t>
+            </a:r>
+            <a:r>
+              <a:rPr lang="en-US" dirty="0">
+                <a:latin typeface="Consolas" panose="020B0609020204030204" pitchFamily="49" charset="0"/>
+                <a:cs typeface="Consolas" panose="020B0609020204030204" pitchFamily="49" charset="0"/>
+              </a:rPr>
+              <a:t>(unsorted</a:t>
+            </a:r>
+            <a:r>
+              <a:rPr lang="en-US" dirty="0">
+                <a:solidFill>
+                  <a:srgbClr val="CC7832"/>
+                </a:solidFill>
+                <a:effectLst/>
+                <a:latin typeface="Consolas" panose="020B0609020204030204" pitchFamily="49" charset="0"/>
+                <a:cs typeface="Consolas" panose="020B0609020204030204" pitchFamily="49" charset="0"/>
+              </a:rPr>
+              <a:t>, </a:t>
+            </a:r>
+            <a:r>
+              <a:rPr lang="en-US" dirty="0">
+                <a:latin typeface="Consolas" panose="020B0609020204030204" pitchFamily="49" charset="0"/>
+                <a:cs typeface="Consolas" panose="020B0609020204030204" pitchFamily="49" charset="0"/>
+              </a:rPr>
+              <a:t>result=</a:t>
+            </a:r>
+            <a:r>
+              <a:rPr lang="en-US" dirty="0">
+                <a:solidFill>
+                  <a:srgbClr val="CC7832"/>
+                </a:solidFill>
+                <a:effectLst/>
+                <a:latin typeface="Consolas" panose="020B0609020204030204" pitchFamily="49" charset="0"/>
+                <a:cs typeface="Consolas" panose="020B0609020204030204" pitchFamily="49" charset="0"/>
+              </a:rPr>
+              <a:t>None, </a:t>
+            </a:r>
+            <a:r>
+              <a:rPr lang="en-US" dirty="0">
+                <a:latin typeface="Consolas" panose="020B0609020204030204" pitchFamily="49" charset="0"/>
+                <a:cs typeface="Consolas" panose="020B0609020204030204" pitchFamily="49" charset="0"/>
+              </a:rPr>
+              <a:t>sorter=</a:t>
+            </a:r>
+            <a:r>
+              <a:rPr lang="en-US" dirty="0">
+                <a:solidFill>
+                  <a:srgbClr val="8888C6"/>
+                </a:solidFill>
+                <a:effectLst/>
+                <a:latin typeface="Consolas" panose="020B0609020204030204" pitchFamily="49" charset="0"/>
+                <a:cs typeface="Consolas" panose="020B0609020204030204" pitchFamily="49" charset="0"/>
+              </a:rPr>
+              <a:t>max</a:t>
+            </a:r>
+            <a:r>
+              <a:rPr lang="en-US" dirty="0">
                 <a:latin typeface="Consolas" panose="020B0609020204030204" pitchFamily="49" charset="0"/>
                 <a:cs typeface="Consolas" panose="020B0609020204030204" pitchFamily="49" charset="0"/>
               </a:rPr>
               <a:t>):</a:t>
             </a:r>
             <a:br>
-              <a:rPr lang="en-US" sz="1800" dirty="0">
+              <a:rPr lang="en-US" dirty="0">
                 <a:latin typeface="Consolas" panose="020B0609020204030204" pitchFamily="49" charset="0"/>
                 <a:cs typeface="Consolas" panose="020B0609020204030204" pitchFamily="49" charset="0"/>
               </a:rPr>
             </a:br>
             <a:r>
-              <a:rPr lang="en-US" sz="1800" dirty="0">
+              <a:rPr lang="en-US" dirty="0">
                 <a:latin typeface="Consolas" panose="020B0609020204030204" pitchFamily="49" charset="0"/>
                 <a:cs typeface="Consolas" panose="020B0609020204030204" pitchFamily="49" charset="0"/>
               </a:rPr>
               <a:t>    </a:t>
             </a:r>
             <a:r>
-              <a:rPr lang="en-US" sz="1800" dirty="0">
+              <a:rPr lang="en-US" dirty="0">
+                <a:solidFill>
+                  <a:srgbClr val="808080"/>
+                </a:solidFill>
+                <a:effectLst/>
+                <a:latin typeface="Consolas" panose="020B0609020204030204" pitchFamily="49" charset="0"/>
+                <a:cs typeface="Consolas" panose="020B0609020204030204" pitchFamily="49" charset="0"/>
+              </a:rPr>
+              <a:t># base case - simplest case</a:t>
+            </a:r>
+            <a:br>
+              <a:rPr lang="en-US" dirty="0">
+                <a:solidFill>
+                  <a:srgbClr val="808080"/>
+                </a:solidFill>
+                <a:effectLst/>
+                <a:latin typeface="Consolas" panose="020B0609020204030204" pitchFamily="49" charset="0"/>
+                <a:cs typeface="Consolas" panose="020B0609020204030204" pitchFamily="49" charset="0"/>
+              </a:rPr>
+            </a:br>
+            <a:r>
+              <a:rPr lang="en-US" dirty="0">
+                <a:solidFill>
+                  <a:srgbClr val="808080"/>
+                </a:solidFill>
+                <a:effectLst/>
+                <a:latin typeface="Consolas" panose="020B0609020204030204" pitchFamily="49" charset="0"/>
+                <a:cs typeface="Consolas" panose="020B0609020204030204" pitchFamily="49" charset="0"/>
+              </a:rPr>
+              <a:t>    </a:t>
+            </a:r>
+            <a:r>
+              <a:rPr lang="en-US" dirty="0">
                 <a:solidFill>
                   <a:srgbClr val="CC7832"/>
                 </a:solidFill>
@@ -9873,24 +10192,17 @@
                 <a:latin typeface="Consolas" panose="020B0609020204030204" pitchFamily="49" charset="0"/>
                 <a:cs typeface="Consolas" panose="020B0609020204030204" pitchFamily="49" charset="0"/>
               </a:rPr>
-              <a:t>for </a:t>
-            </a:r>
-            <a:r>
-              <a:rPr lang="en-US" sz="1800" dirty="0" err="1">
-                <a:latin typeface="Consolas" panose="020B0609020204030204" pitchFamily="49" charset="0"/>
-                <a:cs typeface="Consolas" panose="020B0609020204030204" pitchFamily="49" charset="0"/>
-              </a:rPr>
-              <a:t>arg</a:t>
-            </a:r>
-            <a:r>
-              <a:rPr lang="en-US" sz="1800" dirty="0">
-                <a:latin typeface="Consolas" panose="020B0609020204030204" pitchFamily="49" charset="0"/>
-                <a:cs typeface="Consolas" panose="020B0609020204030204" pitchFamily="49" charset="0"/>
-              </a:rPr>
-              <a:t> </a:t>
-            </a:r>
-            <a:r>
-              <a:rPr lang="en-US" sz="1800" dirty="0">
+              <a:t>if </a:t>
+            </a:r>
+            <a:r>
+              <a:rPr lang="en-US" dirty="0">
+                <a:latin typeface="Consolas" panose="020B0609020204030204" pitchFamily="49" charset="0"/>
+                <a:cs typeface="Consolas" panose="020B0609020204030204" pitchFamily="49" charset="0"/>
+              </a:rPr>
+              <a:t>result </a:t>
+            </a:r>
+            <a:r>
+              <a:rPr lang="en-US" dirty="0">
                 <a:solidFill>
                   <a:srgbClr val="CC7832"/>
                 </a:solidFill>
@@ -9898,10 +10210,81 @@
                 <a:latin typeface="Consolas" panose="020B0609020204030204" pitchFamily="49" charset="0"/>
                 <a:cs typeface="Consolas" panose="020B0609020204030204" pitchFamily="49" charset="0"/>
               </a:rPr>
-              <a:t>in </a:t>
-            </a:r>
-            <a:r>
-              <a:rPr lang="en-US" sz="1800" dirty="0">
+              <a:t>is None</a:t>
+            </a:r>
+            <a:r>
+              <a:rPr lang="en-US" dirty="0">
+                <a:latin typeface="Consolas" panose="020B0609020204030204" pitchFamily="49" charset="0"/>
+                <a:cs typeface="Consolas" panose="020B0609020204030204" pitchFamily="49" charset="0"/>
+              </a:rPr>
+              <a:t>:</a:t>
+            </a:r>
+            <a:br>
+              <a:rPr lang="en-US" dirty="0">
+                <a:latin typeface="Consolas" panose="020B0609020204030204" pitchFamily="49" charset="0"/>
+                <a:cs typeface="Consolas" panose="020B0609020204030204" pitchFamily="49" charset="0"/>
+              </a:rPr>
+            </a:br>
+            <a:r>
+              <a:rPr lang="en-US" dirty="0">
+                <a:latin typeface="Consolas" panose="020B0609020204030204" pitchFamily="49" charset="0"/>
+                <a:cs typeface="Consolas" panose="020B0609020204030204" pitchFamily="49" charset="0"/>
+              </a:rPr>
+              <a:t>       result =  []</a:t>
+            </a:r>
+            <a:br>
+              <a:rPr lang="en-US" dirty="0">
+                <a:latin typeface="Consolas" panose="020B0609020204030204" pitchFamily="49" charset="0"/>
+                <a:cs typeface="Consolas" panose="020B0609020204030204" pitchFamily="49" charset="0"/>
+              </a:rPr>
+            </a:br>
+            <a:r>
+              <a:rPr lang="en-US" dirty="0">
+                <a:latin typeface="Consolas" panose="020B0609020204030204" pitchFamily="49" charset="0"/>
+                <a:cs typeface="Consolas" panose="020B0609020204030204" pitchFamily="49" charset="0"/>
+              </a:rPr>
+              <a:t>       unsorted = </a:t>
+            </a:r>
+            <a:r>
+              <a:rPr lang="en-US" dirty="0" err="1">
+                <a:latin typeface="Consolas" panose="020B0609020204030204" pitchFamily="49" charset="0"/>
+                <a:cs typeface="Consolas" panose="020B0609020204030204" pitchFamily="49" charset="0"/>
+              </a:rPr>
+              <a:t>unsorted.copy</a:t>
+            </a:r>
+            <a:r>
+              <a:rPr lang="en-US" dirty="0">
+                <a:latin typeface="Consolas" panose="020B0609020204030204" pitchFamily="49" charset="0"/>
+                <a:cs typeface="Consolas" panose="020B0609020204030204" pitchFamily="49" charset="0"/>
+              </a:rPr>
+              <a:t>()</a:t>
+            </a:r>
+            <a:br>
+              <a:rPr lang="en-US" dirty="0">
+                <a:latin typeface="Consolas" panose="020B0609020204030204" pitchFamily="49" charset="0"/>
+                <a:cs typeface="Consolas" panose="020B0609020204030204" pitchFamily="49" charset="0"/>
+              </a:rPr>
+            </a:br>
+            <a:r>
+              <a:rPr lang="en-US" dirty="0">
+                <a:latin typeface="Consolas" panose="020B0609020204030204" pitchFamily="49" charset="0"/>
+                <a:cs typeface="Consolas" panose="020B0609020204030204" pitchFamily="49" charset="0"/>
+              </a:rPr>
+              <a:t>    </a:t>
+            </a:r>
+            <a:r>
+              <a:rPr lang="en-US" dirty="0">
+                <a:solidFill>
+                  <a:srgbClr val="CC7832"/>
+                </a:solidFill>
+                <a:effectLst/>
+                <a:latin typeface="Consolas" panose="020B0609020204030204" pitchFamily="49" charset="0"/>
+                <a:cs typeface="Consolas" panose="020B0609020204030204" pitchFamily="49" charset="0"/>
+              </a:rPr>
+              <a:t>if </a:t>
+            </a:r>
+            <a:r>
+              <a:rPr lang="en-US" dirty="0" err="1">
                 <a:solidFill>
                   <a:srgbClr val="8888C6"/>
                 </a:solidFill>
@@ -9909,94 +10292,242 @@
                 <a:latin typeface="Consolas" panose="020B0609020204030204" pitchFamily="49" charset="0"/>
                 <a:cs typeface="Consolas" panose="020B0609020204030204" pitchFamily="49" charset="0"/>
               </a:rPr>
-              <a:t>sorted</a:t>
-            </a:r>
-            <a:r>
-              <a:rPr lang="en-US" sz="1800" dirty="0">
+              <a:t>len</a:t>
+            </a:r>
+            <a:r>
+              <a:rPr lang="en-US" dirty="0">
+                <a:latin typeface="Consolas" panose="020B0609020204030204" pitchFamily="49" charset="0"/>
+                <a:cs typeface="Consolas" panose="020B0609020204030204" pitchFamily="49" charset="0"/>
+              </a:rPr>
+              <a:t>(unsorted) &lt; </a:t>
+            </a:r>
+            <a:r>
+              <a:rPr lang="en-US" dirty="0">
+                <a:solidFill>
+                  <a:srgbClr val="6897BB"/>
+                </a:solidFill>
+                <a:effectLst/>
+                <a:latin typeface="Consolas" panose="020B0609020204030204" pitchFamily="49" charset="0"/>
+                <a:cs typeface="Consolas" panose="020B0609020204030204" pitchFamily="49" charset="0"/>
+              </a:rPr>
+              <a:t>1</a:t>
+            </a:r>
+            <a:r>
+              <a:rPr lang="en-US" dirty="0">
+                <a:latin typeface="Consolas" panose="020B0609020204030204" pitchFamily="49" charset="0"/>
+                <a:cs typeface="Consolas" panose="020B0609020204030204" pitchFamily="49" charset="0"/>
+              </a:rPr>
+              <a:t>:</a:t>
+            </a:r>
+            <a:br>
+              <a:rPr lang="en-US" dirty="0">
+                <a:latin typeface="Consolas" panose="020B0609020204030204" pitchFamily="49" charset="0"/>
+                <a:cs typeface="Consolas" panose="020B0609020204030204" pitchFamily="49" charset="0"/>
+              </a:rPr>
+            </a:br>
+            <a:r>
+              <a:rPr lang="en-US" dirty="0">
+                <a:latin typeface="Consolas" panose="020B0609020204030204" pitchFamily="49" charset="0"/>
+                <a:cs typeface="Consolas" panose="020B0609020204030204" pitchFamily="49" charset="0"/>
+              </a:rPr>
+              <a:t>        </a:t>
+            </a:r>
+            <a:r>
+              <a:rPr lang="en-US" dirty="0">
+                <a:solidFill>
+                  <a:srgbClr val="CC7832"/>
+                </a:solidFill>
+                <a:effectLst/>
+                <a:latin typeface="Consolas" panose="020B0609020204030204" pitchFamily="49" charset="0"/>
+                <a:cs typeface="Consolas" panose="020B0609020204030204" pitchFamily="49" charset="0"/>
+              </a:rPr>
+              <a:t>return </a:t>
+            </a:r>
+            <a:r>
+              <a:rPr lang="en-US" dirty="0">
+                <a:latin typeface="Consolas" panose="020B0609020204030204" pitchFamily="49" charset="0"/>
+                <a:cs typeface="Consolas" panose="020B0609020204030204" pitchFamily="49" charset="0"/>
+              </a:rPr>
+              <a:t>result</a:t>
+            </a:r>
+            <a:br>
+              <a:rPr lang="en-US" dirty="0">
+                <a:latin typeface="Consolas" panose="020B0609020204030204" pitchFamily="49" charset="0"/>
+                <a:cs typeface="Consolas" panose="020B0609020204030204" pitchFamily="49" charset="0"/>
+              </a:rPr>
+            </a:br>
+            <a:r>
+              <a:rPr lang="en-US" dirty="0">
+                <a:latin typeface="Consolas" panose="020B0609020204030204" pitchFamily="49" charset="0"/>
+                <a:cs typeface="Consolas" panose="020B0609020204030204" pitchFamily="49" charset="0"/>
+              </a:rPr>
+              <a:t>    </a:t>
+            </a:r>
+            <a:r>
+              <a:rPr lang="en-US" dirty="0" err="1">
+                <a:latin typeface="Consolas" panose="020B0609020204030204" pitchFamily="49" charset="0"/>
+                <a:cs typeface="Consolas" panose="020B0609020204030204" pitchFamily="49" charset="0"/>
+              </a:rPr>
+              <a:t>val</a:t>
+            </a:r>
+            <a:r>
+              <a:rPr lang="en-US" dirty="0">
+                <a:latin typeface="Consolas" panose="020B0609020204030204" pitchFamily="49" charset="0"/>
+                <a:cs typeface="Consolas" panose="020B0609020204030204" pitchFamily="49" charset="0"/>
+              </a:rPr>
+              <a:t> = sorter(unsorted)</a:t>
+            </a:r>
+            <a:br>
+              <a:rPr lang="en-US" dirty="0">
+                <a:latin typeface="Consolas" panose="020B0609020204030204" pitchFamily="49" charset="0"/>
+                <a:cs typeface="Consolas" panose="020B0609020204030204" pitchFamily="49" charset="0"/>
+              </a:rPr>
+            </a:br>
+            <a:r>
+              <a:rPr lang="en-US" dirty="0">
+                <a:latin typeface="Consolas" panose="020B0609020204030204" pitchFamily="49" charset="0"/>
+                <a:cs typeface="Consolas" panose="020B0609020204030204" pitchFamily="49" charset="0"/>
+              </a:rPr>
+              <a:t>    </a:t>
+            </a:r>
+            <a:r>
+              <a:rPr lang="en-US" dirty="0" err="1">
+                <a:latin typeface="Consolas" panose="020B0609020204030204" pitchFamily="49" charset="0"/>
+                <a:cs typeface="Consolas" panose="020B0609020204030204" pitchFamily="49" charset="0"/>
+              </a:rPr>
+              <a:t>result.append</a:t>
+            </a:r>
+            <a:r>
+              <a:rPr lang="en-US" dirty="0">
                 <a:latin typeface="Consolas" panose="020B0609020204030204" pitchFamily="49" charset="0"/>
                 <a:cs typeface="Consolas" panose="020B0609020204030204" pitchFamily="49" charset="0"/>
               </a:rPr>
               <a:t>(</a:t>
             </a:r>
             <a:r>
-              <a:rPr lang="en-US" sz="1800" dirty="0" err="1">
-                <a:latin typeface="Consolas" panose="020B0609020204030204" pitchFamily="49" charset="0"/>
-                <a:cs typeface="Consolas" panose="020B0609020204030204" pitchFamily="49" charset="0"/>
-              </a:rPr>
-              <a:t>args</a:t>
-            </a:r>
-            <a:r>
-              <a:rPr lang="en-US" sz="1800" dirty="0">
-                <a:latin typeface="Consolas" panose="020B0609020204030204" pitchFamily="49" charset="0"/>
-                <a:cs typeface="Consolas" panose="020B0609020204030204" pitchFamily="49" charset="0"/>
-              </a:rPr>
-              <a:t>):</a:t>
+              <a:rPr lang="en-US" dirty="0" err="1">
+                <a:latin typeface="Consolas" panose="020B0609020204030204" pitchFamily="49" charset="0"/>
+                <a:cs typeface="Consolas" panose="020B0609020204030204" pitchFamily="49" charset="0"/>
+              </a:rPr>
+              <a:t>val</a:t>
+            </a:r>
+            <a:r>
+              <a:rPr lang="en-US" dirty="0">
+                <a:latin typeface="Consolas" panose="020B0609020204030204" pitchFamily="49" charset="0"/>
+                <a:cs typeface="Consolas" panose="020B0609020204030204" pitchFamily="49" charset="0"/>
+              </a:rPr>
+              <a:t>)</a:t>
             </a:r>
             <a:br>
-              <a:rPr lang="en-US" sz="1800" dirty="0">
+              <a:rPr lang="en-US" dirty="0">
                 <a:latin typeface="Consolas" panose="020B0609020204030204" pitchFamily="49" charset="0"/>
                 <a:cs typeface="Consolas" panose="020B0609020204030204" pitchFamily="49" charset="0"/>
               </a:rPr>
             </a:br>
             <a:r>
-              <a:rPr lang="en-US" sz="1800" dirty="0">
-                <a:latin typeface="Consolas" panose="020B0609020204030204" pitchFamily="49" charset="0"/>
-                <a:cs typeface="Consolas" panose="020B0609020204030204" pitchFamily="49" charset="0"/>
-              </a:rPr>
-              <a:t>        </a:t>
-            </a:r>
-            <a:r>
-              <a:rPr lang="en-US" sz="1800" dirty="0">
-                <a:solidFill>
-                  <a:srgbClr val="8888C6"/>
+              <a:rPr lang="en-US" dirty="0">
+                <a:latin typeface="Consolas" panose="020B0609020204030204" pitchFamily="49" charset="0"/>
+                <a:cs typeface="Consolas" panose="020B0609020204030204" pitchFamily="49" charset="0"/>
+              </a:rPr>
+              <a:t>    </a:t>
+            </a:r>
+            <a:r>
+              <a:rPr lang="en-US" dirty="0" err="1">
+                <a:latin typeface="Consolas" panose="020B0609020204030204" pitchFamily="49" charset="0"/>
+                <a:cs typeface="Consolas" panose="020B0609020204030204" pitchFamily="49" charset="0"/>
+              </a:rPr>
+              <a:t>unsorted.remove</a:t>
+            </a:r>
+            <a:r>
+              <a:rPr lang="en-US" dirty="0">
+                <a:latin typeface="Consolas" panose="020B0609020204030204" pitchFamily="49" charset="0"/>
+                <a:cs typeface="Consolas" panose="020B0609020204030204" pitchFamily="49" charset="0"/>
+              </a:rPr>
+              <a:t>(</a:t>
+            </a:r>
+            <a:r>
+              <a:rPr lang="en-US" dirty="0" err="1">
+                <a:latin typeface="Consolas" panose="020B0609020204030204" pitchFamily="49" charset="0"/>
+                <a:cs typeface="Consolas" panose="020B0609020204030204" pitchFamily="49" charset="0"/>
+              </a:rPr>
+              <a:t>val</a:t>
+            </a:r>
+            <a:r>
+              <a:rPr lang="en-US" dirty="0">
+                <a:latin typeface="Consolas" panose="020B0609020204030204" pitchFamily="49" charset="0"/>
+                <a:cs typeface="Consolas" panose="020B0609020204030204" pitchFamily="49" charset="0"/>
+              </a:rPr>
+              <a:t>)</a:t>
+            </a:r>
+            <a:br>
+              <a:rPr lang="en-US" dirty="0">
+                <a:latin typeface="Consolas" panose="020B0609020204030204" pitchFamily="49" charset="0"/>
+                <a:cs typeface="Consolas" panose="020B0609020204030204" pitchFamily="49" charset="0"/>
+              </a:rPr>
+            </a:br>
+            <a:r>
+              <a:rPr lang="en-US" dirty="0">
+                <a:latin typeface="Consolas" panose="020B0609020204030204" pitchFamily="49" charset="0"/>
+                <a:cs typeface="Consolas" panose="020B0609020204030204" pitchFamily="49" charset="0"/>
+              </a:rPr>
+              <a:t>    </a:t>
+            </a:r>
+            <a:r>
+              <a:rPr lang="en-US" dirty="0">
+                <a:solidFill>
+                  <a:srgbClr val="CC7832"/>
                 </a:solidFill>
                 <a:effectLst/>
                 <a:latin typeface="Consolas" panose="020B0609020204030204" pitchFamily="49" charset="0"/>
                 <a:cs typeface="Consolas" panose="020B0609020204030204" pitchFamily="49" charset="0"/>
               </a:rPr>
-              <a:t>print</a:t>
-            </a:r>
-            <a:r>
-              <a:rPr lang="en-US" sz="1800" dirty="0">
-                <a:latin typeface="Consolas" panose="020B0609020204030204" pitchFamily="49" charset="0"/>
-                <a:cs typeface="Consolas" panose="020B0609020204030204" pitchFamily="49" charset="0"/>
-              </a:rPr>
-              <a:t>(</a:t>
-            </a:r>
-            <a:r>
-              <a:rPr lang="en-US" sz="1800" dirty="0">
-                <a:solidFill>
-                  <a:srgbClr val="6A8759"/>
+              <a:t>return </a:t>
+            </a:r>
+            <a:r>
+              <a:rPr lang="en-US" dirty="0" err="1">
+                <a:latin typeface="Consolas" panose="020B0609020204030204" pitchFamily="49" charset="0"/>
+                <a:cs typeface="Consolas" panose="020B0609020204030204" pitchFamily="49" charset="0"/>
+              </a:rPr>
+              <a:t>sort_list</a:t>
+            </a:r>
+            <a:r>
+              <a:rPr lang="en-US" dirty="0">
+                <a:latin typeface="Consolas" panose="020B0609020204030204" pitchFamily="49" charset="0"/>
+                <a:cs typeface="Consolas" panose="020B0609020204030204" pitchFamily="49" charset="0"/>
+              </a:rPr>
+              <a:t>(unsorted</a:t>
+            </a:r>
+            <a:r>
+              <a:rPr lang="en-US" dirty="0">
+                <a:solidFill>
+                  <a:srgbClr val="CC7832"/>
                 </a:solidFill>
                 <a:effectLst/>
                 <a:latin typeface="Consolas" panose="020B0609020204030204" pitchFamily="49" charset="0"/>
                 <a:cs typeface="Consolas" panose="020B0609020204030204" pitchFamily="49" charset="0"/>
               </a:rPr>
-              <a:t>"Hello {}"</a:t>
-            </a:r>
-            <a:r>
-              <a:rPr lang="en-US" sz="1800" dirty="0">
-                <a:latin typeface="Consolas" panose="020B0609020204030204" pitchFamily="49" charset="0"/>
-                <a:cs typeface="Consolas" panose="020B0609020204030204" pitchFamily="49" charset="0"/>
-              </a:rPr>
-              <a:t>.format(</a:t>
-            </a:r>
-            <a:r>
-              <a:rPr lang="en-US" sz="1800" dirty="0" err="1">
-                <a:latin typeface="Consolas" panose="020B0609020204030204" pitchFamily="49" charset="0"/>
-                <a:cs typeface="Consolas" panose="020B0609020204030204" pitchFamily="49" charset="0"/>
-              </a:rPr>
-              <a:t>arg</a:t>
-            </a:r>
-            <a:r>
-              <a:rPr lang="en-US" sz="1800" dirty="0">
-                <a:latin typeface="Consolas" panose="020B0609020204030204" pitchFamily="49" charset="0"/>
-                <a:cs typeface="Consolas" panose="020B0609020204030204" pitchFamily="49" charset="0"/>
-              </a:rPr>
-              <a:t>)</a:t>
-            </a:r>
-            <a:r>
-              <a:rPr lang="en-US" sz="1800" dirty="0">
+              <a:t>, </a:t>
+            </a:r>
+            <a:r>
+              <a:rPr lang="en-US" dirty="0">
+                <a:solidFill>
+                  <a:srgbClr val="AA4926"/>
+                </a:solidFill>
+                <a:effectLst/>
+                <a:latin typeface="Consolas" panose="020B0609020204030204" pitchFamily="49" charset="0"/>
+                <a:cs typeface="Consolas" panose="020B0609020204030204" pitchFamily="49" charset="0"/>
+              </a:rPr>
+              <a:t>result</a:t>
+            </a:r>
+            <a:r>
+              <a:rPr lang="en-US" dirty="0">
+                <a:latin typeface="Consolas" panose="020B0609020204030204" pitchFamily="49" charset="0"/>
+                <a:cs typeface="Consolas" panose="020B0609020204030204" pitchFamily="49" charset="0"/>
+              </a:rPr>
+              <a:t>=result</a:t>
+            </a:r>
+            <a:r>
+              <a:rPr lang="en-US" dirty="0">
                 <a:solidFill>
                   <a:srgbClr val="CC7832"/>
                 </a:solidFill>
@@ -10007,7 +10538,7 @@
               <a:t>, </a:t>
             </a:r>
             <a:r>
-              <a:rPr lang="en-US" sz="1800" dirty="0">
+              <a:rPr lang="en-US" dirty="0">
                 <a:solidFill>
                   <a:srgbClr val="AA4926"/>
                 </a:solidFill>
@@ -10015,72 +10546,312 @@
                 <a:latin typeface="Consolas" panose="020B0609020204030204" pitchFamily="49" charset="0"/>
                 <a:cs typeface="Consolas" panose="020B0609020204030204" pitchFamily="49" charset="0"/>
               </a:rPr>
-              <a:t>end</a:t>
-            </a:r>
-            <a:r>
-              <a:rPr lang="en-US" sz="1800" dirty="0">
-                <a:latin typeface="Consolas" panose="020B0609020204030204" pitchFamily="49" charset="0"/>
-                <a:cs typeface="Consolas" panose="020B0609020204030204" pitchFamily="49" charset="0"/>
-              </a:rPr>
-              <a:t>=</a:t>
-            </a:r>
-            <a:r>
-              <a:rPr lang="en-US" sz="1800" dirty="0">
-                <a:solidFill>
-                  <a:srgbClr val="6A8759"/>
-                </a:solidFill>
-                <a:effectLst/>
-                <a:latin typeface="Consolas" panose="020B0609020204030204" pitchFamily="49" charset="0"/>
-                <a:cs typeface="Consolas" panose="020B0609020204030204" pitchFamily="49" charset="0"/>
-              </a:rPr>
-              <a:t>', '</a:t>
-            </a:r>
-            <a:r>
-              <a:rPr lang="en-US" sz="1800" dirty="0">
-                <a:latin typeface="Consolas" panose="020B0609020204030204" pitchFamily="49" charset="0"/>
-                <a:cs typeface="Consolas" panose="020B0609020204030204" pitchFamily="49" charset="0"/>
-              </a:rPr>
-              <a:t>)</a:t>
+              <a:t>sorter</a:t>
+            </a:r>
+            <a:r>
+              <a:rPr lang="en-US" dirty="0">
+                <a:latin typeface="Consolas" panose="020B0609020204030204" pitchFamily="49" charset="0"/>
+                <a:cs typeface="Consolas" panose="020B0609020204030204" pitchFamily="49" charset="0"/>
+              </a:rPr>
+              <a:t>=sorter)</a:t>
             </a:r>
             <a:br>
-              <a:rPr lang="en-US" sz="1800" dirty="0">
+              <a:rPr lang="en-US" dirty="0">
                 <a:latin typeface="Consolas" panose="020B0609020204030204" pitchFamily="49" charset="0"/>
                 <a:cs typeface="Consolas" panose="020B0609020204030204" pitchFamily="49" charset="0"/>
               </a:rPr>
             </a:br>
             <a:br>
-              <a:rPr lang="en-US" sz="1800" dirty="0">
+              <a:rPr lang="en-US" dirty="0">
                 <a:latin typeface="Consolas" panose="020B0609020204030204" pitchFamily="49" charset="0"/>
                 <a:cs typeface="Consolas" panose="020B0609020204030204" pitchFamily="49" charset="0"/>
               </a:rPr>
             </a:br>
             <a:r>
-              <a:rPr lang="en-US" sz="1800" dirty="0" err="1">
-                <a:latin typeface="Consolas" panose="020B0609020204030204" pitchFamily="49" charset="0"/>
-                <a:cs typeface="Consolas" panose="020B0609020204030204" pitchFamily="49" charset="0"/>
-              </a:rPr>
-              <a:t>print_hello</a:t>
-            </a:r>
-            <a:r>
-              <a:rPr lang="en-US" sz="1800" dirty="0">
+              <a:rPr lang="en-US" dirty="0" err="1">
+                <a:latin typeface="Consolas" panose="020B0609020204030204" pitchFamily="49" charset="0"/>
+                <a:cs typeface="Consolas" panose="020B0609020204030204" pitchFamily="49" charset="0"/>
+              </a:rPr>
+              <a:t>zelda_lst</a:t>
+            </a:r>
+            <a:r>
+              <a:rPr lang="en-US" dirty="0">
+                <a:latin typeface="Consolas" panose="020B0609020204030204" pitchFamily="49" charset="0"/>
+                <a:cs typeface="Consolas" panose="020B0609020204030204" pitchFamily="49" charset="0"/>
+              </a:rPr>
+              <a:t> =  [</a:t>
+            </a:r>
+            <a:r>
+              <a:rPr lang="en-US" dirty="0">
+                <a:solidFill>
+                  <a:srgbClr val="6A8759"/>
+                </a:solidFill>
+                <a:effectLst/>
+                <a:latin typeface="Consolas" panose="020B0609020204030204" pitchFamily="49" charset="0"/>
+                <a:cs typeface="Consolas" panose="020B0609020204030204" pitchFamily="49" charset="0"/>
+              </a:rPr>
+              <a:t>"Princess Zelda"</a:t>
+            </a:r>
+            <a:r>
+              <a:rPr lang="en-US" dirty="0">
+                <a:solidFill>
+                  <a:srgbClr val="CC7832"/>
+                </a:solidFill>
+                <a:effectLst/>
+                <a:latin typeface="Consolas" panose="020B0609020204030204" pitchFamily="49" charset="0"/>
+                <a:cs typeface="Consolas" panose="020B0609020204030204" pitchFamily="49" charset="0"/>
+              </a:rPr>
+              <a:t>, </a:t>
+            </a:r>
+            <a:r>
+              <a:rPr lang="en-US" dirty="0">
+                <a:solidFill>
+                  <a:srgbClr val="6A8759"/>
+                </a:solidFill>
+                <a:effectLst/>
+                <a:latin typeface="Consolas" panose="020B0609020204030204" pitchFamily="49" charset="0"/>
+                <a:cs typeface="Consolas" panose="020B0609020204030204" pitchFamily="49" charset="0"/>
+              </a:rPr>
+              <a:t>"</a:t>
+            </a:r>
+            <a:r>
+              <a:rPr lang="en-US" dirty="0" err="1">
+                <a:solidFill>
+                  <a:srgbClr val="6A8759"/>
+                </a:solidFill>
+                <a:effectLst/>
+                <a:latin typeface="Consolas" panose="020B0609020204030204" pitchFamily="49" charset="0"/>
+                <a:cs typeface="Consolas" panose="020B0609020204030204" pitchFamily="49" charset="0"/>
+              </a:rPr>
+              <a:t>Ganon</a:t>
+            </a:r>
+            <a:r>
+              <a:rPr lang="en-US" dirty="0">
+                <a:solidFill>
+                  <a:srgbClr val="6A8759"/>
+                </a:solidFill>
+                <a:effectLst/>
+                <a:latin typeface="Consolas" panose="020B0609020204030204" pitchFamily="49" charset="0"/>
+                <a:cs typeface="Consolas" panose="020B0609020204030204" pitchFamily="49" charset="0"/>
+              </a:rPr>
+              <a:t>"</a:t>
+            </a:r>
+            <a:r>
+              <a:rPr lang="en-US" dirty="0">
+                <a:solidFill>
+                  <a:srgbClr val="CC7832"/>
+                </a:solidFill>
+                <a:effectLst/>
+                <a:latin typeface="Consolas" panose="020B0609020204030204" pitchFamily="49" charset="0"/>
+                <a:cs typeface="Consolas" panose="020B0609020204030204" pitchFamily="49" charset="0"/>
+              </a:rPr>
+              <a:t>, </a:t>
+            </a:r>
+            <a:r>
+              <a:rPr lang="en-US" dirty="0">
+                <a:solidFill>
+                  <a:srgbClr val="6A8759"/>
+                </a:solidFill>
+                <a:effectLst/>
+                <a:latin typeface="Consolas" panose="020B0609020204030204" pitchFamily="49" charset="0"/>
+                <a:cs typeface="Consolas" panose="020B0609020204030204" pitchFamily="49" charset="0"/>
+              </a:rPr>
+              <a:t>"Link"</a:t>
+            </a:r>
+            <a:r>
+              <a:rPr lang="en-US" dirty="0">
+                <a:solidFill>
+                  <a:srgbClr val="CC7832"/>
+                </a:solidFill>
+                <a:effectLst/>
+                <a:latin typeface="Consolas" panose="020B0609020204030204" pitchFamily="49" charset="0"/>
+                <a:cs typeface="Consolas" panose="020B0609020204030204" pitchFamily="49" charset="0"/>
+              </a:rPr>
+              <a:t>, </a:t>
+            </a:r>
+            <a:r>
+              <a:rPr lang="en-US" dirty="0">
+                <a:solidFill>
+                  <a:srgbClr val="6A8759"/>
+                </a:solidFill>
+                <a:effectLst/>
+                <a:latin typeface="Consolas" panose="020B0609020204030204" pitchFamily="49" charset="0"/>
+                <a:cs typeface="Consolas" panose="020B0609020204030204" pitchFamily="49" charset="0"/>
+              </a:rPr>
+              <a:t>"</a:t>
+            </a:r>
+            <a:r>
+              <a:rPr lang="en-US" dirty="0" err="1">
+                <a:solidFill>
+                  <a:srgbClr val="6A8759"/>
+                </a:solidFill>
+                <a:effectLst/>
+                <a:latin typeface="Consolas" panose="020B0609020204030204" pitchFamily="49" charset="0"/>
+                <a:cs typeface="Consolas" panose="020B0609020204030204" pitchFamily="49" charset="0"/>
+              </a:rPr>
+              <a:t>Impa</a:t>
+            </a:r>
+            <a:r>
+              <a:rPr lang="en-US" dirty="0">
+                <a:solidFill>
+                  <a:srgbClr val="6A8759"/>
+                </a:solidFill>
+                <a:effectLst/>
+                <a:latin typeface="Consolas" panose="020B0609020204030204" pitchFamily="49" charset="0"/>
+                <a:cs typeface="Consolas" panose="020B0609020204030204" pitchFamily="49" charset="0"/>
+              </a:rPr>
+              <a:t>"</a:t>
+            </a:r>
+            <a:r>
+              <a:rPr lang="en-US" dirty="0">
+                <a:solidFill>
+                  <a:srgbClr val="CC7832"/>
+                </a:solidFill>
+                <a:effectLst/>
+                <a:latin typeface="Consolas" panose="020B0609020204030204" pitchFamily="49" charset="0"/>
+                <a:cs typeface="Consolas" panose="020B0609020204030204" pitchFamily="49" charset="0"/>
+              </a:rPr>
+              <a:t>, </a:t>
+            </a:r>
+            <a:r>
+              <a:rPr lang="en-US" dirty="0">
+                <a:solidFill>
+                  <a:srgbClr val="6A8759"/>
+                </a:solidFill>
+                <a:effectLst/>
+                <a:latin typeface="Consolas" panose="020B0609020204030204" pitchFamily="49" charset="0"/>
+                <a:cs typeface="Consolas" panose="020B0609020204030204" pitchFamily="49" charset="0"/>
+              </a:rPr>
+              <a:t>"</a:t>
+            </a:r>
+            <a:r>
+              <a:rPr lang="en-US" dirty="0" err="1">
+                <a:solidFill>
+                  <a:srgbClr val="6A8759"/>
+                </a:solidFill>
+                <a:effectLst/>
+                <a:latin typeface="Consolas" panose="020B0609020204030204" pitchFamily="49" charset="0"/>
+                <a:cs typeface="Consolas" panose="020B0609020204030204" pitchFamily="49" charset="0"/>
+              </a:rPr>
+              <a:t>Epona</a:t>
+            </a:r>
+            <a:r>
+              <a:rPr lang="en-US" dirty="0">
+                <a:solidFill>
+                  <a:srgbClr val="6A8759"/>
+                </a:solidFill>
+                <a:effectLst/>
+                <a:latin typeface="Consolas" panose="020B0609020204030204" pitchFamily="49" charset="0"/>
+                <a:cs typeface="Consolas" panose="020B0609020204030204" pitchFamily="49" charset="0"/>
+              </a:rPr>
+              <a:t>"</a:t>
+            </a:r>
+            <a:r>
+              <a:rPr lang="en-US" dirty="0">
+                <a:latin typeface="Consolas" panose="020B0609020204030204" pitchFamily="49" charset="0"/>
+                <a:cs typeface="Consolas" panose="020B0609020204030204" pitchFamily="49" charset="0"/>
+              </a:rPr>
+              <a:t>]</a:t>
+            </a:r>
+            <a:br>
+              <a:rPr lang="en-US" dirty="0">
+                <a:latin typeface="Consolas" panose="020B0609020204030204" pitchFamily="49" charset="0"/>
+                <a:cs typeface="Consolas" panose="020B0609020204030204" pitchFamily="49" charset="0"/>
+              </a:rPr>
+            </a:br>
+            <a:r>
+              <a:rPr lang="en-US" dirty="0">
+                <a:solidFill>
+                  <a:srgbClr val="8888C6"/>
+                </a:solidFill>
+                <a:effectLst/>
+                <a:latin typeface="Consolas" panose="020B0609020204030204" pitchFamily="49" charset="0"/>
+                <a:cs typeface="Consolas" panose="020B0609020204030204" pitchFamily="49" charset="0"/>
+              </a:rPr>
+              <a:t>print</a:t>
+            </a:r>
+            <a:r>
+              <a:rPr lang="en-US" dirty="0">
                 <a:latin typeface="Consolas" panose="020B0609020204030204" pitchFamily="49" charset="0"/>
                 <a:cs typeface="Consolas" panose="020B0609020204030204" pitchFamily="49" charset="0"/>
               </a:rPr>
               <a:t>(</a:t>
             </a:r>
             <a:r>
-              <a:rPr lang="en-US" sz="1800" dirty="0">
-                <a:solidFill>
-                  <a:srgbClr val="6A8759"/>
+              <a:rPr lang="en-US" dirty="0" err="1">
+                <a:latin typeface="Consolas" panose="020B0609020204030204" pitchFamily="49" charset="0"/>
+                <a:cs typeface="Consolas" panose="020B0609020204030204" pitchFamily="49" charset="0"/>
+              </a:rPr>
+              <a:t>sort_list</a:t>
+            </a:r>
+            <a:r>
+              <a:rPr lang="en-US" dirty="0">
+                <a:latin typeface="Consolas" panose="020B0609020204030204" pitchFamily="49" charset="0"/>
+                <a:cs typeface="Consolas" panose="020B0609020204030204" pitchFamily="49" charset="0"/>
+              </a:rPr>
+              <a:t>(</a:t>
+            </a:r>
+            <a:r>
+              <a:rPr lang="en-US" dirty="0" err="1">
+                <a:latin typeface="Consolas" panose="020B0609020204030204" pitchFamily="49" charset="0"/>
+                <a:cs typeface="Consolas" panose="020B0609020204030204" pitchFamily="49" charset="0"/>
+              </a:rPr>
+              <a:t>zelda_lst</a:t>
+            </a:r>
+            <a:r>
+              <a:rPr lang="en-US" dirty="0">
+                <a:latin typeface="Consolas" panose="020B0609020204030204" pitchFamily="49" charset="0"/>
+                <a:cs typeface="Consolas" panose="020B0609020204030204" pitchFamily="49" charset="0"/>
+              </a:rPr>
+              <a:t>))</a:t>
+            </a:r>
+            <a:br>
+              <a:rPr lang="en-US" dirty="0">
+                <a:latin typeface="Consolas" panose="020B0609020204030204" pitchFamily="49" charset="0"/>
+                <a:cs typeface="Consolas" panose="020B0609020204030204" pitchFamily="49" charset="0"/>
+              </a:rPr>
+            </a:br>
+            <a:r>
+              <a:rPr lang="en-US" dirty="0">
+                <a:solidFill>
+                  <a:srgbClr val="8888C6"/>
                 </a:solidFill>
                 <a:effectLst/>
                 <a:latin typeface="Consolas" panose="020B0609020204030204" pitchFamily="49" charset="0"/>
                 <a:cs typeface="Consolas" panose="020B0609020204030204" pitchFamily="49" charset="0"/>
               </a:rPr>
-              <a:t>"Hook"</a:t>
-            </a:r>
-            <a:r>
-              <a:rPr lang="en-US" sz="1800" dirty="0">
+              <a:t>print</a:t>
+            </a:r>
+            <a:r>
+              <a:rPr lang="en-US" dirty="0">
+                <a:latin typeface="Consolas" panose="020B0609020204030204" pitchFamily="49" charset="0"/>
+                <a:cs typeface="Consolas" panose="020B0609020204030204" pitchFamily="49" charset="0"/>
+              </a:rPr>
+              <a:t>(</a:t>
+            </a:r>
+            <a:r>
+              <a:rPr lang="en-US" dirty="0" err="1">
+                <a:latin typeface="Consolas" panose="020B0609020204030204" pitchFamily="49" charset="0"/>
+                <a:cs typeface="Consolas" panose="020B0609020204030204" pitchFamily="49" charset="0"/>
+              </a:rPr>
+              <a:t>sort_list</a:t>
+            </a:r>
+            <a:r>
+              <a:rPr lang="en-US" dirty="0">
+                <a:latin typeface="Consolas" panose="020B0609020204030204" pitchFamily="49" charset="0"/>
+                <a:cs typeface="Consolas" panose="020B0609020204030204" pitchFamily="49" charset="0"/>
+              </a:rPr>
+              <a:t>(</a:t>
+            </a:r>
+            <a:r>
+              <a:rPr lang="en-US" dirty="0" err="1">
+                <a:latin typeface="Consolas" panose="020B0609020204030204" pitchFamily="49" charset="0"/>
+                <a:cs typeface="Consolas" panose="020B0609020204030204" pitchFamily="49" charset="0"/>
+              </a:rPr>
+              <a:t>zelda_lst</a:t>
+            </a:r>
+            <a:r>
+              <a:rPr lang="en-US" dirty="0">
                 <a:solidFill>
                   <a:srgbClr val="CC7832"/>
                 </a:solidFill>
@@ -10088,238 +10859,159 @@
                 <a:latin typeface="Consolas" panose="020B0609020204030204" pitchFamily="49" charset="0"/>
                 <a:cs typeface="Consolas" panose="020B0609020204030204" pitchFamily="49" charset="0"/>
               </a:rPr>
-              <a:t>,  </a:t>
-            </a:r>
-            <a:r>
-              <a:rPr lang="en-US" sz="1800" dirty="0">
-                <a:solidFill>
-                  <a:srgbClr val="6A8759"/>
+              <a:t>, </a:t>
+            </a:r>
+            <a:r>
+              <a:rPr lang="en-US" dirty="0">
+                <a:solidFill>
+                  <a:srgbClr val="AA4926"/>
                 </a:solidFill>
                 <a:effectLst/>
                 <a:latin typeface="Consolas" panose="020B0609020204030204" pitchFamily="49" charset="0"/>
                 <a:cs typeface="Consolas" panose="020B0609020204030204" pitchFamily="49" charset="0"/>
               </a:rPr>
-              <a:t>"Wendy"</a:t>
-            </a:r>
-            <a:r>
-              <a:rPr lang="en-US" sz="1800" dirty="0">
-                <a:solidFill>
-                  <a:srgbClr val="CC7832"/>
+              <a:t>sorter</a:t>
+            </a:r>
+            <a:r>
+              <a:rPr lang="en-US" dirty="0">
+                <a:latin typeface="Consolas" panose="020B0609020204030204" pitchFamily="49" charset="0"/>
+                <a:cs typeface="Consolas" panose="020B0609020204030204" pitchFamily="49" charset="0"/>
+              </a:rPr>
+              <a:t>=</a:t>
+            </a:r>
+            <a:r>
+              <a:rPr lang="en-US" dirty="0">
+                <a:solidFill>
+                  <a:srgbClr val="8888C6"/>
                 </a:solidFill>
                 <a:effectLst/>
                 <a:latin typeface="Consolas" panose="020B0609020204030204" pitchFamily="49" charset="0"/>
                 <a:cs typeface="Consolas" panose="020B0609020204030204" pitchFamily="49" charset="0"/>
               </a:rPr>
-              <a:t>, </a:t>
-            </a:r>
-            <a:r>
-              <a:rPr lang="en-US" sz="1800" dirty="0">
-                <a:solidFill>
-                  <a:srgbClr val="6A8759"/>
-                </a:solidFill>
-                <a:effectLst/>
-                <a:latin typeface="Consolas" panose="020B0609020204030204" pitchFamily="49" charset="0"/>
-                <a:cs typeface="Consolas" panose="020B0609020204030204" pitchFamily="49" charset="0"/>
-              </a:rPr>
-              <a:t>"John"</a:t>
-            </a:r>
-            <a:r>
-              <a:rPr lang="en-US" sz="1800" dirty="0">
-                <a:solidFill>
-                  <a:srgbClr val="CC7832"/>
-                </a:solidFill>
-                <a:effectLst/>
-                <a:latin typeface="Consolas" panose="020B0609020204030204" pitchFamily="49" charset="0"/>
-                <a:cs typeface="Consolas" panose="020B0609020204030204" pitchFamily="49" charset="0"/>
-              </a:rPr>
-              <a:t>, </a:t>
-            </a:r>
-            <a:r>
-              <a:rPr lang="en-US" sz="1800" dirty="0">
-                <a:solidFill>
-                  <a:srgbClr val="6A8759"/>
-                </a:solidFill>
-                <a:effectLst/>
-                <a:latin typeface="Consolas" panose="020B0609020204030204" pitchFamily="49" charset="0"/>
-                <a:cs typeface="Consolas" panose="020B0609020204030204" pitchFamily="49" charset="0"/>
-              </a:rPr>
-              <a:t>"Peter"</a:t>
-            </a:r>
-            <a:r>
-              <a:rPr lang="en-US" sz="1800" dirty="0">
-                <a:latin typeface="Consolas" panose="020B0609020204030204" pitchFamily="49" charset="0"/>
-                <a:cs typeface="Consolas" panose="020B0609020204030204" pitchFamily="49" charset="0"/>
-              </a:rPr>
-              <a:t>) </a:t>
-            </a:r>
-            <a:r>
-              <a:rPr lang="en-US" sz="1800" dirty="0">
-                <a:solidFill>
-                  <a:srgbClr val="808080"/>
-                </a:solidFill>
-                <a:effectLst/>
-                <a:latin typeface="Consolas" panose="020B0609020204030204" pitchFamily="49" charset="0"/>
-                <a:cs typeface="Consolas" panose="020B0609020204030204" pitchFamily="49" charset="0"/>
-              </a:rPr>
-              <a:t># Hello Hook, Hello John, Hello Peter, Hello Wendy,</a:t>
-            </a:r>
-            <a:br>
-              <a:rPr lang="en-US" sz="1800" dirty="0">
-                <a:solidFill>
-                  <a:srgbClr val="808080"/>
-                </a:solidFill>
-                <a:effectLst/>
-                <a:latin typeface="Consolas" panose="020B0609020204030204" pitchFamily="49" charset="0"/>
-                <a:cs typeface="Consolas" panose="020B0609020204030204" pitchFamily="49" charset="0"/>
-              </a:rPr>
-            </a:br>
-            <a:r>
-              <a:rPr lang="en-US" sz="1800" dirty="0" err="1">
-                <a:latin typeface="Consolas" panose="020B0609020204030204" pitchFamily="49" charset="0"/>
-                <a:cs typeface="Consolas" panose="020B0609020204030204" pitchFamily="49" charset="0"/>
-              </a:rPr>
-              <a:t>my_func</a:t>
-            </a:r>
-            <a:r>
-              <a:rPr lang="en-US" sz="1800" dirty="0">
-                <a:latin typeface="Consolas" panose="020B0609020204030204" pitchFamily="49" charset="0"/>
-                <a:cs typeface="Consolas" panose="020B0609020204030204" pitchFamily="49" charset="0"/>
-              </a:rPr>
-              <a:t> = </a:t>
-            </a:r>
-            <a:r>
-              <a:rPr lang="en-US" sz="1800" dirty="0" err="1">
-                <a:latin typeface="Consolas" panose="020B0609020204030204" pitchFamily="49" charset="0"/>
-                <a:cs typeface="Consolas" panose="020B0609020204030204" pitchFamily="49" charset="0"/>
-              </a:rPr>
-              <a:t>print_hello</a:t>
-            </a:r>
-            <a:br>
-              <a:rPr lang="en-US" sz="1800" dirty="0">
-                <a:latin typeface="Consolas" panose="020B0609020204030204" pitchFamily="49" charset="0"/>
-                <a:cs typeface="Consolas" panose="020B0609020204030204" pitchFamily="49" charset="0"/>
-              </a:rPr>
-            </a:br>
-            <a:r>
-              <a:rPr lang="en-US" sz="1800" dirty="0" err="1">
-                <a:latin typeface="Consolas" panose="020B0609020204030204" pitchFamily="49" charset="0"/>
-                <a:cs typeface="Consolas" panose="020B0609020204030204" pitchFamily="49" charset="0"/>
-              </a:rPr>
-              <a:t>my_func</a:t>
-            </a:r>
-            <a:r>
-              <a:rPr lang="en-US" sz="1800" dirty="0">
-                <a:latin typeface="Consolas" panose="020B0609020204030204" pitchFamily="49" charset="0"/>
-                <a:cs typeface="Consolas" panose="020B0609020204030204" pitchFamily="49" charset="0"/>
-              </a:rPr>
-              <a:t>(</a:t>
-            </a:r>
-            <a:r>
-              <a:rPr lang="en-US" sz="1800" dirty="0">
-                <a:solidFill>
-                  <a:srgbClr val="6A8759"/>
-                </a:solidFill>
-                <a:effectLst/>
-                <a:latin typeface="Consolas" panose="020B0609020204030204" pitchFamily="49" charset="0"/>
-                <a:cs typeface="Consolas" panose="020B0609020204030204" pitchFamily="49" charset="0"/>
-              </a:rPr>
-              <a:t>"Hook"</a:t>
-            </a:r>
-            <a:r>
-              <a:rPr lang="en-US" sz="1800" dirty="0">
-                <a:solidFill>
-                  <a:srgbClr val="CC7832"/>
-                </a:solidFill>
-                <a:effectLst/>
-                <a:latin typeface="Consolas" panose="020B0609020204030204" pitchFamily="49" charset="0"/>
-                <a:cs typeface="Consolas" panose="020B0609020204030204" pitchFamily="49" charset="0"/>
-              </a:rPr>
-              <a:t>,  </a:t>
-            </a:r>
-            <a:r>
-              <a:rPr lang="en-US" sz="1800" dirty="0">
-                <a:solidFill>
-                  <a:srgbClr val="6A8759"/>
-                </a:solidFill>
-                <a:effectLst/>
-                <a:latin typeface="Consolas" panose="020B0609020204030204" pitchFamily="49" charset="0"/>
-                <a:cs typeface="Consolas" panose="020B0609020204030204" pitchFamily="49" charset="0"/>
-              </a:rPr>
-              <a:t>"Wendy"</a:t>
-            </a:r>
-            <a:r>
-              <a:rPr lang="en-US" sz="1800" dirty="0">
-                <a:solidFill>
-                  <a:srgbClr val="CC7832"/>
-                </a:solidFill>
-                <a:effectLst/>
-                <a:latin typeface="Consolas" panose="020B0609020204030204" pitchFamily="49" charset="0"/>
-                <a:cs typeface="Consolas" panose="020B0609020204030204" pitchFamily="49" charset="0"/>
-              </a:rPr>
-              <a:t>, </a:t>
-            </a:r>
-            <a:r>
-              <a:rPr lang="en-US" sz="1800" dirty="0">
-                <a:solidFill>
-                  <a:srgbClr val="6A8759"/>
-                </a:solidFill>
-                <a:effectLst/>
-                <a:latin typeface="Consolas" panose="020B0609020204030204" pitchFamily="49" charset="0"/>
-                <a:cs typeface="Consolas" panose="020B0609020204030204" pitchFamily="49" charset="0"/>
-              </a:rPr>
-              <a:t>"John"</a:t>
-            </a:r>
-            <a:r>
-              <a:rPr lang="en-US" sz="1800" dirty="0">
-                <a:solidFill>
-                  <a:srgbClr val="CC7832"/>
-                </a:solidFill>
-                <a:effectLst/>
-                <a:latin typeface="Consolas" panose="020B0609020204030204" pitchFamily="49" charset="0"/>
-                <a:cs typeface="Consolas" panose="020B0609020204030204" pitchFamily="49" charset="0"/>
-              </a:rPr>
-              <a:t>, </a:t>
-            </a:r>
-            <a:r>
-              <a:rPr lang="en-US" sz="1800" dirty="0">
-                <a:solidFill>
-                  <a:srgbClr val="6A8759"/>
-                </a:solidFill>
-                <a:effectLst/>
-                <a:latin typeface="Consolas" panose="020B0609020204030204" pitchFamily="49" charset="0"/>
-                <a:cs typeface="Consolas" panose="020B0609020204030204" pitchFamily="49" charset="0"/>
-              </a:rPr>
-              <a:t>"Peter"</a:t>
-            </a:r>
-            <a:r>
-              <a:rPr lang="en-US" sz="1800" dirty="0">
-                <a:latin typeface="Consolas" panose="020B0609020204030204" pitchFamily="49" charset="0"/>
-                <a:cs typeface="Consolas" panose="020B0609020204030204" pitchFamily="49" charset="0"/>
-              </a:rPr>
-              <a:t>) </a:t>
-            </a:r>
-            <a:r>
-              <a:rPr lang="en-US" sz="1800" dirty="0">
-                <a:solidFill>
-                  <a:srgbClr val="808080"/>
-                </a:solidFill>
-                <a:effectLst/>
-                <a:latin typeface="Consolas" panose="020B0609020204030204" pitchFamily="49" charset="0"/>
-                <a:cs typeface="Consolas" panose="020B0609020204030204" pitchFamily="49" charset="0"/>
-              </a:rPr>
-              <a:t># Hello Hook, Hello John, Hello Peter, Hello Wendy, </a:t>
-            </a:r>
-            <a:endParaRPr lang="en-US" sz="1800" dirty="0">
-              <a:latin typeface="Consolas" panose="020B0609020204030204" pitchFamily="49" charset="0"/>
-              <a:cs typeface="Consolas" panose="020B0609020204030204" pitchFamily="49" charset="0"/>
-            </a:endParaRPr>
+              <a:t>min</a:t>
+            </a:r>
+            <a:r>
+              <a:rPr lang="en-US" dirty="0">
+                <a:latin typeface="Consolas" panose="020B0609020204030204" pitchFamily="49" charset="0"/>
+                <a:cs typeface="Consolas" panose="020B0609020204030204" pitchFamily="49" charset="0"/>
+              </a:rPr>
+              <a:t>))</a:t>
+            </a:r>
+          </a:p>
+        </p:txBody>
+      </p:sp>
+      <p:sp>
+        <p:nvSpPr>
+          <p:cNvPr id="4" name="Arrow: Left 3">
+            <a:extLst>
+              <a:ext uri="{FF2B5EF4-FFF2-40B4-BE49-F238E27FC236}">
+                <a16:creationId xmlns:a16="http://schemas.microsoft.com/office/drawing/2014/main" id="{11D89321-ECB3-43C1-BB95-A895F9EE2CB0}"/>
+              </a:ext>
+            </a:extLst>
+          </p:cNvPr>
+          <p:cNvSpPr/>
+          <p:nvPr/>
+        </p:nvSpPr>
+        <p:spPr>
+          <a:xfrm rot="20863037">
+            <a:off x="8302171" y="1206167"/>
+            <a:ext cx="2090058" cy="759409"/>
+          </a:xfrm>
+          <a:prstGeom prst="leftArrow">
+            <a:avLst/>
+          </a:prstGeom>
+          <a:ln/>
+        </p:spPr>
+        <p:style>
+          <a:lnRef idx="2">
+            <a:schemeClr val="accent1">
+              <a:shade val="50000"/>
+            </a:schemeClr>
+          </a:lnRef>
+          <a:fillRef idx="1">
+            <a:schemeClr val="accent1"/>
+          </a:fillRef>
+          <a:effectRef idx="0">
+            <a:schemeClr val="accent1"/>
+          </a:effectRef>
+          <a:fontRef idx="minor">
+            <a:schemeClr val="lt1"/>
+          </a:fontRef>
+        </p:style>
+        <p:txBody>
+          <a:bodyPr lIns="274320" tIns="182880" rIns="274320" bIns="182880" rtlCol="0" anchor="ctr"/>
+          <a:lstStyle/>
+          <a:p>
+            <a:pPr algn="ctr"/>
+            <a:r>
+              <a:rPr lang="en-US" dirty="0">
+                <a:latin typeface="Proxima Nova" charset="0"/>
+                <a:ea typeface="Proxima Nova" charset="0"/>
+                <a:cs typeface="Proxima Nova" charset="0"/>
+              </a:rPr>
+              <a:t>A function!</a:t>
+            </a:r>
+          </a:p>
+        </p:txBody>
+      </p:sp>
+      <p:sp>
+        <p:nvSpPr>
+          <p:cNvPr id="6" name="Arrow: Left 5">
+            <a:extLst>
+              <a:ext uri="{FF2B5EF4-FFF2-40B4-BE49-F238E27FC236}">
+                <a16:creationId xmlns:a16="http://schemas.microsoft.com/office/drawing/2014/main" id="{6D881435-BC92-48B3-9254-38F2590012D8}"/>
+              </a:ext>
+            </a:extLst>
+          </p:cNvPr>
+          <p:cNvSpPr/>
+          <p:nvPr/>
+        </p:nvSpPr>
+        <p:spPr>
+          <a:xfrm>
+            <a:off x="5217885" y="3682805"/>
+            <a:ext cx="3679371" cy="759409"/>
+          </a:xfrm>
+          <a:prstGeom prst="leftArrow">
+            <a:avLst/>
+          </a:prstGeom>
+          <a:ln/>
+        </p:spPr>
+        <p:style>
+          <a:lnRef idx="2">
+            <a:schemeClr val="accent1">
+              <a:shade val="50000"/>
+            </a:schemeClr>
+          </a:lnRef>
+          <a:fillRef idx="1">
+            <a:schemeClr val="accent1"/>
+          </a:fillRef>
+          <a:effectRef idx="0">
+            <a:schemeClr val="accent1"/>
+          </a:effectRef>
+          <a:fontRef idx="minor">
+            <a:schemeClr val="lt1"/>
+          </a:fontRef>
+        </p:style>
+        <p:txBody>
+          <a:bodyPr lIns="274320" tIns="182880" rIns="274320" bIns="182880" rtlCol="0" anchor="ctr"/>
+          <a:lstStyle/>
+          <a:p>
+            <a:pPr algn="ctr"/>
+            <a:r>
+              <a:rPr lang="en-US" dirty="0">
+                <a:latin typeface="Proxima Nova" charset="0"/>
+                <a:ea typeface="Proxima Nova" charset="0"/>
+                <a:cs typeface="Proxima Nova" charset="0"/>
+              </a:rPr>
+              <a:t>Use max by default!</a:t>
+            </a:r>
           </a:p>
         </p:txBody>
       </p:sp>
     </p:spTree>
     <p:extLst>
       <p:ext uri="{BB962C8B-B14F-4D97-AF65-F5344CB8AC3E}">
-        <p14:creationId xmlns:p14="http://schemas.microsoft.com/office/powerpoint/2010/main" val="337554136"/>
+        <p14:creationId xmlns:p14="http://schemas.microsoft.com/office/powerpoint/2010/main" val="3575658485"/>
       </p:ext>
     </p:extLst>
   </p:cSld>
@@ -10363,7 +11055,7 @@
           <p:cNvPr id="2" name="Title 1">
             <a:extLst>
               <a:ext uri="{FF2B5EF4-FFF2-40B4-BE49-F238E27FC236}">
-                <a16:creationId xmlns:a16="http://schemas.microsoft.com/office/drawing/2014/main" id="{218EFCC6-0CB3-444F-9315-CC1A11920122}"/>
+                <a16:creationId xmlns:a16="http://schemas.microsoft.com/office/drawing/2014/main" id="{51BC3C42-0BCD-474D-A9CE-E0012F92D69A}"/>
               </a:ext>
             </a:extLst>
           </p:cNvPr>
@@ -10381,17 +11073,72 @@
           <a:p>
             <a:r>
               <a:rPr lang="en-US" dirty="0"/>
-              <a:t>Functions as Parameters! </a:t>
+              <a:t>Functions List</a:t>
             </a:r>
           </a:p>
         </p:txBody>
       </p:sp>
       <p:sp>
         <p:nvSpPr>
-          <p:cNvPr id="7" name="TextBox 6">
+          <p:cNvPr id="3" name="Text Placeholder 2">
             <a:extLst>
               <a:ext uri="{FF2B5EF4-FFF2-40B4-BE49-F238E27FC236}">
-                <a16:creationId xmlns:a16="http://schemas.microsoft.com/office/drawing/2014/main" id="{380B0752-897E-3649-A71A-6914E229E4CE}"/>
+                <a16:creationId xmlns:a16="http://schemas.microsoft.com/office/drawing/2014/main" id="{742F3268-ED83-5E43-BC58-7EC31A5C9397}"/>
+              </a:ext>
+            </a:extLst>
+          </p:cNvPr>
+          <p:cNvSpPr>
+            <a:spLocks noGrp="1"/>
+          </p:cNvSpPr>
+          <p:nvPr>
+            <p:ph type="body" sz="quarter" idx="10"/>
+          </p:nvPr>
+        </p:nvSpPr>
+        <p:spPr>
+          <a:xfrm>
+            <a:off x="628075" y="1776683"/>
+            <a:ext cx="5645725" cy="1230145"/>
+          </a:xfrm>
+        </p:spPr>
+        <p:txBody>
+          <a:bodyPr/>
+          <a:lstStyle/>
+          <a:p>
+            <a:r>
+              <a:rPr lang="en-US" dirty="0"/>
+              <a:t>*</a:t>
+            </a:r>
+            <a:r>
+              <a:rPr lang="en-US" dirty="0" err="1"/>
+              <a:t>args</a:t>
+            </a:r>
+            <a:r>
+              <a:rPr lang="en-US" dirty="0"/>
+              <a:t> says – all values store in this list!</a:t>
+            </a:r>
+          </a:p>
+          <a:p>
+            <a:pPr lvl="1"/>
+            <a:r>
+              <a:rPr lang="en-US" dirty="0"/>
+              <a:t>You can then use it as a list directly</a:t>
+            </a:r>
+          </a:p>
+          <a:p>
+            <a:pPr lvl="1"/>
+            <a:r>
+              <a:rPr lang="en-US" dirty="0"/>
+              <a:t>We do that with Print!</a:t>
+            </a:r>
+          </a:p>
+        </p:txBody>
+      </p:sp>
+      <p:sp>
+        <p:nvSpPr>
+          <p:cNvPr id="5" name="TextBox 4">
+            <a:extLst>
+              <a:ext uri="{FF2B5EF4-FFF2-40B4-BE49-F238E27FC236}">
+                <a16:creationId xmlns:a16="http://schemas.microsoft.com/office/drawing/2014/main" id="{47A8ABBF-0B34-CE4B-97DC-DA0F5C84AF9E}"/>
               </a:ext>
             </a:extLst>
           </p:cNvPr>
@@ -10400,8 +11147,8 @@
         </p:nvSpPr>
         <p:spPr>
           <a:xfrm>
-            <a:off x="1409699" y="1708020"/>
-            <a:ext cx="10462987" cy="4708981"/>
+            <a:off x="723900" y="3332828"/>
+            <a:ext cx="12865100" cy="1754326"/>
           </a:xfrm>
           <a:prstGeom prst="rect">
             <a:avLst/>
@@ -10415,7 +11162,7 @@
           <a:lstStyle/>
           <a:p>
             <a:r>
-              <a:rPr lang="en-US" dirty="0">
+              <a:rPr lang="en-US" sz="1800" dirty="0">
                 <a:solidFill>
                   <a:srgbClr val="CC7832"/>
                 </a:solidFill>
@@ -10426,7 +11173,7 @@
               <a:t>def </a:t>
             </a:r>
             <a:r>
-              <a:rPr lang="en-US" dirty="0" err="1">
+              <a:rPr lang="en-US" sz="1800" dirty="0" err="1">
                 <a:solidFill>
                   <a:srgbClr val="FFC66D"/>
                 </a:solidFill>
@@ -10434,17 +11181,44 @@
                 <a:latin typeface="Consolas" panose="020B0609020204030204" pitchFamily="49" charset="0"/>
                 <a:cs typeface="Consolas" panose="020B0609020204030204" pitchFamily="49" charset="0"/>
               </a:rPr>
-              <a:t>sort_list</a:t>
-            </a:r>
-            <a:r>
-              <a:rPr lang="en-US" dirty="0">
-                <a:latin typeface="Consolas" panose="020B0609020204030204" pitchFamily="49" charset="0"/>
-                <a:cs typeface="Consolas" panose="020B0609020204030204" pitchFamily="49" charset="0"/>
-              </a:rPr>
-              <a:t>(unsorted</a:t>
-            </a:r>
-            <a:r>
-              <a:rPr lang="en-US" dirty="0">
+              <a:t>print_hello</a:t>
+            </a:r>
+            <a:r>
+              <a:rPr lang="en-US" sz="1800" dirty="0">
+                <a:latin typeface="Consolas" panose="020B0609020204030204" pitchFamily="49" charset="0"/>
+                <a:cs typeface="Consolas" panose="020B0609020204030204" pitchFamily="49" charset="0"/>
+              </a:rPr>
+              <a:t>(*</a:t>
+            </a:r>
+            <a:r>
+              <a:rPr lang="en-US" sz="1800" dirty="0" err="1">
+                <a:latin typeface="Consolas" panose="020B0609020204030204" pitchFamily="49" charset="0"/>
+                <a:cs typeface="Consolas" panose="020B0609020204030204" pitchFamily="49" charset="0"/>
+              </a:rPr>
+              <a:t>args</a:t>
+            </a:r>
+            <a:r>
+              <a:rPr lang="en-US" sz="1800" dirty="0">
+                <a:latin typeface="Consolas" panose="020B0609020204030204" pitchFamily="49" charset="0"/>
+                <a:cs typeface="Consolas" panose="020B0609020204030204" pitchFamily="49" charset="0"/>
+              </a:rPr>
+              <a:t>):</a:t>
+            </a:r>
+            <a:br>
+              <a:rPr lang="en-US" sz="1800" dirty="0">
+                <a:latin typeface="Consolas" panose="020B0609020204030204" pitchFamily="49" charset="0"/>
+                <a:cs typeface="Consolas" panose="020B0609020204030204" pitchFamily="49" charset="0"/>
+              </a:rPr>
+            </a:br>
+            <a:r>
+              <a:rPr lang="en-US" sz="1800" dirty="0">
+                <a:latin typeface="Consolas" panose="020B0609020204030204" pitchFamily="49" charset="0"/>
+                <a:cs typeface="Consolas" panose="020B0609020204030204" pitchFamily="49" charset="0"/>
+              </a:rPr>
+              <a:t>    </a:t>
+            </a:r>
+            <a:r>
+              <a:rPr lang="en-US" sz="1800" dirty="0">
                 <a:solidFill>
                   <a:srgbClr val="CC7832"/>
                 </a:solidFill>
@@ -10452,496 +11226,203 @@
                 <a:latin typeface="Consolas" panose="020B0609020204030204" pitchFamily="49" charset="0"/>
                 <a:cs typeface="Consolas" panose="020B0609020204030204" pitchFamily="49" charset="0"/>
               </a:rPr>
+              <a:t>for </a:t>
+            </a:r>
+            <a:r>
+              <a:rPr lang="en-US" sz="1800" dirty="0" err="1">
+                <a:latin typeface="Consolas" panose="020B0609020204030204" pitchFamily="49" charset="0"/>
+                <a:cs typeface="Consolas" panose="020B0609020204030204" pitchFamily="49" charset="0"/>
+              </a:rPr>
+              <a:t>arg</a:t>
+            </a:r>
+            <a:r>
+              <a:rPr lang="en-US" sz="1800" dirty="0">
+                <a:latin typeface="Consolas" panose="020B0609020204030204" pitchFamily="49" charset="0"/>
+                <a:cs typeface="Consolas" panose="020B0609020204030204" pitchFamily="49" charset="0"/>
+              </a:rPr>
+              <a:t> </a:t>
+            </a:r>
+            <a:r>
+              <a:rPr lang="en-US" sz="1800" dirty="0">
+                <a:solidFill>
+                  <a:srgbClr val="CC7832"/>
+                </a:solidFill>
+                <a:effectLst/>
+                <a:latin typeface="Consolas" panose="020B0609020204030204" pitchFamily="49" charset="0"/>
+                <a:cs typeface="Consolas" panose="020B0609020204030204" pitchFamily="49" charset="0"/>
+              </a:rPr>
+              <a:t>in </a:t>
+            </a:r>
+            <a:r>
+              <a:rPr lang="en-US" sz="1800" dirty="0">
+                <a:solidFill>
+                  <a:srgbClr val="8888C6"/>
+                </a:solidFill>
+                <a:effectLst/>
+                <a:latin typeface="Consolas" panose="020B0609020204030204" pitchFamily="49" charset="0"/>
+                <a:cs typeface="Consolas" panose="020B0609020204030204" pitchFamily="49" charset="0"/>
+              </a:rPr>
+              <a:t>sorted</a:t>
+            </a:r>
+            <a:r>
+              <a:rPr lang="en-US" sz="1800" dirty="0">
+                <a:latin typeface="Consolas" panose="020B0609020204030204" pitchFamily="49" charset="0"/>
+                <a:cs typeface="Consolas" panose="020B0609020204030204" pitchFamily="49" charset="0"/>
+              </a:rPr>
+              <a:t>(</a:t>
+            </a:r>
+            <a:r>
+              <a:rPr lang="en-US" sz="1800" dirty="0" err="1">
+                <a:latin typeface="Consolas" panose="020B0609020204030204" pitchFamily="49" charset="0"/>
+                <a:cs typeface="Consolas" panose="020B0609020204030204" pitchFamily="49" charset="0"/>
+              </a:rPr>
+              <a:t>args</a:t>
+            </a:r>
+            <a:r>
+              <a:rPr lang="en-US" sz="1800" dirty="0">
+                <a:latin typeface="Consolas" panose="020B0609020204030204" pitchFamily="49" charset="0"/>
+                <a:cs typeface="Consolas" panose="020B0609020204030204" pitchFamily="49" charset="0"/>
+              </a:rPr>
+              <a:t>):</a:t>
+            </a:r>
+            <a:br>
+              <a:rPr lang="en-US" sz="1800" dirty="0">
+                <a:latin typeface="Consolas" panose="020B0609020204030204" pitchFamily="49" charset="0"/>
+                <a:cs typeface="Consolas" panose="020B0609020204030204" pitchFamily="49" charset="0"/>
+              </a:rPr>
+            </a:br>
+            <a:r>
+              <a:rPr lang="en-US" sz="1800" dirty="0">
+                <a:latin typeface="Consolas" panose="020B0609020204030204" pitchFamily="49" charset="0"/>
+                <a:cs typeface="Consolas" panose="020B0609020204030204" pitchFamily="49" charset="0"/>
+              </a:rPr>
+              <a:t>        </a:t>
+            </a:r>
+            <a:r>
+              <a:rPr lang="en-US" sz="1800" dirty="0">
+                <a:solidFill>
+                  <a:srgbClr val="8888C6"/>
+                </a:solidFill>
+                <a:effectLst/>
+                <a:latin typeface="Consolas" panose="020B0609020204030204" pitchFamily="49" charset="0"/>
+                <a:cs typeface="Consolas" panose="020B0609020204030204" pitchFamily="49" charset="0"/>
+              </a:rPr>
+              <a:t>print</a:t>
+            </a:r>
+            <a:r>
+              <a:rPr lang="en-US" sz="1800" dirty="0">
+                <a:latin typeface="Consolas" panose="020B0609020204030204" pitchFamily="49" charset="0"/>
+                <a:cs typeface="Consolas" panose="020B0609020204030204" pitchFamily="49" charset="0"/>
+              </a:rPr>
+              <a:t>(</a:t>
+            </a:r>
+            <a:r>
+              <a:rPr lang="en-US" sz="1800" dirty="0">
+                <a:solidFill>
+                  <a:srgbClr val="6A8759"/>
+                </a:solidFill>
+                <a:effectLst/>
+                <a:latin typeface="Consolas" panose="020B0609020204030204" pitchFamily="49" charset="0"/>
+                <a:cs typeface="Consolas" panose="020B0609020204030204" pitchFamily="49" charset="0"/>
+              </a:rPr>
+              <a:t>"Hello {}"</a:t>
+            </a:r>
+            <a:r>
+              <a:rPr lang="en-US" sz="1800" dirty="0">
+                <a:latin typeface="Consolas" panose="020B0609020204030204" pitchFamily="49" charset="0"/>
+                <a:cs typeface="Consolas" panose="020B0609020204030204" pitchFamily="49" charset="0"/>
+              </a:rPr>
+              <a:t>.format(</a:t>
+            </a:r>
+            <a:r>
+              <a:rPr lang="en-US" sz="1800" dirty="0" err="1">
+                <a:latin typeface="Consolas" panose="020B0609020204030204" pitchFamily="49" charset="0"/>
+                <a:cs typeface="Consolas" panose="020B0609020204030204" pitchFamily="49" charset="0"/>
+              </a:rPr>
+              <a:t>arg</a:t>
+            </a:r>
+            <a:r>
+              <a:rPr lang="en-US" sz="1800" dirty="0">
+                <a:latin typeface="Consolas" panose="020B0609020204030204" pitchFamily="49" charset="0"/>
+                <a:cs typeface="Consolas" panose="020B0609020204030204" pitchFamily="49" charset="0"/>
+              </a:rPr>
+              <a:t>)</a:t>
+            </a:r>
+            <a:r>
+              <a:rPr lang="en-US" sz="1800" dirty="0">
+                <a:solidFill>
+                  <a:srgbClr val="CC7832"/>
+                </a:solidFill>
+                <a:effectLst/>
+                <a:latin typeface="Consolas" panose="020B0609020204030204" pitchFamily="49" charset="0"/>
+                <a:cs typeface="Consolas" panose="020B0609020204030204" pitchFamily="49" charset="0"/>
+              </a:rPr>
               <a:t>, </a:t>
             </a:r>
             <a:r>
-              <a:rPr lang="en-US" dirty="0">
-                <a:latin typeface="Consolas" panose="020B0609020204030204" pitchFamily="49" charset="0"/>
-                <a:cs typeface="Consolas" panose="020B0609020204030204" pitchFamily="49" charset="0"/>
-              </a:rPr>
-              <a:t>result=</a:t>
-            </a:r>
-            <a:r>
-              <a:rPr lang="en-US" dirty="0">
-                <a:solidFill>
-                  <a:srgbClr val="CC7832"/>
+              <a:rPr lang="en-US" sz="1800" dirty="0">
+                <a:solidFill>
+                  <a:srgbClr val="AA4926"/>
                 </a:solidFill>
                 <a:effectLst/>
                 <a:latin typeface="Consolas" panose="020B0609020204030204" pitchFamily="49" charset="0"/>
                 <a:cs typeface="Consolas" panose="020B0609020204030204" pitchFamily="49" charset="0"/>
               </a:rPr>
-              <a:t>None, </a:t>
-            </a:r>
-            <a:r>
-              <a:rPr lang="en-US" dirty="0">
-                <a:latin typeface="Consolas" panose="020B0609020204030204" pitchFamily="49" charset="0"/>
-                <a:cs typeface="Consolas" panose="020B0609020204030204" pitchFamily="49" charset="0"/>
-              </a:rPr>
-              <a:t>sorter=</a:t>
-            </a:r>
-            <a:r>
-              <a:rPr lang="en-US" dirty="0">
-                <a:solidFill>
-                  <a:srgbClr val="8888C6"/>
+              <a:t>end</a:t>
+            </a:r>
+            <a:r>
+              <a:rPr lang="en-US" sz="1800" dirty="0">
+                <a:latin typeface="Consolas" panose="020B0609020204030204" pitchFamily="49" charset="0"/>
+                <a:cs typeface="Consolas" panose="020B0609020204030204" pitchFamily="49" charset="0"/>
+              </a:rPr>
+              <a:t>=</a:t>
+            </a:r>
+            <a:r>
+              <a:rPr lang="en-US" sz="1800" dirty="0">
+                <a:solidFill>
+                  <a:srgbClr val="6A8759"/>
                 </a:solidFill>
                 <a:effectLst/>
                 <a:latin typeface="Consolas" panose="020B0609020204030204" pitchFamily="49" charset="0"/>
                 <a:cs typeface="Consolas" panose="020B0609020204030204" pitchFamily="49" charset="0"/>
               </a:rPr>
-              <a:t>max</a:t>
-            </a:r>
-            <a:r>
-              <a:rPr lang="en-US" dirty="0">
-                <a:latin typeface="Consolas" panose="020B0609020204030204" pitchFamily="49" charset="0"/>
-                <a:cs typeface="Consolas" panose="020B0609020204030204" pitchFamily="49" charset="0"/>
-              </a:rPr>
-              <a:t>):</a:t>
+              <a:t>', '</a:t>
+            </a:r>
+            <a:r>
+              <a:rPr lang="en-US" sz="1800" dirty="0">
+                <a:latin typeface="Consolas" panose="020B0609020204030204" pitchFamily="49" charset="0"/>
+                <a:cs typeface="Consolas" panose="020B0609020204030204" pitchFamily="49" charset="0"/>
+              </a:rPr>
+              <a:t>)</a:t>
             </a:r>
             <a:br>
-              <a:rPr lang="en-US" dirty="0">
-                <a:latin typeface="Consolas" panose="020B0609020204030204" pitchFamily="49" charset="0"/>
-                <a:cs typeface="Consolas" panose="020B0609020204030204" pitchFamily="49" charset="0"/>
-              </a:rPr>
-            </a:br>
-            <a:r>
-              <a:rPr lang="en-US" dirty="0">
-                <a:latin typeface="Consolas" panose="020B0609020204030204" pitchFamily="49" charset="0"/>
-                <a:cs typeface="Consolas" panose="020B0609020204030204" pitchFamily="49" charset="0"/>
-              </a:rPr>
-              <a:t>    </a:t>
-            </a:r>
-            <a:r>
-              <a:rPr lang="en-US" dirty="0">
-                <a:solidFill>
-                  <a:srgbClr val="808080"/>
-                </a:solidFill>
-                <a:effectLst/>
-                <a:latin typeface="Consolas" panose="020B0609020204030204" pitchFamily="49" charset="0"/>
-                <a:cs typeface="Consolas" panose="020B0609020204030204" pitchFamily="49" charset="0"/>
-              </a:rPr>
-              <a:t># base case - simplest case</a:t>
-            </a:r>
-            <a:br>
-              <a:rPr lang="en-US" dirty="0">
-                <a:solidFill>
-                  <a:srgbClr val="808080"/>
-                </a:solidFill>
-                <a:effectLst/>
-                <a:latin typeface="Consolas" panose="020B0609020204030204" pitchFamily="49" charset="0"/>
-                <a:cs typeface="Consolas" panose="020B0609020204030204" pitchFamily="49" charset="0"/>
-              </a:rPr>
-            </a:br>
-            <a:r>
-              <a:rPr lang="en-US" dirty="0">
-                <a:solidFill>
-                  <a:srgbClr val="808080"/>
-                </a:solidFill>
-                <a:effectLst/>
-                <a:latin typeface="Consolas" panose="020B0609020204030204" pitchFamily="49" charset="0"/>
-                <a:cs typeface="Consolas" panose="020B0609020204030204" pitchFamily="49" charset="0"/>
-              </a:rPr>
-              <a:t>    </a:t>
-            </a:r>
-            <a:r>
-              <a:rPr lang="en-US" dirty="0">
-                <a:solidFill>
-                  <a:srgbClr val="CC7832"/>
-                </a:solidFill>
-                <a:effectLst/>
-                <a:latin typeface="Consolas" panose="020B0609020204030204" pitchFamily="49" charset="0"/>
-                <a:cs typeface="Consolas" panose="020B0609020204030204" pitchFamily="49" charset="0"/>
-              </a:rPr>
-              <a:t>if </a:t>
-            </a:r>
-            <a:r>
-              <a:rPr lang="en-US" dirty="0">
-                <a:latin typeface="Consolas" panose="020B0609020204030204" pitchFamily="49" charset="0"/>
-                <a:cs typeface="Consolas" panose="020B0609020204030204" pitchFamily="49" charset="0"/>
-              </a:rPr>
-              <a:t>result </a:t>
-            </a:r>
-            <a:r>
-              <a:rPr lang="en-US" dirty="0">
-                <a:solidFill>
-                  <a:srgbClr val="CC7832"/>
-                </a:solidFill>
-                <a:effectLst/>
-                <a:latin typeface="Consolas" panose="020B0609020204030204" pitchFamily="49" charset="0"/>
-                <a:cs typeface="Consolas" panose="020B0609020204030204" pitchFamily="49" charset="0"/>
-              </a:rPr>
-              <a:t>is None</a:t>
-            </a:r>
-            <a:r>
-              <a:rPr lang="en-US" dirty="0">
-                <a:latin typeface="Consolas" panose="020B0609020204030204" pitchFamily="49" charset="0"/>
-                <a:cs typeface="Consolas" panose="020B0609020204030204" pitchFamily="49" charset="0"/>
-              </a:rPr>
-              <a:t>:</a:t>
-            </a:r>
-            <a:br>
-              <a:rPr lang="en-US" dirty="0">
-                <a:latin typeface="Consolas" panose="020B0609020204030204" pitchFamily="49" charset="0"/>
-                <a:cs typeface="Consolas" panose="020B0609020204030204" pitchFamily="49" charset="0"/>
-              </a:rPr>
-            </a:br>
-            <a:r>
-              <a:rPr lang="en-US" dirty="0">
-                <a:latin typeface="Consolas" panose="020B0609020204030204" pitchFamily="49" charset="0"/>
-                <a:cs typeface="Consolas" panose="020B0609020204030204" pitchFamily="49" charset="0"/>
-              </a:rPr>
-              <a:t>       result =  []</a:t>
-            </a:r>
-            <a:br>
-              <a:rPr lang="en-US" dirty="0">
-                <a:latin typeface="Consolas" panose="020B0609020204030204" pitchFamily="49" charset="0"/>
-                <a:cs typeface="Consolas" panose="020B0609020204030204" pitchFamily="49" charset="0"/>
-              </a:rPr>
-            </a:br>
-            <a:r>
-              <a:rPr lang="en-US" dirty="0">
-                <a:latin typeface="Consolas" panose="020B0609020204030204" pitchFamily="49" charset="0"/>
-                <a:cs typeface="Consolas" panose="020B0609020204030204" pitchFamily="49" charset="0"/>
-              </a:rPr>
-              <a:t>       unsorted = </a:t>
-            </a:r>
-            <a:r>
-              <a:rPr lang="en-US" dirty="0" err="1">
-                <a:latin typeface="Consolas" panose="020B0609020204030204" pitchFamily="49" charset="0"/>
-                <a:cs typeface="Consolas" panose="020B0609020204030204" pitchFamily="49" charset="0"/>
-              </a:rPr>
-              <a:t>unsorted.copy</a:t>
-            </a:r>
-            <a:r>
-              <a:rPr lang="en-US" dirty="0">
-                <a:latin typeface="Consolas" panose="020B0609020204030204" pitchFamily="49" charset="0"/>
-                <a:cs typeface="Consolas" panose="020B0609020204030204" pitchFamily="49" charset="0"/>
-              </a:rPr>
-              <a:t>()</a:t>
-            </a:r>
-            <a:br>
-              <a:rPr lang="en-US" dirty="0">
-                <a:latin typeface="Consolas" panose="020B0609020204030204" pitchFamily="49" charset="0"/>
-                <a:cs typeface="Consolas" panose="020B0609020204030204" pitchFamily="49" charset="0"/>
-              </a:rPr>
-            </a:br>
-            <a:r>
-              <a:rPr lang="en-US" dirty="0">
-                <a:latin typeface="Consolas" panose="020B0609020204030204" pitchFamily="49" charset="0"/>
-                <a:cs typeface="Consolas" panose="020B0609020204030204" pitchFamily="49" charset="0"/>
-              </a:rPr>
-              <a:t>    </a:t>
-            </a:r>
-            <a:r>
-              <a:rPr lang="en-US" dirty="0">
-                <a:solidFill>
-                  <a:srgbClr val="CC7832"/>
-                </a:solidFill>
-                <a:effectLst/>
-                <a:latin typeface="Consolas" panose="020B0609020204030204" pitchFamily="49" charset="0"/>
-                <a:cs typeface="Consolas" panose="020B0609020204030204" pitchFamily="49" charset="0"/>
-              </a:rPr>
-              <a:t>if </a:t>
-            </a:r>
-            <a:r>
-              <a:rPr lang="en-US" dirty="0" err="1">
-                <a:solidFill>
-                  <a:srgbClr val="8888C6"/>
-                </a:solidFill>
-                <a:effectLst/>
-                <a:latin typeface="Consolas" panose="020B0609020204030204" pitchFamily="49" charset="0"/>
-                <a:cs typeface="Consolas" panose="020B0609020204030204" pitchFamily="49" charset="0"/>
-              </a:rPr>
-              <a:t>len</a:t>
-            </a:r>
-            <a:r>
-              <a:rPr lang="en-US" dirty="0">
-                <a:latin typeface="Consolas" panose="020B0609020204030204" pitchFamily="49" charset="0"/>
-                <a:cs typeface="Consolas" panose="020B0609020204030204" pitchFamily="49" charset="0"/>
-              </a:rPr>
-              <a:t>(unsorted) &lt; </a:t>
-            </a:r>
-            <a:r>
-              <a:rPr lang="en-US" dirty="0">
-                <a:solidFill>
-                  <a:srgbClr val="6897BB"/>
-                </a:solidFill>
-                <a:effectLst/>
-                <a:latin typeface="Consolas" panose="020B0609020204030204" pitchFamily="49" charset="0"/>
-                <a:cs typeface="Consolas" panose="020B0609020204030204" pitchFamily="49" charset="0"/>
-              </a:rPr>
-              <a:t>1</a:t>
-            </a:r>
-            <a:r>
-              <a:rPr lang="en-US" dirty="0">
-                <a:latin typeface="Consolas" panose="020B0609020204030204" pitchFamily="49" charset="0"/>
-                <a:cs typeface="Consolas" panose="020B0609020204030204" pitchFamily="49" charset="0"/>
-              </a:rPr>
-              <a:t>:</a:t>
-            </a:r>
-            <a:br>
-              <a:rPr lang="en-US" dirty="0">
-                <a:latin typeface="Consolas" panose="020B0609020204030204" pitchFamily="49" charset="0"/>
-                <a:cs typeface="Consolas" panose="020B0609020204030204" pitchFamily="49" charset="0"/>
-              </a:rPr>
-            </a:br>
-            <a:r>
-              <a:rPr lang="en-US" dirty="0">
-                <a:latin typeface="Consolas" panose="020B0609020204030204" pitchFamily="49" charset="0"/>
-                <a:cs typeface="Consolas" panose="020B0609020204030204" pitchFamily="49" charset="0"/>
-              </a:rPr>
-              <a:t>        </a:t>
-            </a:r>
-            <a:r>
-              <a:rPr lang="en-US" dirty="0">
-                <a:solidFill>
-                  <a:srgbClr val="CC7832"/>
-                </a:solidFill>
-                <a:effectLst/>
-                <a:latin typeface="Consolas" panose="020B0609020204030204" pitchFamily="49" charset="0"/>
-                <a:cs typeface="Consolas" panose="020B0609020204030204" pitchFamily="49" charset="0"/>
-              </a:rPr>
-              <a:t>return </a:t>
-            </a:r>
-            <a:r>
-              <a:rPr lang="en-US" dirty="0">
-                <a:latin typeface="Consolas" panose="020B0609020204030204" pitchFamily="49" charset="0"/>
-                <a:cs typeface="Consolas" panose="020B0609020204030204" pitchFamily="49" charset="0"/>
-              </a:rPr>
-              <a:t>result</a:t>
-            </a:r>
-            <a:br>
-              <a:rPr lang="en-US" dirty="0">
-                <a:latin typeface="Consolas" panose="020B0609020204030204" pitchFamily="49" charset="0"/>
-                <a:cs typeface="Consolas" panose="020B0609020204030204" pitchFamily="49" charset="0"/>
-              </a:rPr>
-            </a:br>
-            <a:r>
-              <a:rPr lang="en-US" dirty="0">
-                <a:latin typeface="Consolas" panose="020B0609020204030204" pitchFamily="49" charset="0"/>
-                <a:cs typeface="Consolas" panose="020B0609020204030204" pitchFamily="49" charset="0"/>
-              </a:rPr>
-              <a:t>    </a:t>
-            </a:r>
-            <a:r>
-              <a:rPr lang="en-US" dirty="0" err="1">
-                <a:latin typeface="Consolas" panose="020B0609020204030204" pitchFamily="49" charset="0"/>
-                <a:cs typeface="Consolas" panose="020B0609020204030204" pitchFamily="49" charset="0"/>
-              </a:rPr>
-              <a:t>val</a:t>
-            </a:r>
-            <a:r>
-              <a:rPr lang="en-US" dirty="0">
-                <a:latin typeface="Consolas" panose="020B0609020204030204" pitchFamily="49" charset="0"/>
-                <a:cs typeface="Consolas" panose="020B0609020204030204" pitchFamily="49" charset="0"/>
-              </a:rPr>
-              <a:t> = sorter(unsorted)</a:t>
-            </a:r>
-            <a:br>
-              <a:rPr lang="en-US" dirty="0">
-                <a:latin typeface="Consolas" panose="020B0609020204030204" pitchFamily="49" charset="0"/>
-                <a:cs typeface="Consolas" panose="020B0609020204030204" pitchFamily="49" charset="0"/>
-              </a:rPr>
-            </a:br>
-            <a:r>
-              <a:rPr lang="en-US" dirty="0">
-                <a:latin typeface="Consolas" panose="020B0609020204030204" pitchFamily="49" charset="0"/>
-                <a:cs typeface="Consolas" panose="020B0609020204030204" pitchFamily="49" charset="0"/>
-              </a:rPr>
-              <a:t>    </a:t>
-            </a:r>
-            <a:r>
-              <a:rPr lang="en-US" dirty="0" err="1">
-                <a:latin typeface="Consolas" panose="020B0609020204030204" pitchFamily="49" charset="0"/>
-                <a:cs typeface="Consolas" panose="020B0609020204030204" pitchFamily="49" charset="0"/>
-              </a:rPr>
-              <a:t>result.append</a:t>
-            </a:r>
-            <a:r>
-              <a:rPr lang="en-US" dirty="0">
-                <a:latin typeface="Consolas" panose="020B0609020204030204" pitchFamily="49" charset="0"/>
-                <a:cs typeface="Consolas" panose="020B0609020204030204" pitchFamily="49" charset="0"/>
-              </a:rPr>
-              <a:t>(</a:t>
-            </a:r>
-            <a:r>
-              <a:rPr lang="en-US" dirty="0" err="1">
-                <a:latin typeface="Consolas" panose="020B0609020204030204" pitchFamily="49" charset="0"/>
-                <a:cs typeface="Consolas" panose="020B0609020204030204" pitchFamily="49" charset="0"/>
-              </a:rPr>
-              <a:t>val</a:t>
-            </a:r>
-            <a:r>
-              <a:rPr lang="en-US" dirty="0">
-                <a:latin typeface="Consolas" panose="020B0609020204030204" pitchFamily="49" charset="0"/>
-                <a:cs typeface="Consolas" panose="020B0609020204030204" pitchFamily="49" charset="0"/>
-              </a:rPr>
-              <a:t>)</a:t>
-            </a:r>
-            <a:br>
-              <a:rPr lang="en-US" dirty="0">
-                <a:latin typeface="Consolas" panose="020B0609020204030204" pitchFamily="49" charset="0"/>
-                <a:cs typeface="Consolas" panose="020B0609020204030204" pitchFamily="49" charset="0"/>
-              </a:rPr>
-            </a:br>
-            <a:r>
-              <a:rPr lang="en-US" dirty="0">
-                <a:latin typeface="Consolas" panose="020B0609020204030204" pitchFamily="49" charset="0"/>
-                <a:cs typeface="Consolas" panose="020B0609020204030204" pitchFamily="49" charset="0"/>
-              </a:rPr>
-              <a:t>    </a:t>
-            </a:r>
-            <a:r>
-              <a:rPr lang="en-US" dirty="0" err="1">
-                <a:latin typeface="Consolas" panose="020B0609020204030204" pitchFamily="49" charset="0"/>
-                <a:cs typeface="Consolas" panose="020B0609020204030204" pitchFamily="49" charset="0"/>
-              </a:rPr>
-              <a:t>unsorted.remove</a:t>
-            </a:r>
-            <a:r>
-              <a:rPr lang="en-US" dirty="0">
-                <a:latin typeface="Consolas" panose="020B0609020204030204" pitchFamily="49" charset="0"/>
-                <a:cs typeface="Consolas" panose="020B0609020204030204" pitchFamily="49" charset="0"/>
-              </a:rPr>
-              <a:t>(</a:t>
-            </a:r>
-            <a:r>
-              <a:rPr lang="en-US" dirty="0" err="1">
-                <a:latin typeface="Consolas" panose="020B0609020204030204" pitchFamily="49" charset="0"/>
-                <a:cs typeface="Consolas" panose="020B0609020204030204" pitchFamily="49" charset="0"/>
-              </a:rPr>
-              <a:t>val</a:t>
-            </a:r>
-            <a:r>
-              <a:rPr lang="en-US" dirty="0">
-                <a:latin typeface="Consolas" panose="020B0609020204030204" pitchFamily="49" charset="0"/>
-                <a:cs typeface="Consolas" panose="020B0609020204030204" pitchFamily="49" charset="0"/>
-              </a:rPr>
-              <a:t>)</a:t>
-            </a:r>
-            <a:br>
-              <a:rPr lang="en-US" dirty="0">
-                <a:latin typeface="Consolas" panose="020B0609020204030204" pitchFamily="49" charset="0"/>
-                <a:cs typeface="Consolas" panose="020B0609020204030204" pitchFamily="49" charset="0"/>
-              </a:rPr>
-            </a:br>
-            <a:r>
-              <a:rPr lang="en-US" dirty="0">
-                <a:latin typeface="Consolas" panose="020B0609020204030204" pitchFamily="49" charset="0"/>
-                <a:cs typeface="Consolas" panose="020B0609020204030204" pitchFamily="49" charset="0"/>
-              </a:rPr>
-              <a:t>    </a:t>
-            </a:r>
-            <a:r>
-              <a:rPr lang="en-US" dirty="0">
-                <a:solidFill>
-                  <a:srgbClr val="CC7832"/>
-                </a:solidFill>
-                <a:effectLst/>
-                <a:latin typeface="Consolas" panose="020B0609020204030204" pitchFamily="49" charset="0"/>
-                <a:cs typeface="Consolas" panose="020B0609020204030204" pitchFamily="49" charset="0"/>
-              </a:rPr>
-              <a:t>return </a:t>
-            </a:r>
-            <a:r>
-              <a:rPr lang="en-US" dirty="0" err="1">
-                <a:latin typeface="Consolas" panose="020B0609020204030204" pitchFamily="49" charset="0"/>
-                <a:cs typeface="Consolas" panose="020B0609020204030204" pitchFamily="49" charset="0"/>
-              </a:rPr>
-              <a:t>sort_list</a:t>
-            </a:r>
-            <a:r>
-              <a:rPr lang="en-US" dirty="0">
-                <a:latin typeface="Consolas" panose="020B0609020204030204" pitchFamily="49" charset="0"/>
-                <a:cs typeface="Consolas" panose="020B0609020204030204" pitchFamily="49" charset="0"/>
-              </a:rPr>
-              <a:t>(unsorted</a:t>
-            </a:r>
-            <a:r>
-              <a:rPr lang="en-US" dirty="0">
-                <a:solidFill>
-                  <a:srgbClr val="CC7832"/>
-                </a:solidFill>
-                <a:effectLst/>
-                <a:latin typeface="Consolas" panose="020B0609020204030204" pitchFamily="49" charset="0"/>
-                <a:cs typeface="Consolas" panose="020B0609020204030204" pitchFamily="49" charset="0"/>
-              </a:rPr>
-              <a:t>, </a:t>
-            </a:r>
-            <a:r>
-              <a:rPr lang="en-US" dirty="0">
-                <a:solidFill>
-                  <a:srgbClr val="AA4926"/>
-                </a:solidFill>
-                <a:effectLst/>
-                <a:latin typeface="Consolas" panose="020B0609020204030204" pitchFamily="49" charset="0"/>
-                <a:cs typeface="Consolas" panose="020B0609020204030204" pitchFamily="49" charset="0"/>
-              </a:rPr>
-              <a:t>result</a:t>
-            </a:r>
-            <a:r>
-              <a:rPr lang="en-US" dirty="0">
-                <a:latin typeface="Consolas" panose="020B0609020204030204" pitchFamily="49" charset="0"/>
-                <a:cs typeface="Consolas" panose="020B0609020204030204" pitchFamily="49" charset="0"/>
-              </a:rPr>
-              <a:t>=result</a:t>
-            </a:r>
-            <a:r>
-              <a:rPr lang="en-US" dirty="0">
-                <a:solidFill>
-                  <a:srgbClr val="CC7832"/>
-                </a:solidFill>
-                <a:effectLst/>
-                <a:latin typeface="Consolas" panose="020B0609020204030204" pitchFamily="49" charset="0"/>
-                <a:cs typeface="Consolas" panose="020B0609020204030204" pitchFamily="49" charset="0"/>
-              </a:rPr>
-              <a:t>, </a:t>
-            </a:r>
-            <a:r>
-              <a:rPr lang="en-US" dirty="0">
-                <a:solidFill>
-                  <a:srgbClr val="AA4926"/>
-                </a:solidFill>
-                <a:effectLst/>
-                <a:latin typeface="Consolas" panose="020B0609020204030204" pitchFamily="49" charset="0"/>
-                <a:cs typeface="Consolas" panose="020B0609020204030204" pitchFamily="49" charset="0"/>
-              </a:rPr>
-              <a:t>sorter</a:t>
-            </a:r>
-            <a:r>
-              <a:rPr lang="en-US" dirty="0">
-                <a:latin typeface="Consolas" panose="020B0609020204030204" pitchFamily="49" charset="0"/>
-                <a:cs typeface="Consolas" panose="020B0609020204030204" pitchFamily="49" charset="0"/>
-              </a:rPr>
-              <a:t>=sorter)</a:t>
-            </a:r>
-            <a:br>
-              <a:rPr lang="en-US" dirty="0">
+              <a:rPr lang="en-US" sz="1800" dirty="0">
                 <a:latin typeface="Consolas" panose="020B0609020204030204" pitchFamily="49" charset="0"/>
                 <a:cs typeface="Consolas" panose="020B0609020204030204" pitchFamily="49" charset="0"/>
               </a:rPr>
             </a:br>
             <a:br>
-              <a:rPr lang="en-US" dirty="0">
+              <a:rPr lang="en-US" sz="1800" dirty="0">
                 <a:latin typeface="Consolas" panose="020B0609020204030204" pitchFamily="49" charset="0"/>
                 <a:cs typeface="Consolas" panose="020B0609020204030204" pitchFamily="49" charset="0"/>
               </a:rPr>
             </a:br>
             <a:r>
-              <a:rPr lang="en-US" dirty="0" err="1">
-                <a:latin typeface="Consolas" panose="020B0609020204030204" pitchFamily="49" charset="0"/>
-                <a:cs typeface="Consolas" panose="020B0609020204030204" pitchFamily="49" charset="0"/>
-              </a:rPr>
-              <a:t>zelda_lst</a:t>
-            </a:r>
-            <a:r>
-              <a:rPr lang="en-US" dirty="0">
-                <a:latin typeface="Consolas" panose="020B0609020204030204" pitchFamily="49" charset="0"/>
-                <a:cs typeface="Consolas" panose="020B0609020204030204" pitchFamily="49" charset="0"/>
-              </a:rPr>
-              <a:t> =  [</a:t>
-            </a:r>
-            <a:r>
-              <a:rPr lang="en-US" dirty="0">
+              <a:rPr lang="en-US" sz="1800" dirty="0" err="1">
+                <a:latin typeface="Consolas" panose="020B0609020204030204" pitchFamily="49" charset="0"/>
+                <a:cs typeface="Consolas" panose="020B0609020204030204" pitchFamily="49" charset="0"/>
+              </a:rPr>
+              <a:t>print_hello</a:t>
+            </a:r>
+            <a:r>
+              <a:rPr lang="en-US" sz="1800" dirty="0">
+                <a:latin typeface="Consolas" panose="020B0609020204030204" pitchFamily="49" charset="0"/>
+                <a:cs typeface="Consolas" panose="020B0609020204030204" pitchFamily="49" charset="0"/>
+              </a:rPr>
+              <a:t>(</a:t>
+            </a:r>
+            <a:r>
+              <a:rPr lang="en-US" sz="1800" dirty="0">
                 <a:solidFill>
                   <a:srgbClr val="6A8759"/>
                 </a:solidFill>
@@ -10949,10 +11430,10 @@
                 <a:latin typeface="Consolas" panose="020B0609020204030204" pitchFamily="49" charset="0"/>
                 <a:cs typeface="Consolas" panose="020B0609020204030204" pitchFamily="49" charset="0"/>
               </a:rPr>
-              <a:t>"Princess Zelda"</a:t>
-            </a:r>
-            <a:r>
-              <a:rPr lang="en-US" dirty="0">
+              <a:t>"Hook"</a:t>
+            </a:r>
+            <a:r>
+              <a:rPr lang="en-US" sz="1800" dirty="0">
                 <a:solidFill>
                   <a:srgbClr val="CC7832"/>
                 </a:solidFill>
@@ -10960,10 +11441,32 @@
                 <a:latin typeface="Consolas" panose="020B0609020204030204" pitchFamily="49" charset="0"/>
                 <a:cs typeface="Consolas" panose="020B0609020204030204" pitchFamily="49" charset="0"/>
               </a:rPr>
+              <a:t>,  </a:t>
+            </a:r>
+            <a:r>
+              <a:rPr lang="en-US" sz="1800" dirty="0">
+                <a:solidFill>
+                  <a:srgbClr val="6A8759"/>
+                </a:solidFill>
+                <a:effectLst/>
+                <a:latin typeface="Consolas" panose="020B0609020204030204" pitchFamily="49" charset="0"/>
+                <a:cs typeface="Consolas" panose="020B0609020204030204" pitchFamily="49" charset="0"/>
+              </a:rPr>
+              <a:t>"Wendy"</a:t>
+            </a:r>
+            <a:r>
+              <a:rPr lang="en-US" sz="1800" dirty="0">
+                <a:solidFill>
+                  <a:srgbClr val="CC7832"/>
+                </a:solidFill>
+                <a:effectLst/>
+                <a:latin typeface="Consolas" panose="020B0609020204030204" pitchFamily="49" charset="0"/>
+                <a:cs typeface="Consolas" panose="020B0609020204030204" pitchFamily="49" charset="0"/>
+              </a:rPr>
               <a:t>, </a:t>
             </a:r>
             <a:r>
-              <a:rPr lang="en-US" dirty="0">
+              <a:rPr lang="en-US" sz="1800" dirty="0">
                 <a:solidFill>
                   <a:srgbClr val="6A8759"/>
                 </a:solidFill>
@@ -10971,10 +11474,21 @@
                 <a:latin typeface="Consolas" panose="020B0609020204030204" pitchFamily="49" charset="0"/>
                 <a:cs typeface="Consolas" panose="020B0609020204030204" pitchFamily="49" charset="0"/>
               </a:rPr>
-              <a:t>"</a:t>
-            </a:r>
-            <a:r>
-              <a:rPr lang="en-US" dirty="0" err="1">
+              <a:t>"John"</a:t>
+            </a:r>
+            <a:r>
+              <a:rPr lang="en-US" sz="1800" dirty="0">
+                <a:solidFill>
+                  <a:srgbClr val="CC7832"/>
+                </a:solidFill>
+                <a:effectLst/>
+                <a:latin typeface="Consolas" panose="020B0609020204030204" pitchFamily="49" charset="0"/>
+                <a:cs typeface="Consolas" panose="020B0609020204030204" pitchFamily="49" charset="0"/>
+              </a:rPr>
+              <a:t>, </a:t>
+            </a:r>
+            <a:r>
+              <a:rPr lang="en-US" sz="1800" dirty="0">
                 <a:solidFill>
                   <a:srgbClr val="6A8759"/>
                 </a:solidFill>
@@ -10982,408 +11496,60 @@
                 <a:latin typeface="Consolas" panose="020B0609020204030204" pitchFamily="49" charset="0"/>
                 <a:cs typeface="Consolas" panose="020B0609020204030204" pitchFamily="49" charset="0"/>
               </a:rPr>
-              <a:t>Ganon</a:t>
-            </a:r>
-            <a:r>
-              <a:rPr lang="en-US" dirty="0">
-                <a:solidFill>
-                  <a:srgbClr val="6A8759"/>
+              <a:t>"Peter"</a:t>
+            </a:r>
+            <a:r>
+              <a:rPr lang="en-US" sz="1800" dirty="0">
+                <a:latin typeface="Consolas" panose="020B0609020204030204" pitchFamily="49" charset="0"/>
+                <a:cs typeface="Consolas" panose="020B0609020204030204" pitchFamily="49" charset="0"/>
+              </a:rPr>
+              <a:t>) </a:t>
+            </a:r>
+            <a:r>
+              <a:rPr lang="en-US" sz="1800" dirty="0">
+                <a:solidFill>
+                  <a:srgbClr val="808080"/>
                 </a:solidFill>
                 <a:effectLst/>
                 <a:latin typeface="Consolas" panose="020B0609020204030204" pitchFamily="49" charset="0"/>
                 <a:cs typeface="Consolas" panose="020B0609020204030204" pitchFamily="49" charset="0"/>
               </a:rPr>
-              <a:t>"</a:t>
-            </a:r>
-            <a:r>
-              <a:rPr lang="en-US" dirty="0">
-                <a:solidFill>
-                  <a:srgbClr val="CC7832"/>
+              <a:t># Hello Hook, Hello John, Hello Peter, Hello Wendy,</a:t>
+            </a:r>
+            <a:br>
+              <a:rPr lang="en-US" sz="1800" dirty="0">
+                <a:solidFill>
+                  <a:srgbClr val="808080"/>
                 </a:solidFill>
                 <a:effectLst/>
                 <a:latin typeface="Consolas" panose="020B0609020204030204" pitchFamily="49" charset="0"/>
                 <a:cs typeface="Consolas" panose="020B0609020204030204" pitchFamily="49" charset="0"/>
               </a:rPr>
-              <a:t>, </a:t>
-            </a:r>
-            <a:r>
-              <a:rPr lang="en-US" dirty="0">
-                <a:solidFill>
-                  <a:srgbClr val="6A8759"/>
-                </a:solidFill>
-                <a:effectLst/>
-                <a:latin typeface="Consolas" panose="020B0609020204030204" pitchFamily="49" charset="0"/>
-                <a:cs typeface="Consolas" panose="020B0609020204030204" pitchFamily="49" charset="0"/>
-              </a:rPr>
-              <a:t>"Link"</a:t>
-            </a:r>
-            <a:r>
-              <a:rPr lang="en-US" dirty="0">
-                <a:solidFill>
-                  <a:srgbClr val="CC7832"/>
-                </a:solidFill>
-                <a:effectLst/>
-                <a:latin typeface="Consolas" panose="020B0609020204030204" pitchFamily="49" charset="0"/>
-                <a:cs typeface="Consolas" panose="020B0609020204030204" pitchFamily="49" charset="0"/>
-              </a:rPr>
-              <a:t>, </a:t>
-            </a:r>
-            <a:r>
-              <a:rPr lang="en-US" dirty="0">
-                <a:solidFill>
-                  <a:srgbClr val="6A8759"/>
-                </a:solidFill>
-                <a:effectLst/>
-                <a:latin typeface="Consolas" panose="020B0609020204030204" pitchFamily="49" charset="0"/>
-                <a:cs typeface="Consolas" panose="020B0609020204030204" pitchFamily="49" charset="0"/>
-              </a:rPr>
-              <a:t>"</a:t>
-            </a:r>
-            <a:r>
-              <a:rPr lang="en-US" dirty="0" err="1">
-                <a:solidFill>
-                  <a:srgbClr val="6A8759"/>
-                </a:solidFill>
-                <a:effectLst/>
-                <a:latin typeface="Consolas" panose="020B0609020204030204" pitchFamily="49" charset="0"/>
-                <a:cs typeface="Consolas" panose="020B0609020204030204" pitchFamily="49" charset="0"/>
-              </a:rPr>
-              <a:t>Impa</a:t>
-            </a:r>
-            <a:r>
-              <a:rPr lang="en-US" dirty="0">
-                <a:solidFill>
-                  <a:srgbClr val="6A8759"/>
-                </a:solidFill>
-                <a:effectLst/>
-                <a:latin typeface="Consolas" panose="020B0609020204030204" pitchFamily="49" charset="0"/>
-                <a:cs typeface="Consolas" panose="020B0609020204030204" pitchFamily="49" charset="0"/>
-              </a:rPr>
-              <a:t>"</a:t>
-            </a:r>
-            <a:r>
-              <a:rPr lang="en-US" dirty="0">
-                <a:solidFill>
-                  <a:srgbClr val="CC7832"/>
-                </a:solidFill>
-                <a:effectLst/>
-                <a:latin typeface="Consolas" panose="020B0609020204030204" pitchFamily="49" charset="0"/>
-                <a:cs typeface="Consolas" panose="020B0609020204030204" pitchFamily="49" charset="0"/>
-              </a:rPr>
-              <a:t>, </a:t>
-            </a:r>
-            <a:r>
-              <a:rPr lang="en-US" dirty="0">
-                <a:solidFill>
-                  <a:srgbClr val="6A8759"/>
-                </a:solidFill>
-                <a:effectLst/>
-                <a:latin typeface="Consolas" panose="020B0609020204030204" pitchFamily="49" charset="0"/>
-                <a:cs typeface="Consolas" panose="020B0609020204030204" pitchFamily="49" charset="0"/>
-              </a:rPr>
-              <a:t>"</a:t>
-            </a:r>
-            <a:r>
-              <a:rPr lang="en-US" dirty="0" err="1">
-                <a:solidFill>
-                  <a:srgbClr val="6A8759"/>
-                </a:solidFill>
-                <a:effectLst/>
-                <a:latin typeface="Consolas" panose="020B0609020204030204" pitchFamily="49" charset="0"/>
-                <a:cs typeface="Consolas" panose="020B0609020204030204" pitchFamily="49" charset="0"/>
-              </a:rPr>
-              <a:t>Epona</a:t>
-            </a:r>
-            <a:r>
-              <a:rPr lang="en-US" dirty="0">
-                <a:solidFill>
-                  <a:srgbClr val="6A8759"/>
-                </a:solidFill>
-                <a:effectLst/>
-                <a:latin typeface="Consolas" panose="020B0609020204030204" pitchFamily="49" charset="0"/>
-                <a:cs typeface="Consolas" panose="020B0609020204030204" pitchFamily="49" charset="0"/>
-              </a:rPr>
-              <a:t>"</a:t>
-            </a:r>
-            <a:r>
-              <a:rPr lang="en-US" dirty="0">
-                <a:latin typeface="Consolas" panose="020B0609020204030204" pitchFamily="49" charset="0"/>
-                <a:cs typeface="Consolas" panose="020B0609020204030204" pitchFamily="49" charset="0"/>
-              </a:rPr>
-              <a:t>]</a:t>
-            </a:r>
-            <a:br>
-              <a:rPr lang="en-US" dirty="0">
-                <a:latin typeface="Consolas" panose="020B0609020204030204" pitchFamily="49" charset="0"/>
-                <a:cs typeface="Consolas" panose="020B0609020204030204" pitchFamily="49" charset="0"/>
-              </a:rPr>
             </a:br>
-            <a:r>
-              <a:rPr lang="en-US" dirty="0">
-                <a:solidFill>
-                  <a:srgbClr val="8888C6"/>
-                </a:solidFill>
-                <a:effectLst/>
-                <a:latin typeface="Consolas" panose="020B0609020204030204" pitchFamily="49" charset="0"/>
-                <a:cs typeface="Consolas" panose="020B0609020204030204" pitchFamily="49" charset="0"/>
-              </a:rPr>
-              <a:t>print</a:t>
-            </a:r>
-            <a:r>
-              <a:rPr lang="en-US" dirty="0">
-                <a:latin typeface="Consolas" panose="020B0609020204030204" pitchFamily="49" charset="0"/>
-                <a:cs typeface="Consolas" panose="020B0609020204030204" pitchFamily="49" charset="0"/>
-              </a:rPr>
-              <a:t>(</a:t>
-            </a:r>
-            <a:r>
-              <a:rPr lang="en-US" dirty="0" err="1">
-                <a:latin typeface="Consolas" panose="020B0609020204030204" pitchFamily="49" charset="0"/>
-                <a:cs typeface="Consolas" panose="020B0609020204030204" pitchFamily="49" charset="0"/>
-              </a:rPr>
-              <a:t>sort_list</a:t>
-            </a:r>
-            <a:r>
-              <a:rPr lang="en-US" dirty="0">
-                <a:latin typeface="Consolas" panose="020B0609020204030204" pitchFamily="49" charset="0"/>
-                <a:cs typeface="Consolas" panose="020B0609020204030204" pitchFamily="49" charset="0"/>
-              </a:rPr>
-              <a:t>(</a:t>
-            </a:r>
-            <a:r>
-              <a:rPr lang="en-US" dirty="0" err="1">
-                <a:latin typeface="Consolas" panose="020B0609020204030204" pitchFamily="49" charset="0"/>
-                <a:cs typeface="Consolas" panose="020B0609020204030204" pitchFamily="49" charset="0"/>
-              </a:rPr>
-              <a:t>zelda_lst</a:t>
-            </a:r>
-            <a:r>
-              <a:rPr lang="en-US" dirty="0">
-                <a:latin typeface="Consolas" panose="020B0609020204030204" pitchFamily="49" charset="0"/>
-                <a:cs typeface="Consolas" panose="020B0609020204030204" pitchFamily="49" charset="0"/>
-              </a:rPr>
-              <a:t>))</a:t>
-            </a:r>
-            <a:br>
-              <a:rPr lang="en-US" dirty="0">
-                <a:latin typeface="Consolas" panose="020B0609020204030204" pitchFamily="49" charset="0"/>
-                <a:cs typeface="Consolas" panose="020B0609020204030204" pitchFamily="49" charset="0"/>
-              </a:rPr>
-            </a:br>
-            <a:r>
-              <a:rPr lang="en-US" dirty="0">
-                <a:solidFill>
-                  <a:srgbClr val="8888C6"/>
-                </a:solidFill>
-                <a:effectLst/>
-                <a:latin typeface="Consolas" panose="020B0609020204030204" pitchFamily="49" charset="0"/>
-                <a:cs typeface="Consolas" panose="020B0609020204030204" pitchFamily="49" charset="0"/>
-              </a:rPr>
-              <a:t>print</a:t>
-            </a:r>
-            <a:r>
-              <a:rPr lang="en-US" dirty="0">
-                <a:latin typeface="Consolas" panose="020B0609020204030204" pitchFamily="49" charset="0"/>
-                <a:cs typeface="Consolas" panose="020B0609020204030204" pitchFamily="49" charset="0"/>
-              </a:rPr>
-              <a:t>(</a:t>
-            </a:r>
-            <a:r>
-              <a:rPr lang="en-US" dirty="0" err="1">
-                <a:latin typeface="Consolas" panose="020B0609020204030204" pitchFamily="49" charset="0"/>
-                <a:cs typeface="Consolas" panose="020B0609020204030204" pitchFamily="49" charset="0"/>
-              </a:rPr>
-              <a:t>sort_list</a:t>
-            </a:r>
-            <a:r>
-              <a:rPr lang="en-US" dirty="0">
-                <a:latin typeface="Consolas" panose="020B0609020204030204" pitchFamily="49" charset="0"/>
-                <a:cs typeface="Consolas" panose="020B0609020204030204" pitchFamily="49" charset="0"/>
-              </a:rPr>
-              <a:t>(</a:t>
-            </a:r>
-            <a:r>
-              <a:rPr lang="en-US" dirty="0" err="1">
-                <a:latin typeface="Consolas" panose="020B0609020204030204" pitchFamily="49" charset="0"/>
-                <a:cs typeface="Consolas" panose="020B0609020204030204" pitchFamily="49" charset="0"/>
-              </a:rPr>
-              <a:t>zelda_lst</a:t>
-            </a:r>
-            <a:r>
-              <a:rPr lang="en-US" dirty="0">
-                <a:solidFill>
-                  <a:srgbClr val="CC7832"/>
-                </a:solidFill>
-                <a:effectLst/>
-                <a:latin typeface="Consolas" panose="020B0609020204030204" pitchFamily="49" charset="0"/>
-                <a:cs typeface="Consolas" panose="020B0609020204030204" pitchFamily="49" charset="0"/>
-              </a:rPr>
-              <a:t>, </a:t>
-            </a:r>
-            <a:r>
-              <a:rPr lang="en-US" dirty="0">
-                <a:solidFill>
-                  <a:srgbClr val="AA4926"/>
-                </a:solidFill>
-                <a:effectLst/>
-                <a:latin typeface="Consolas" panose="020B0609020204030204" pitchFamily="49" charset="0"/>
-                <a:cs typeface="Consolas" panose="020B0609020204030204" pitchFamily="49" charset="0"/>
-              </a:rPr>
-              <a:t>sorter</a:t>
-            </a:r>
-            <a:r>
-              <a:rPr lang="en-US" dirty="0">
-                <a:latin typeface="Consolas" panose="020B0609020204030204" pitchFamily="49" charset="0"/>
-                <a:cs typeface="Consolas" panose="020B0609020204030204" pitchFamily="49" charset="0"/>
-              </a:rPr>
-              <a:t>=</a:t>
-            </a:r>
-            <a:r>
-              <a:rPr lang="en-US" dirty="0">
-                <a:solidFill>
-                  <a:srgbClr val="8888C6"/>
-                </a:solidFill>
-                <a:effectLst/>
-                <a:latin typeface="Consolas" panose="020B0609020204030204" pitchFamily="49" charset="0"/>
-                <a:cs typeface="Consolas" panose="020B0609020204030204" pitchFamily="49" charset="0"/>
-              </a:rPr>
-              <a:t>min</a:t>
-            </a:r>
-            <a:r>
-              <a:rPr lang="en-US" dirty="0">
-                <a:latin typeface="Consolas" panose="020B0609020204030204" pitchFamily="49" charset="0"/>
-                <a:cs typeface="Consolas" panose="020B0609020204030204" pitchFamily="49" charset="0"/>
-              </a:rPr>
-              <a:t>))</a:t>
-            </a:r>
-          </a:p>
-        </p:txBody>
-      </p:sp>
-      <p:sp>
-        <p:nvSpPr>
-          <p:cNvPr id="4" name="Arrow: Left 3">
-            <a:extLst>
-              <a:ext uri="{FF2B5EF4-FFF2-40B4-BE49-F238E27FC236}">
-                <a16:creationId xmlns:a16="http://schemas.microsoft.com/office/drawing/2014/main" id="{11D89321-ECB3-43C1-BB95-A895F9EE2CB0}"/>
-              </a:ext>
-            </a:extLst>
-          </p:cNvPr>
-          <p:cNvSpPr/>
-          <p:nvPr/>
-        </p:nvSpPr>
-        <p:spPr>
-          <a:xfrm rot="20863037">
-            <a:off x="8302171" y="1206167"/>
-            <a:ext cx="2090058" cy="759409"/>
-          </a:xfrm>
-          <a:prstGeom prst="leftArrow">
-            <a:avLst/>
-          </a:prstGeom>
-          <a:ln/>
-        </p:spPr>
-        <p:style>
-          <a:lnRef idx="2">
-            <a:schemeClr val="accent1">
-              <a:shade val="50000"/>
-            </a:schemeClr>
-          </a:lnRef>
-          <a:fillRef idx="1">
-            <a:schemeClr val="accent1"/>
-          </a:fillRef>
-          <a:effectRef idx="0">
-            <a:schemeClr val="accent1"/>
-          </a:effectRef>
-          <a:fontRef idx="minor">
-            <a:schemeClr val="lt1"/>
-          </a:fontRef>
-        </p:style>
-        <p:txBody>
-          <a:bodyPr lIns="274320" tIns="182880" rIns="274320" bIns="182880" rtlCol="0" anchor="ctr"/>
-          <a:lstStyle/>
-          <a:p>
-            <a:pPr algn="ctr"/>
-            <a:r>
-              <a:rPr lang="en-US" dirty="0">
-                <a:latin typeface="Proxima Nova" charset="0"/>
-                <a:ea typeface="Proxima Nova" charset="0"/>
-                <a:cs typeface="Proxima Nova" charset="0"/>
-              </a:rPr>
-              <a:t>A function!</a:t>
-            </a:r>
-          </a:p>
-        </p:txBody>
-      </p:sp>
-      <p:sp>
-        <p:nvSpPr>
-          <p:cNvPr id="6" name="Arrow: Left 5">
-            <a:extLst>
-              <a:ext uri="{FF2B5EF4-FFF2-40B4-BE49-F238E27FC236}">
-                <a16:creationId xmlns:a16="http://schemas.microsoft.com/office/drawing/2014/main" id="{6D881435-BC92-48B3-9254-38F2590012D8}"/>
-              </a:ext>
-            </a:extLst>
-          </p:cNvPr>
-          <p:cNvSpPr/>
-          <p:nvPr/>
-        </p:nvSpPr>
-        <p:spPr>
-          <a:xfrm>
-            <a:off x="5217885" y="3682805"/>
-            <a:ext cx="3679371" cy="759409"/>
-          </a:xfrm>
-          <a:prstGeom prst="leftArrow">
-            <a:avLst/>
-          </a:prstGeom>
-          <a:ln/>
-        </p:spPr>
-        <p:style>
-          <a:lnRef idx="2">
-            <a:schemeClr val="accent1">
-              <a:shade val="50000"/>
-            </a:schemeClr>
-          </a:lnRef>
-          <a:fillRef idx="1">
-            <a:schemeClr val="accent1"/>
-          </a:fillRef>
-          <a:effectRef idx="0">
-            <a:schemeClr val="accent1"/>
-          </a:effectRef>
-          <a:fontRef idx="minor">
-            <a:schemeClr val="lt1"/>
-          </a:fontRef>
-        </p:style>
-        <p:txBody>
-          <a:bodyPr lIns="274320" tIns="182880" rIns="274320" bIns="182880" rtlCol="0" anchor="ctr"/>
-          <a:lstStyle/>
-          <a:p>
-            <a:pPr algn="ctr"/>
-            <a:r>
-              <a:rPr lang="en-US" dirty="0">
-                <a:latin typeface="Proxima Nova" charset="0"/>
-                <a:ea typeface="Proxima Nova" charset="0"/>
-                <a:cs typeface="Proxima Nova" charset="0"/>
-              </a:rPr>
-              <a:t>Use max by default!</a:t>
-            </a:r>
+            <a:endParaRPr lang="en-US" sz="1800" dirty="0">
+              <a:latin typeface="Consolas" panose="020B0609020204030204" pitchFamily="49" charset="0"/>
+              <a:cs typeface="Consolas" panose="020B0609020204030204" pitchFamily="49" charset="0"/>
+            </a:endParaRPr>
           </a:p>
         </p:txBody>
       </p:sp>
     </p:spTree>
     <p:extLst>
       <p:ext uri="{BB962C8B-B14F-4D97-AF65-F5344CB8AC3E}">
-        <p14:creationId xmlns:p14="http://schemas.microsoft.com/office/powerpoint/2010/main" val="3575658485"/>
+        <p14:creationId xmlns:p14="http://schemas.microsoft.com/office/powerpoint/2010/main" val="337554136"/>
       </p:ext>
     </p:extLst>
   </p:cSld>
   <p:clrMapOvr>
     <a:masterClrMapping/>
   </p:clrMapOvr>
-  <mc:AlternateContent xmlns:mc="http://schemas.openxmlformats.org/markup-compatibility/2006">
-    <mc:Choice xmlns:p14="http://schemas.microsoft.com/office/powerpoint/2010/main" Requires="p14">
+  <mc:AlternateContent xmlns:mc="http://schemas.openxmlformats.org/markup-compatibility/2006" xmlns:p14="http://schemas.microsoft.com/office/powerpoint/2010/main">
+    <mc:Choice Requires="p14">
       <p:transition p14:dur="300">
         <p:fade/>
       </p:transition>
     </mc:Choice>
-    <mc:Fallback>
+    <mc:Fallback xmlns="">
       <p:transition>
         <p:fade/>
       </p:transition>
@@ -11393,6 +11559,123 @@
 </file>
 
 <file path=ppt/slides/slide13.xml><?xml version="1.0" encoding="utf-8"?>
+<p:sld xmlns:a="http://schemas.openxmlformats.org/drawingml/2006/main" xmlns:r="http://schemas.openxmlformats.org/officeDocument/2006/relationships" xmlns:p="http://schemas.openxmlformats.org/presentationml/2006/main">
+  <p:cSld>
+    <p:spTree>
+      <p:nvGrpSpPr>
+        <p:cNvPr id="1" name=""/>
+        <p:cNvGrpSpPr/>
+        <p:nvPr/>
+      </p:nvGrpSpPr>
+      <p:grpSpPr>
+        <a:xfrm>
+          <a:off x="0" y="0"/>
+          <a:ext cx="0" cy="0"/>
+          <a:chOff x="0" y="0"/>
+          <a:chExt cx="0" cy="0"/>
+        </a:xfrm>
+      </p:grpSpPr>
+      <p:sp>
+        <p:nvSpPr>
+          <p:cNvPr id="2" name="Title 1">
+            <a:extLst>
+              <a:ext uri="{FF2B5EF4-FFF2-40B4-BE49-F238E27FC236}">
+                <a16:creationId xmlns:a16="http://schemas.microsoft.com/office/drawing/2014/main" id="{26D43957-0B1F-48F0-8CA0-5301448AA01C}"/>
+              </a:ext>
+            </a:extLst>
+          </p:cNvPr>
+          <p:cNvSpPr>
+            <a:spLocks noGrp="1"/>
+          </p:cNvSpPr>
+          <p:nvPr>
+            <p:ph type="title"/>
+          </p:nvPr>
+        </p:nvSpPr>
+        <p:spPr/>
+        <p:txBody>
+          <a:bodyPr/>
+          <a:lstStyle/>
+          <a:p>
+            <a:r>
+              <a:rPr lang="en-US" dirty="0"/>
+              <a:t>Needed?</a:t>
+            </a:r>
+          </a:p>
+        </p:txBody>
+      </p:sp>
+      <p:sp>
+        <p:nvSpPr>
+          <p:cNvPr id="3" name="Text Placeholder 2">
+            <a:extLst>
+              <a:ext uri="{FF2B5EF4-FFF2-40B4-BE49-F238E27FC236}">
+                <a16:creationId xmlns:a16="http://schemas.microsoft.com/office/drawing/2014/main" id="{E9D8D5A1-0800-4D47-AA60-DACDF6708A44}"/>
+              </a:ext>
+            </a:extLst>
+          </p:cNvPr>
+          <p:cNvSpPr>
+            <a:spLocks noGrp="1"/>
+          </p:cNvSpPr>
+          <p:nvPr>
+            <p:ph type="body" sz="quarter" idx="10"/>
+          </p:nvPr>
+        </p:nvSpPr>
+        <p:spPr>
+          <a:xfrm>
+            <a:off x="628075" y="1776683"/>
+            <a:ext cx="12561453" cy="1230145"/>
+          </a:xfrm>
+        </p:spPr>
+        <p:txBody>
+          <a:bodyPr/>
+          <a:lstStyle/>
+          <a:p>
+            <a:r>
+              <a:rPr lang="en-US" dirty="0"/>
+              <a:t>The function additions are not needed</a:t>
+            </a:r>
+          </a:p>
+          <a:p>
+            <a:pPr lvl="1"/>
+            <a:r>
+              <a:rPr lang="en-US" dirty="0"/>
+              <a:t>But they sure make life easier and more useful! </a:t>
+            </a:r>
+          </a:p>
+          <a:p>
+            <a:pPr lvl="1"/>
+            <a:r>
+              <a:rPr lang="en-US" dirty="0"/>
+              <a:t>Great to learn</a:t>
+            </a:r>
+          </a:p>
+        </p:txBody>
+      </p:sp>
+    </p:spTree>
+    <p:extLst>
+      <p:ext uri="{BB962C8B-B14F-4D97-AF65-F5344CB8AC3E}">
+        <p14:creationId xmlns:p14="http://schemas.microsoft.com/office/powerpoint/2010/main" val="3453721867"/>
+      </p:ext>
+    </p:extLst>
+  </p:cSld>
+  <p:clrMapOvr>
+    <a:masterClrMapping/>
+  </p:clrMapOvr>
+  <mc:AlternateContent xmlns:mc="http://schemas.openxmlformats.org/markup-compatibility/2006" xmlns:p14="http://schemas.microsoft.com/office/powerpoint/2010/main">
+    <mc:Choice Requires="p14">
+      <p:transition p14:dur="300">
+        <p:fade/>
+      </p:transition>
+    </mc:Choice>
+    <mc:Fallback xmlns="">
+      <p:transition>
+        <p:fade/>
+      </p:transition>
+    </mc:Fallback>
+  </mc:AlternateContent>
+</p:sld>
+</file>
+
+<file path=ppt/slides/slide14.xml><?xml version="1.0" encoding="utf-8"?>
 <p:sld xmlns:a="http://schemas.openxmlformats.org/drawingml/2006/main" xmlns:r="http://schemas.openxmlformats.org/officeDocument/2006/relationships" xmlns:p="http://schemas.openxmlformats.org/presentationml/2006/main" show="0">
   <p:cSld>
     <p:spTree>
@@ -12488,13 +12771,13 @@
   <p:clrMapOvr>
     <a:masterClrMapping/>
   </p:clrMapOvr>
-  <mc:AlternateContent xmlns:mc="http://schemas.openxmlformats.org/markup-compatibility/2006">
-    <mc:Choice xmlns:p14="http://schemas.microsoft.com/office/powerpoint/2010/main" Requires="p14">
+  <mc:AlternateContent xmlns:mc="http://schemas.openxmlformats.org/markup-compatibility/2006" xmlns:p14="http://schemas.microsoft.com/office/powerpoint/2010/main">
+    <mc:Choice Requires="p14">
       <p:transition p14:dur="300">
         <p:fade/>
       </p:transition>
     </mc:Choice>
-    <mc:Fallback>
+    <mc:Fallback xmlns="">
       <p:transition>
         <p:fade/>
       </p:transition>
@@ -13015,7 +13298,7 @@
           <a:lstStyle/>
           <a:p>
             <a:r>
-              <a:rPr lang="en"/>
+              <a:rPr lang="en" dirty="0"/>
               <a:t>Net Neutrality </a:t>
             </a:r>
             <a:endParaRPr dirty="0"/>
@@ -13086,7 +13369,7 @@
         </p:nvSpPr>
         <p:spPr>
           <a:xfrm>
-            <a:off x="628094" y="2334756"/>
+            <a:off x="628094" y="1942871"/>
             <a:ext cx="12561413" cy="4560987"/>
           </a:xfrm>
           <a:prstGeom prst="rect">
@@ -13117,9 +13400,9 @@
             </a:pPr>
             <a:r>
               <a:rPr lang="en" dirty="0"/>
-              <a:t>Type of traffic between sources</a:t>
-            </a:r>
-            <a:endParaRPr dirty="0"/>
+              <a:t>Type of traffic between sources </a:t>
+            </a:r>
+            <a:endParaRPr lang="fr-FR" dirty="0"/>
           </a:p>
           <a:p>
             <a:pPr lvl="2">
@@ -13129,14 +13412,30 @@
               <a:buChar char="■"/>
             </a:pPr>
             <a:r>
-              <a:rPr lang="en" dirty="0"/>
-              <a:t>Voice &gt; video &gt; games, </a:t>
-            </a:r>
-            <a:r>
-              <a:rPr lang="en" dirty="0" err="1"/>
+              <a:rPr lang="fr-FR" dirty="0"/>
+              <a:t>Voice &gt; </a:t>
+            </a:r>
+            <a:r>
+              <a:rPr lang="fr-FR" dirty="0" err="1"/>
+              <a:t>video</a:t>
+            </a:r>
+            <a:r>
+              <a:rPr lang="fr-FR" dirty="0"/>
+              <a:t> &gt; </a:t>
+            </a:r>
+            <a:r>
+              <a:rPr lang="fr-FR" dirty="0" err="1"/>
+              <a:t>games</a:t>
+            </a:r>
+            <a:r>
+              <a:rPr lang="fr-FR" dirty="0"/>
+              <a:t>, </a:t>
+            </a:r>
+            <a:r>
+              <a:rPr lang="fr-FR" dirty="0" err="1"/>
               <a:t>etc</a:t>
             </a:r>
-            <a:endParaRPr dirty="0"/>
+            <a:endParaRPr lang="fr-FR" dirty="0"/>
           </a:p>
           <a:p>
             <a:pPr lvl="2">
@@ -13147,7 +13446,19 @@
             </a:pPr>
             <a:r>
               <a:rPr lang="en" dirty="0"/>
-              <a:t>Many major companies such as Google and Verizon agree this is valid? Is it? </a:t>
+              <a:t>Many major companies such as Google and Verizon agree this is valid</a:t>
+            </a:r>
+          </a:p>
+          <a:p>
+            <a:pPr lvl="2">
+              <a:spcBef>
+                <a:spcPts val="0"/>
+              </a:spcBef>
+              <a:buChar char="■"/>
+            </a:pPr>
+            <a:r>
+              <a:rPr lang="en" dirty="0"/>
+              <a:t>Government supports this idea</a:t>
             </a:r>
             <a:endParaRPr dirty="0"/>
           </a:p>
@@ -13307,8 +13618,8 @@
         </p:nvSpPr>
         <p:spPr>
           <a:xfrm>
-            <a:off x="628075" y="751389"/>
-            <a:ext cx="12561413" cy="1015467"/>
+            <a:off x="628076" y="751389"/>
+            <a:ext cx="7049982" cy="1015467"/>
           </a:xfrm>
           <a:prstGeom prst="rect">
             <a:avLst/>
@@ -13511,6 +13822,41 @@
           </a:ln>
         </p:spPr>
       </p:cxnSp>
+      <p:sp>
+        <p:nvSpPr>
+          <p:cNvPr id="2" name="TextBox 1">
+            <a:extLst>
+              <a:ext uri="{FF2B5EF4-FFF2-40B4-BE49-F238E27FC236}">
+                <a16:creationId xmlns:a16="http://schemas.microsoft.com/office/drawing/2014/main" id="{49A26336-40A1-46AD-BFF5-50CB02ADAF42}"/>
+              </a:ext>
+            </a:extLst>
+          </p:cNvPr>
+          <p:cNvSpPr txBox="1"/>
+          <p:nvPr/>
+        </p:nvSpPr>
+        <p:spPr>
+          <a:xfrm>
+            <a:off x="8229600" y="188686"/>
+            <a:ext cx="5109029" cy="707886"/>
+          </a:xfrm>
+          <a:prstGeom prst="rect">
+            <a:avLst/>
+          </a:prstGeom>
+          <a:noFill/>
+        </p:spPr>
+        <p:txBody>
+          <a:bodyPr wrap="square" rtlCol="0">
+            <a:spAutoFit/>
+          </a:bodyPr>
+          <a:lstStyle/>
+          <a:p>
+            <a:r>
+              <a:rPr lang="en-US" dirty="0"/>
+              <a:t>Build a list of Pros and Cons: Tables will be randomly called upon to present one.</a:t>
+            </a:r>
+          </a:p>
+        </p:txBody>
+      </p:sp>
     </p:spTree>
   </p:cSld>
   <p:clrMapOvr>
@@ -14115,7 +14461,7 @@
         <p:spPr>
           <a:xfrm>
             <a:off x="628076" y="1776683"/>
-            <a:ext cx="5885614" cy="2109517"/>
+            <a:ext cx="12561452" cy="2494273"/>
           </a:xfrm>
         </p:spPr>
         <p:txBody>
@@ -14140,6 +14486,13 @@
             <a:r>
               <a:rPr lang="en-US" dirty="0"/>
               <a:t>)</a:t>
+            </a:r>
+          </a:p>
+          <a:p>
+            <a:pPr lvl="1"/>
+            <a:r>
+              <a:rPr lang="en-US" b="1" dirty="0"/>
+              <a:t>Practice – Write a function that takes in a start location, an end location, and returns a list from start to end.</a:t>
             </a:r>
           </a:p>
           <a:p>
@@ -14170,8 +14523,8 @@
         </p:nvSpPr>
         <p:spPr>
           <a:xfrm>
-            <a:off x="3570883" y="3513667"/>
-            <a:ext cx="8082844" cy="3477875"/>
+            <a:off x="3570883" y="3700129"/>
+            <a:ext cx="8082844" cy="3570208"/>
           </a:xfrm>
           <a:prstGeom prst="rect">
             <a:avLst/>
@@ -14401,36 +14754,11 @@
               <a:t>return </a:t>
             </a:r>
             <a:r>
-              <a:rPr lang="en-US" sz="1800" dirty="0">
-                <a:solidFill>
-                  <a:srgbClr val="8888C6"/>
-                </a:solidFill>
-                <a:effectLst/>
-                <a:latin typeface="Consolas" panose="020B0609020204030204" pitchFamily="49" charset="0"/>
-                <a:cs typeface="Consolas" panose="020B0609020204030204" pitchFamily="49" charset="0"/>
-              </a:rPr>
-              <a:t>tuple</a:t>
-            </a:r>
-            <a:r>
-              <a:rPr lang="en-US" sz="1800" dirty="0">
-                <a:latin typeface="Consolas" panose="020B0609020204030204" pitchFamily="49" charset="0"/>
-                <a:cs typeface="Consolas" panose="020B0609020204030204" pitchFamily="49" charset="0"/>
-              </a:rPr>
-              <a:t>(</a:t>
-            </a:r>
-            <a:r>
               <a:rPr lang="en-US" sz="1800" dirty="0" err="1">
                 <a:latin typeface="Consolas" panose="020B0609020204030204" pitchFamily="49" charset="0"/>
                 <a:cs typeface="Consolas" panose="020B0609020204030204" pitchFamily="49" charset="0"/>
               </a:rPr>
               <a:t>lst</a:t>
-            </a:r>
-            <a:r>
-              <a:rPr lang="en-US" sz="1800" dirty="0">
-                <a:latin typeface="Consolas" panose="020B0609020204030204" pitchFamily="49" charset="0"/>
-                <a:cs typeface="Consolas" panose="020B0609020204030204" pitchFamily="49" charset="0"/>
-              </a:rPr>
-              <a:t>)</a:t>
             </a:r>
             <a:br>
               <a:rPr lang="en-US" sz="1800" dirty="0">
@@ -14445,7 +14773,7 @@
           </a:p>
           <a:p>
             <a:r>
-              <a:rPr lang="en-US" sz="1800" dirty="0">
+              <a:rPr lang="en-US" dirty="0">
                 <a:solidFill>
                   <a:srgbClr val="8888C6"/>
                 </a:solidFill>
@@ -14456,28 +14784,28 @@
               <a:t>print</a:t>
             </a:r>
             <a:r>
-              <a:rPr lang="en-US" sz="1800" dirty="0">
+              <a:rPr lang="en-US" dirty="0">
                 <a:latin typeface="Consolas" panose="020B0609020204030204" pitchFamily="49" charset="0"/>
                 <a:cs typeface="Consolas" panose="020B0609020204030204" pitchFamily="49" charset="0"/>
               </a:rPr>
               <a:t>(</a:t>
             </a:r>
             <a:r>
-              <a:rPr lang="en-US" sz="1800" dirty="0" err="1">
+              <a:rPr lang="en-US" dirty="0" err="1">
                 <a:latin typeface="Consolas" panose="020B0609020204030204" pitchFamily="49" charset="0"/>
                 <a:cs typeface="Consolas" panose="020B0609020204030204" pitchFamily="49" charset="0"/>
               </a:rPr>
               <a:t>number_generator</a:t>
             </a:r>
             <a:r>
-              <a:rPr lang="en-US" sz="1800" dirty="0">
+              <a:rPr lang="en-US" dirty="0">
                 <a:latin typeface="Consolas" panose="020B0609020204030204" pitchFamily="49" charset="0"/>
                 <a:cs typeface="Consolas" panose="020B0609020204030204" pitchFamily="49" charset="0"/>
               </a:rPr>
               <a:t>(</a:t>
             </a:r>
             <a:r>
-              <a:rPr lang="en-US" sz="1800" dirty="0">
+              <a:rPr lang="en-US" dirty="0">
                 <a:solidFill>
                   <a:srgbClr val="6897BB"/>
                 </a:solidFill>
@@ -14488,7 +14816,7 @@
               <a:t>5</a:t>
             </a:r>
             <a:r>
-              <a:rPr lang="en-US" sz="1800" dirty="0">
+              <a:rPr lang="en-US" dirty="0">
                 <a:solidFill>
                   <a:srgbClr val="CC7832"/>
                 </a:solidFill>
@@ -14499,7 +14827,7 @@
               <a:t>, </a:t>
             </a:r>
             <a:r>
-              <a:rPr lang="en-US" sz="1800" dirty="0">
+              <a:rPr lang="en-US" dirty="0">
                 <a:solidFill>
                   <a:srgbClr val="6897BB"/>
                 </a:solidFill>
@@ -14510,7 +14838,7 @@
               <a:t>10</a:t>
             </a:r>
             <a:r>
-              <a:rPr lang="en-US" sz="1800" dirty="0">
+              <a:rPr lang="en-US" dirty="0">
                 <a:solidFill>
                   <a:srgbClr val="CC7832"/>
                 </a:solidFill>
@@ -14521,7 +14849,7 @@
               <a:t>, </a:t>
             </a:r>
             <a:r>
-              <a:rPr lang="en-US" sz="1800" dirty="0">
+              <a:rPr lang="en-US" dirty="0">
                 <a:solidFill>
                   <a:srgbClr val="6897BB"/>
                 </a:solidFill>
@@ -14532,14 +14860,321 @@
               <a:t>1</a:t>
             </a:r>
             <a:r>
-              <a:rPr lang="en-US" sz="1800" dirty="0">
+              <a:rPr lang="en-US" dirty="0">
                 <a:latin typeface="Consolas" panose="020B0609020204030204" pitchFamily="49" charset="0"/>
                 <a:cs typeface="Consolas" panose="020B0609020204030204" pitchFamily="49" charset="0"/>
               </a:rPr>
               <a:t>)) </a:t>
             </a:r>
-            <a:r>
-              <a:rPr lang="en-US" sz="1800" dirty="0">
+          </a:p>
+          <a:p>
+            <a:r>
+              <a:rPr lang="en-US" dirty="0">
+                <a:solidFill>
+                  <a:srgbClr val="8888C6"/>
+                </a:solidFill>
+                <a:effectLst/>
+                <a:latin typeface="Consolas" panose="020B0609020204030204" pitchFamily="49" charset="0"/>
+                <a:cs typeface="Consolas" panose="020B0609020204030204" pitchFamily="49" charset="0"/>
+              </a:rPr>
+              <a:t>print</a:t>
+            </a:r>
+            <a:r>
+              <a:rPr lang="en-US" dirty="0">
+                <a:latin typeface="Consolas" panose="020B0609020204030204" pitchFamily="49" charset="0"/>
+                <a:cs typeface="Consolas" panose="020B0609020204030204" pitchFamily="49" charset="0"/>
+              </a:rPr>
+              <a:t>(</a:t>
+            </a:r>
+            <a:r>
+              <a:rPr lang="en-US" dirty="0" err="1">
+                <a:latin typeface="Consolas" panose="020B0609020204030204" pitchFamily="49" charset="0"/>
+                <a:cs typeface="Consolas" panose="020B0609020204030204" pitchFamily="49" charset="0"/>
+              </a:rPr>
+              <a:t>number_generator</a:t>
+            </a:r>
+            <a:r>
+              <a:rPr lang="en-US" dirty="0">
+                <a:latin typeface="Consolas" panose="020B0609020204030204" pitchFamily="49" charset="0"/>
+                <a:cs typeface="Consolas" panose="020B0609020204030204" pitchFamily="49" charset="0"/>
+              </a:rPr>
+              <a:t>(</a:t>
+            </a:r>
+            <a:r>
+              <a:rPr lang="en-US" dirty="0">
+                <a:solidFill>
+                  <a:srgbClr val="6897BB"/>
+                </a:solidFill>
+                <a:effectLst/>
+                <a:latin typeface="Consolas" panose="020B0609020204030204" pitchFamily="49" charset="0"/>
+                <a:cs typeface="Consolas" panose="020B0609020204030204" pitchFamily="49" charset="0"/>
+              </a:rPr>
+              <a:t>2</a:t>
+            </a:r>
+            <a:r>
+              <a:rPr lang="en-US" dirty="0">
+                <a:latin typeface="Consolas" panose="020B0609020204030204" pitchFamily="49" charset="0"/>
+                <a:cs typeface="Consolas" panose="020B0609020204030204" pitchFamily="49" charset="0"/>
+              </a:rPr>
+              <a:t>))</a:t>
+            </a:r>
+            <a:endParaRPr lang="en-US" dirty="0">
+              <a:solidFill>
+                <a:srgbClr val="808080"/>
+              </a:solidFill>
+              <a:effectLst/>
+              <a:latin typeface="Consolas" panose="020B0609020204030204" pitchFamily="49" charset="0"/>
+              <a:cs typeface="Consolas" panose="020B0609020204030204" pitchFamily="49" charset="0"/>
+            </a:endParaRPr>
+          </a:p>
+          <a:p>
+            <a:r>
+              <a:rPr lang="en-US" dirty="0">
+                <a:solidFill>
+                  <a:srgbClr val="8888C6"/>
+                </a:solidFill>
+                <a:effectLst/>
+                <a:latin typeface="Consolas" panose="020B0609020204030204" pitchFamily="49" charset="0"/>
+                <a:cs typeface="Consolas" panose="020B0609020204030204" pitchFamily="49" charset="0"/>
+              </a:rPr>
+              <a:t>print</a:t>
+            </a:r>
+            <a:r>
+              <a:rPr lang="en-US" dirty="0">
+                <a:latin typeface="Consolas" panose="020B0609020204030204" pitchFamily="49" charset="0"/>
+                <a:cs typeface="Consolas" panose="020B0609020204030204" pitchFamily="49" charset="0"/>
+              </a:rPr>
+              <a:t>(</a:t>
+            </a:r>
+            <a:r>
+              <a:rPr lang="en-US" dirty="0" err="1">
+                <a:latin typeface="Consolas" panose="020B0609020204030204" pitchFamily="49" charset="0"/>
+                <a:cs typeface="Consolas" panose="020B0609020204030204" pitchFamily="49" charset="0"/>
+              </a:rPr>
+              <a:t>number_generator</a:t>
+            </a:r>
+            <a:r>
+              <a:rPr lang="en-US" dirty="0">
+                <a:latin typeface="Consolas" panose="020B0609020204030204" pitchFamily="49" charset="0"/>
+                <a:cs typeface="Consolas" panose="020B0609020204030204" pitchFamily="49" charset="0"/>
+              </a:rPr>
+              <a:t>())</a:t>
+            </a:r>
+            <a:endParaRPr lang="en-US" dirty="0">
+              <a:solidFill>
+                <a:srgbClr val="808080"/>
+              </a:solidFill>
+              <a:effectLst/>
+              <a:latin typeface="Consolas" panose="020B0609020204030204" pitchFamily="49" charset="0"/>
+              <a:cs typeface="Consolas" panose="020B0609020204030204" pitchFamily="49" charset="0"/>
+            </a:endParaRPr>
+          </a:p>
+          <a:p>
+            <a:r>
+              <a:rPr lang="en-US" dirty="0">
+                <a:solidFill>
+                  <a:srgbClr val="8888C6"/>
+                </a:solidFill>
+                <a:latin typeface="Consolas" panose="020B0609020204030204" pitchFamily="49" charset="0"/>
+                <a:cs typeface="Consolas" panose="020B0609020204030204" pitchFamily="49" charset="0"/>
+              </a:rPr>
+              <a:t>print</a:t>
+            </a:r>
+            <a:r>
+              <a:rPr lang="en-US" dirty="0">
+                <a:latin typeface="Consolas" panose="020B0609020204030204" pitchFamily="49" charset="0"/>
+                <a:cs typeface="Consolas" panose="020B0609020204030204" pitchFamily="49" charset="0"/>
+              </a:rPr>
+              <a:t>(</a:t>
+            </a:r>
+            <a:r>
+              <a:rPr lang="en-US" dirty="0" err="1">
+                <a:latin typeface="Consolas" panose="020B0609020204030204" pitchFamily="49" charset="0"/>
+                <a:cs typeface="Consolas" panose="020B0609020204030204" pitchFamily="49" charset="0"/>
+              </a:rPr>
+              <a:t>number_generator</a:t>
+            </a:r>
+            <a:r>
+              <a:rPr lang="en-US" dirty="0">
+                <a:latin typeface="Consolas" panose="020B0609020204030204" pitchFamily="49" charset="0"/>
+                <a:cs typeface="Consolas" panose="020B0609020204030204" pitchFamily="49" charset="0"/>
+              </a:rPr>
+              <a:t>(</a:t>
+            </a:r>
+            <a:r>
+              <a:rPr lang="en-US" dirty="0">
+                <a:solidFill>
+                  <a:srgbClr val="6897BB"/>
+                </a:solidFill>
+                <a:latin typeface="Consolas" panose="020B0609020204030204" pitchFamily="49" charset="0"/>
+                <a:cs typeface="Consolas" panose="020B0609020204030204" pitchFamily="49" charset="0"/>
+              </a:rPr>
+              <a:t>2</a:t>
+            </a:r>
+            <a:r>
+              <a:rPr lang="en-US" dirty="0">
+                <a:solidFill>
+                  <a:srgbClr val="CC7832"/>
+                </a:solidFill>
+                <a:latin typeface="Consolas" panose="020B0609020204030204" pitchFamily="49" charset="0"/>
+                <a:cs typeface="Consolas" panose="020B0609020204030204" pitchFamily="49" charset="0"/>
+              </a:rPr>
+              <a:t>, </a:t>
+            </a:r>
+            <a:r>
+              <a:rPr lang="en-US" dirty="0">
+                <a:solidFill>
+                  <a:srgbClr val="AA4926"/>
+                </a:solidFill>
+                <a:latin typeface="Consolas" panose="020B0609020204030204" pitchFamily="49" charset="0"/>
+                <a:cs typeface="Consolas" panose="020B0609020204030204" pitchFamily="49" charset="0"/>
+              </a:rPr>
+              <a:t>step</a:t>
+            </a:r>
+            <a:r>
+              <a:rPr lang="en-US" dirty="0">
+                <a:latin typeface="Consolas" panose="020B0609020204030204" pitchFamily="49" charset="0"/>
+                <a:cs typeface="Consolas" panose="020B0609020204030204" pitchFamily="49" charset="0"/>
+              </a:rPr>
+              <a:t>=</a:t>
+            </a:r>
+            <a:r>
+              <a:rPr lang="en-US" dirty="0">
+                <a:solidFill>
+                  <a:srgbClr val="6897BB"/>
+                </a:solidFill>
+                <a:latin typeface="Consolas" panose="020B0609020204030204" pitchFamily="49" charset="0"/>
+                <a:cs typeface="Consolas" panose="020B0609020204030204" pitchFamily="49" charset="0"/>
+              </a:rPr>
+              <a:t>2</a:t>
+            </a:r>
+            <a:r>
+              <a:rPr lang="en-US" dirty="0">
+                <a:latin typeface="Consolas" panose="020B0609020204030204" pitchFamily="49" charset="0"/>
+                <a:cs typeface="Consolas" panose="020B0609020204030204" pitchFamily="49" charset="0"/>
+              </a:rPr>
+              <a:t>)) </a:t>
+            </a:r>
+          </a:p>
+          <a:p>
+            <a:r>
+              <a:rPr lang="en-US" dirty="0">
+                <a:solidFill>
+                  <a:srgbClr val="8888C6"/>
+                </a:solidFill>
+                <a:latin typeface="Consolas" panose="020B0609020204030204" pitchFamily="49" charset="0"/>
+                <a:cs typeface="Consolas" panose="020B0609020204030204" pitchFamily="49" charset="0"/>
+              </a:rPr>
+              <a:t>print</a:t>
+            </a:r>
+            <a:r>
+              <a:rPr lang="en-US" dirty="0">
+                <a:latin typeface="Consolas" panose="020B0609020204030204" pitchFamily="49" charset="0"/>
+                <a:cs typeface="Consolas" panose="020B0609020204030204" pitchFamily="49" charset="0"/>
+              </a:rPr>
+              <a:t>(</a:t>
+            </a:r>
+            <a:r>
+              <a:rPr lang="en-US" dirty="0" err="1">
+                <a:latin typeface="Consolas" panose="020B0609020204030204" pitchFamily="49" charset="0"/>
+                <a:cs typeface="Consolas" panose="020B0609020204030204" pitchFamily="49" charset="0"/>
+              </a:rPr>
+              <a:t>number_generator</a:t>
+            </a:r>
+            <a:r>
+              <a:rPr lang="en-US" dirty="0">
+                <a:latin typeface="Consolas" panose="020B0609020204030204" pitchFamily="49" charset="0"/>
+                <a:cs typeface="Consolas" panose="020B0609020204030204" pitchFamily="49" charset="0"/>
+              </a:rPr>
+              <a:t>(</a:t>
+            </a:r>
+            <a:r>
+              <a:rPr lang="en-US" dirty="0">
+                <a:solidFill>
+                  <a:srgbClr val="6897BB"/>
+                </a:solidFill>
+                <a:latin typeface="Consolas" panose="020B0609020204030204" pitchFamily="49" charset="0"/>
+                <a:cs typeface="Consolas" panose="020B0609020204030204" pitchFamily="49" charset="0"/>
+              </a:rPr>
+              <a:t>5</a:t>
+            </a:r>
+            <a:r>
+              <a:rPr lang="en-US" dirty="0">
+                <a:solidFill>
+                  <a:srgbClr val="CC7832"/>
+                </a:solidFill>
+                <a:latin typeface="Consolas" panose="020B0609020204030204" pitchFamily="49" charset="0"/>
+                <a:cs typeface="Consolas" panose="020B0609020204030204" pitchFamily="49" charset="0"/>
+              </a:rPr>
+              <a:t>, </a:t>
+            </a:r>
+            <a:r>
+              <a:rPr lang="en-US" dirty="0">
+                <a:solidFill>
+                  <a:srgbClr val="AA4926"/>
+                </a:solidFill>
+                <a:latin typeface="Consolas" panose="020B0609020204030204" pitchFamily="49" charset="0"/>
+                <a:cs typeface="Consolas" panose="020B0609020204030204" pitchFamily="49" charset="0"/>
+              </a:rPr>
+              <a:t>end</a:t>
+            </a:r>
+            <a:r>
+              <a:rPr lang="en-US" dirty="0">
+                <a:latin typeface="Consolas" panose="020B0609020204030204" pitchFamily="49" charset="0"/>
+                <a:cs typeface="Consolas" panose="020B0609020204030204" pitchFamily="49" charset="0"/>
+              </a:rPr>
+              <a:t>=</a:t>
+            </a:r>
+            <a:r>
+              <a:rPr lang="en-US" dirty="0">
+                <a:solidFill>
+                  <a:srgbClr val="6897BB"/>
+                </a:solidFill>
+                <a:latin typeface="Consolas" panose="020B0609020204030204" pitchFamily="49" charset="0"/>
+                <a:cs typeface="Consolas" panose="020B0609020204030204" pitchFamily="49" charset="0"/>
+              </a:rPr>
+              <a:t>7</a:t>
+            </a:r>
+            <a:r>
+              <a:rPr lang="en-US" dirty="0">
+                <a:latin typeface="Consolas" panose="020B0609020204030204" pitchFamily="49" charset="0"/>
+                <a:cs typeface="Consolas" panose="020B0609020204030204" pitchFamily="49" charset="0"/>
+              </a:rPr>
+              <a:t>))</a:t>
+            </a:r>
+          </a:p>
+        </p:txBody>
+      </p:sp>
+      <p:sp>
+        <p:nvSpPr>
+          <p:cNvPr id="6" name="TextBox 5">
+            <a:extLst>
+              <a:ext uri="{FF2B5EF4-FFF2-40B4-BE49-F238E27FC236}">
+                <a16:creationId xmlns:a16="http://schemas.microsoft.com/office/drawing/2014/main" id="{F33F6867-CED7-48F9-9BF0-7E2EFF21A908}"/>
+              </a:ext>
+            </a:extLst>
+          </p:cNvPr>
+          <p:cNvSpPr txBox="1"/>
+          <p:nvPr/>
+        </p:nvSpPr>
+        <p:spPr>
+          <a:xfrm>
+            <a:off x="8548914" y="5623440"/>
+            <a:ext cx="3976914" cy="1631216"/>
+          </a:xfrm>
+          <a:prstGeom prst="rect">
+            <a:avLst/>
+          </a:prstGeom>
+          <a:noFill/>
+        </p:spPr>
+        <p:txBody>
+          <a:bodyPr wrap="square">
+            <a:spAutoFit/>
+          </a:bodyPr>
+          <a:lstStyle/>
+          <a:p>
+            <a:r>
+              <a:rPr lang="en-US" sz="2000" dirty="0">
                 <a:solidFill>
                   <a:srgbClr val="808080"/>
                 </a:solidFill>
@@ -14547,311 +15182,68 @@
                 <a:latin typeface="Consolas" panose="020B0609020204030204" pitchFamily="49" charset="0"/>
                 <a:cs typeface="Consolas" panose="020B0609020204030204" pitchFamily="49" charset="0"/>
               </a:rPr>
-              <a:t># (5, 6, 7, 8, 9)</a:t>
-            </a:r>
-          </a:p>
-          <a:p>
-            <a:r>
-              <a:rPr lang="en-US" sz="1800" dirty="0">
-                <a:solidFill>
-                  <a:srgbClr val="8888C6"/>
+              <a:t># [5, 6, 7, 8, 9]</a:t>
+            </a:r>
+          </a:p>
+          <a:p>
+            <a:r>
+              <a:rPr lang="en-US" sz="2000" dirty="0">
+                <a:solidFill>
+                  <a:srgbClr val="808080"/>
                 </a:solidFill>
                 <a:effectLst/>
                 <a:latin typeface="Consolas" panose="020B0609020204030204" pitchFamily="49" charset="0"/>
                 <a:cs typeface="Consolas" panose="020B0609020204030204" pitchFamily="49" charset="0"/>
               </a:rPr>
-              <a:t>print</a:t>
-            </a:r>
-            <a:r>
-              <a:rPr lang="en-US" sz="1800" dirty="0">
-                <a:latin typeface="Consolas" panose="020B0609020204030204" pitchFamily="49" charset="0"/>
-                <a:cs typeface="Consolas" panose="020B0609020204030204" pitchFamily="49" charset="0"/>
-              </a:rPr>
-              <a:t>(</a:t>
-            </a:r>
-            <a:r>
-              <a:rPr lang="en-US" sz="1800" dirty="0" err="1">
-                <a:latin typeface="Consolas" panose="020B0609020204030204" pitchFamily="49" charset="0"/>
-                <a:cs typeface="Consolas" panose="020B0609020204030204" pitchFamily="49" charset="0"/>
-              </a:rPr>
-              <a:t>number_generator</a:t>
-            </a:r>
-            <a:r>
-              <a:rPr lang="en-US" sz="1800" dirty="0">
-                <a:latin typeface="Consolas" panose="020B0609020204030204" pitchFamily="49" charset="0"/>
-                <a:cs typeface="Consolas" panose="020B0609020204030204" pitchFamily="49" charset="0"/>
-              </a:rPr>
-              <a:t>(</a:t>
-            </a:r>
-            <a:r>
-              <a:rPr lang="en-US" sz="1800" dirty="0">
-                <a:solidFill>
-                  <a:srgbClr val="6897BB"/>
-                </a:solidFill>
-                <a:effectLst/>
-                <a:latin typeface="Consolas" panose="020B0609020204030204" pitchFamily="49" charset="0"/>
-                <a:cs typeface="Consolas" panose="020B0609020204030204" pitchFamily="49" charset="0"/>
-              </a:rPr>
-              <a:t>2</a:t>
-            </a:r>
-            <a:r>
-              <a:rPr lang="en-US" sz="1800" dirty="0">
-                <a:latin typeface="Consolas" panose="020B0609020204030204" pitchFamily="49" charset="0"/>
-                <a:cs typeface="Consolas" panose="020B0609020204030204" pitchFamily="49" charset="0"/>
-              </a:rPr>
-              <a:t>)) </a:t>
-            </a:r>
-            <a:r>
-              <a:rPr lang="en-US" sz="1800" dirty="0">
+              <a:t># [2, 3, 4, 5, 6, 7, 8, 9]</a:t>
+            </a:r>
+          </a:p>
+          <a:p>
+            <a:r>
+              <a:rPr lang="en-US" dirty="0">
                 <a:solidFill>
                   <a:srgbClr val="808080"/>
                 </a:solidFill>
-                <a:effectLst/>
-                <a:latin typeface="Consolas" panose="020B0609020204030204" pitchFamily="49" charset="0"/>
-                <a:cs typeface="Consolas" panose="020B0609020204030204" pitchFamily="49" charset="0"/>
-              </a:rPr>
-              <a:t># (2, 3, 4, 5, 6, 7, 8, 9)</a:t>
-            </a:r>
-          </a:p>
-          <a:p>
-            <a:r>
-              <a:rPr lang="en-US" sz="1800" dirty="0">
-                <a:solidFill>
-                  <a:srgbClr val="8888C6"/>
-                </a:solidFill>
-                <a:effectLst/>
-                <a:latin typeface="Consolas" panose="020B0609020204030204" pitchFamily="49" charset="0"/>
-                <a:cs typeface="Consolas" panose="020B0609020204030204" pitchFamily="49" charset="0"/>
-              </a:rPr>
-              <a:t>print</a:t>
-            </a:r>
-            <a:r>
-              <a:rPr lang="en-US" sz="1800" dirty="0">
-                <a:latin typeface="Consolas" panose="020B0609020204030204" pitchFamily="49" charset="0"/>
-                <a:cs typeface="Consolas" panose="020B0609020204030204" pitchFamily="49" charset="0"/>
-              </a:rPr>
-              <a:t>(</a:t>
-            </a:r>
-            <a:r>
-              <a:rPr lang="en-US" sz="1800" dirty="0" err="1">
-                <a:latin typeface="Consolas" panose="020B0609020204030204" pitchFamily="49" charset="0"/>
-                <a:cs typeface="Consolas" panose="020B0609020204030204" pitchFamily="49" charset="0"/>
-              </a:rPr>
-              <a:t>number_generator</a:t>
-            </a:r>
-            <a:r>
-              <a:rPr lang="en-US" sz="1800" dirty="0">
-                <a:latin typeface="Consolas" panose="020B0609020204030204" pitchFamily="49" charset="0"/>
-                <a:cs typeface="Consolas" panose="020B0609020204030204" pitchFamily="49" charset="0"/>
-              </a:rPr>
-              <a:t>()) </a:t>
-            </a:r>
-            <a:r>
-              <a:rPr lang="en-US" sz="1800" dirty="0">
+                <a:latin typeface="Consolas" panose="020B0609020204030204" pitchFamily="49" charset="0"/>
+                <a:cs typeface="Consolas" panose="020B0609020204030204" pitchFamily="49" charset="0"/>
+              </a:rPr>
+              <a:t>#  Error</a:t>
+            </a:r>
+            <a:endParaRPr lang="en-US" sz="2000" dirty="0">
+              <a:solidFill>
+                <a:srgbClr val="808080"/>
+              </a:solidFill>
+              <a:latin typeface="Consolas" panose="020B0609020204030204" pitchFamily="49" charset="0"/>
+              <a:cs typeface="Consolas" panose="020B0609020204030204" pitchFamily="49" charset="0"/>
+            </a:endParaRPr>
+          </a:p>
+          <a:p>
+            <a:r>
+              <a:rPr lang="en-US" sz="2000" dirty="0">
                 <a:solidFill>
                   <a:srgbClr val="808080"/>
                 </a:solidFill>
-                <a:effectLst/>
-                <a:latin typeface="Consolas" panose="020B0609020204030204" pitchFamily="49" charset="0"/>
-                <a:cs typeface="Consolas" panose="020B0609020204030204" pitchFamily="49" charset="0"/>
-              </a:rPr>
-              <a:t># does not run / crashes</a:t>
-            </a:r>
-          </a:p>
-          <a:p>
-            <a:r>
-              <a:rPr lang="en-US" sz="1800" dirty="0">
-                <a:solidFill>
-                  <a:srgbClr val="8888C6"/>
-                </a:solidFill>
-                <a:latin typeface="Consolas" panose="020B0609020204030204" pitchFamily="49" charset="0"/>
-                <a:cs typeface="Consolas" panose="020B0609020204030204" pitchFamily="49" charset="0"/>
-              </a:rPr>
-              <a:t>print</a:t>
-            </a:r>
-            <a:r>
-              <a:rPr lang="en-US" sz="1800" dirty="0">
-                <a:latin typeface="Consolas" panose="020B0609020204030204" pitchFamily="49" charset="0"/>
-                <a:cs typeface="Consolas" panose="020B0609020204030204" pitchFamily="49" charset="0"/>
-              </a:rPr>
-              <a:t>(</a:t>
-            </a:r>
-            <a:r>
-              <a:rPr lang="en-US" sz="1800" dirty="0" err="1">
-                <a:latin typeface="Consolas" panose="020B0609020204030204" pitchFamily="49" charset="0"/>
-                <a:cs typeface="Consolas" panose="020B0609020204030204" pitchFamily="49" charset="0"/>
-              </a:rPr>
-              <a:t>number_generator</a:t>
-            </a:r>
-            <a:r>
-              <a:rPr lang="en-US" sz="1800" dirty="0">
-                <a:latin typeface="Consolas" panose="020B0609020204030204" pitchFamily="49" charset="0"/>
-                <a:cs typeface="Consolas" panose="020B0609020204030204" pitchFamily="49" charset="0"/>
-              </a:rPr>
-              <a:t>(</a:t>
-            </a:r>
-            <a:r>
-              <a:rPr lang="en-US" sz="1800" dirty="0">
-                <a:solidFill>
-                  <a:srgbClr val="6897BB"/>
-                </a:solidFill>
-                <a:latin typeface="Consolas" panose="020B0609020204030204" pitchFamily="49" charset="0"/>
-                <a:cs typeface="Consolas" panose="020B0609020204030204" pitchFamily="49" charset="0"/>
-              </a:rPr>
-              <a:t>2</a:t>
-            </a:r>
-            <a:r>
-              <a:rPr lang="en-US" sz="1800" dirty="0">
-                <a:solidFill>
-                  <a:srgbClr val="CC7832"/>
-                </a:solidFill>
-                <a:latin typeface="Consolas" panose="020B0609020204030204" pitchFamily="49" charset="0"/>
-                <a:cs typeface="Consolas" panose="020B0609020204030204" pitchFamily="49" charset="0"/>
-              </a:rPr>
-              <a:t>, </a:t>
-            </a:r>
-            <a:r>
-              <a:rPr lang="en-US" sz="1800" dirty="0">
-                <a:solidFill>
-                  <a:srgbClr val="AA4926"/>
-                </a:solidFill>
-                <a:latin typeface="Consolas" panose="020B0609020204030204" pitchFamily="49" charset="0"/>
-                <a:cs typeface="Consolas" panose="020B0609020204030204" pitchFamily="49" charset="0"/>
-              </a:rPr>
-              <a:t>step</a:t>
-            </a:r>
-            <a:r>
-              <a:rPr lang="en-US" sz="1800" dirty="0">
-                <a:latin typeface="Consolas" panose="020B0609020204030204" pitchFamily="49" charset="0"/>
-                <a:cs typeface="Consolas" panose="020B0609020204030204" pitchFamily="49" charset="0"/>
-              </a:rPr>
-              <a:t>=</a:t>
-            </a:r>
-            <a:r>
-              <a:rPr lang="en-US" sz="1800" dirty="0">
-                <a:solidFill>
-                  <a:srgbClr val="6897BB"/>
-                </a:solidFill>
-                <a:latin typeface="Consolas" panose="020B0609020204030204" pitchFamily="49" charset="0"/>
-                <a:cs typeface="Consolas" panose="020B0609020204030204" pitchFamily="49" charset="0"/>
-              </a:rPr>
-              <a:t>2</a:t>
-            </a:r>
-            <a:r>
-              <a:rPr lang="en-US" sz="1800" dirty="0">
-                <a:latin typeface="Consolas" panose="020B0609020204030204" pitchFamily="49" charset="0"/>
-                <a:cs typeface="Consolas" panose="020B0609020204030204" pitchFamily="49" charset="0"/>
-              </a:rPr>
-              <a:t>)) </a:t>
-            </a:r>
-            <a:r>
-              <a:rPr lang="en-US" sz="1800" dirty="0">
+                <a:latin typeface="Consolas" panose="020B0609020204030204" pitchFamily="49" charset="0"/>
+                <a:cs typeface="Consolas" panose="020B0609020204030204" pitchFamily="49" charset="0"/>
+              </a:rPr>
+              <a:t># [2, 4, 6, 8]</a:t>
+            </a:r>
+          </a:p>
+          <a:p>
+            <a:r>
+              <a:rPr lang="en-US" dirty="0">
                 <a:solidFill>
                   <a:srgbClr val="808080"/>
                 </a:solidFill>
                 <a:latin typeface="Consolas" panose="020B0609020204030204" pitchFamily="49" charset="0"/>
                 <a:cs typeface="Consolas" panose="020B0609020204030204" pitchFamily="49" charset="0"/>
               </a:rPr>
-              <a:t># (2, 4, 6, 8</a:t>
-            </a:r>
-          </a:p>
-          <a:p>
-            <a:r>
-              <a:rPr lang="en-US" sz="1800" dirty="0">
-                <a:solidFill>
-                  <a:srgbClr val="8888C6"/>
-                </a:solidFill>
-                <a:latin typeface="Consolas" panose="020B0609020204030204" pitchFamily="49" charset="0"/>
-                <a:cs typeface="Consolas" panose="020B0609020204030204" pitchFamily="49" charset="0"/>
-              </a:rPr>
-              <a:t>print</a:t>
-            </a:r>
-            <a:r>
-              <a:rPr lang="en-US" sz="1800" dirty="0">
-                <a:latin typeface="Consolas" panose="020B0609020204030204" pitchFamily="49" charset="0"/>
-                <a:cs typeface="Consolas" panose="020B0609020204030204" pitchFamily="49" charset="0"/>
-              </a:rPr>
-              <a:t>(</a:t>
-            </a:r>
-            <a:r>
-              <a:rPr lang="en-US" sz="1800" dirty="0" err="1">
-                <a:latin typeface="Consolas" panose="020B0609020204030204" pitchFamily="49" charset="0"/>
-                <a:cs typeface="Consolas" panose="020B0609020204030204" pitchFamily="49" charset="0"/>
-              </a:rPr>
-              <a:t>number_generator</a:t>
-            </a:r>
-            <a:r>
-              <a:rPr lang="en-US" sz="1800" dirty="0">
-                <a:latin typeface="Consolas" panose="020B0609020204030204" pitchFamily="49" charset="0"/>
-                <a:cs typeface="Consolas" panose="020B0609020204030204" pitchFamily="49" charset="0"/>
-              </a:rPr>
-              <a:t>(</a:t>
-            </a:r>
-            <a:r>
-              <a:rPr lang="en-US" sz="1800" dirty="0">
-                <a:solidFill>
-                  <a:srgbClr val="6897BB"/>
-                </a:solidFill>
-                <a:latin typeface="Consolas" panose="020B0609020204030204" pitchFamily="49" charset="0"/>
-                <a:cs typeface="Consolas" panose="020B0609020204030204" pitchFamily="49" charset="0"/>
-              </a:rPr>
-              <a:t>5</a:t>
-            </a:r>
-            <a:r>
-              <a:rPr lang="en-US" sz="1800" dirty="0">
-                <a:solidFill>
-                  <a:srgbClr val="CC7832"/>
-                </a:solidFill>
-                <a:latin typeface="Consolas" panose="020B0609020204030204" pitchFamily="49" charset="0"/>
-                <a:cs typeface="Consolas" panose="020B0609020204030204" pitchFamily="49" charset="0"/>
-              </a:rPr>
-              <a:t>, </a:t>
-            </a:r>
-            <a:r>
-              <a:rPr lang="en-US" sz="1800" dirty="0">
-                <a:solidFill>
-                  <a:srgbClr val="AA4926"/>
-                </a:solidFill>
-                <a:latin typeface="Consolas" panose="020B0609020204030204" pitchFamily="49" charset="0"/>
-                <a:cs typeface="Consolas" panose="020B0609020204030204" pitchFamily="49" charset="0"/>
-              </a:rPr>
-              <a:t>end</a:t>
-            </a:r>
-            <a:r>
-              <a:rPr lang="en-US" sz="1800" dirty="0">
-                <a:latin typeface="Consolas" panose="020B0609020204030204" pitchFamily="49" charset="0"/>
-                <a:cs typeface="Consolas" panose="020B0609020204030204" pitchFamily="49" charset="0"/>
-              </a:rPr>
-              <a:t>=</a:t>
-            </a:r>
-            <a:r>
-              <a:rPr lang="en-US" sz="1800" dirty="0">
-                <a:solidFill>
-                  <a:srgbClr val="6897BB"/>
-                </a:solidFill>
-                <a:latin typeface="Consolas" panose="020B0609020204030204" pitchFamily="49" charset="0"/>
-                <a:cs typeface="Consolas" panose="020B0609020204030204" pitchFamily="49" charset="0"/>
-              </a:rPr>
-              <a:t>7</a:t>
-            </a:r>
-            <a:r>
-              <a:rPr lang="en-US" sz="1800" dirty="0">
-                <a:latin typeface="Consolas" panose="020B0609020204030204" pitchFamily="49" charset="0"/>
-                <a:cs typeface="Consolas" panose="020B0609020204030204" pitchFamily="49" charset="0"/>
-              </a:rPr>
-              <a:t>))  </a:t>
-            </a:r>
-            <a:r>
-              <a:rPr lang="en-US" sz="1800" dirty="0">
-                <a:solidFill>
-                  <a:srgbClr val="808080"/>
-                </a:solidFill>
-                <a:latin typeface="Consolas" panose="020B0609020204030204" pitchFamily="49" charset="0"/>
-                <a:cs typeface="Consolas" panose="020B0609020204030204" pitchFamily="49" charset="0"/>
-              </a:rPr>
-              <a:t># (5, 6)</a:t>
-            </a:r>
-            <a:endParaRPr lang="en-US" sz="1800" dirty="0">
+              <a:t># [5, 6]</a:t>
+            </a:r>
+            <a:endParaRPr lang="en-US" sz="2000" dirty="0">
+              <a:solidFill>
+                <a:srgbClr val="808080"/>
+              </a:solidFill>
               <a:latin typeface="Consolas" panose="020B0609020204030204" pitchFamily="49" charset="0"/>
               <a:cs typeface="Consolas" panose="020B0609020204030204" pitchFamily="49" charset="0"/>
             </a:endParaRPr>
@@ -15023,7 +15415,7 @@
                             </p:stCondLst>
                             <p:childTnLst>
                               <p:par>
-                                <p:cTn id="15" presetID="9" presetClass="entr" presetSubtype="0" fill="hold" grpId="0" nodeType="clickEffect">
+                                <p:cTn id="15" presetID="10" presetClass="entr" presetSubtype="0" fill="hold" grpId="0" nodeType="clickEffect">
                                   <p:stCondLst>
                                     <p:cond delay="0"/>
                                   </p:stCondLst>
@@ -15036,9 +15428,9 @@
                                           </p:stCondLst>
                                         </p:cTn>
                                         <p:tgtEl>
-                                          <p:spTgt spid="7">
+                                          <p:spTgt spid="6">
                                             <p:txEl>
-                                              <p:pRg st="2" end="2"/>
+                                              <p:pRg st="0" end="0"/>
                                             </p:txEl>
                                           </p:spTgt>
                                         </p:tgtEl>
@@ -15050,13 +15442,13 @@
                                         <p:strVal val="visible"/>
                                       </p:to>
                                     </p:set>
-                                    <p:animEffect transition="in" filter="dissolve">
+                                    <p:animEffect transition="in" filter="fade">
                                       <p:cBhvr>
                                         <p:cTn id="17" dur="500"/>
                                         <p:tgtEl>
-                                          <p:spTgt spid="7">
+                                          <p:spTgt spid="6">
                                             <p:txEl>
-                                              <p:pRg st="2" end="2"/>
+                                              <p:pRg st="0" end="0"/>
                                             </p:txEl>
                                           </p:spTgt>
                                         </p:tgtEl>
@@ -15099,7 +15491,7 @@
                                         <p:tgtEl>
                                           <p:spTgt spid="7">
                                             <p:txEl>
-                                              <p:pRg st="3" end="3"/>
+                                              <p:pRg st="2" end="2"/>
                                             </p:txEl>
                                           </p:spTgt>
                                         </p:tgtEl>
@@ -15117,7 +15509,7 @@
                                         <p:tgtEl>
                                           <p:spTgt spid="7">
                                             <p:txEl>
-                                              <p:pRg st="3" end="3"/>
+                                              <p:pRg st="2" end="2"/>
                                             </p:txEl>
                                           </p:spTgt>
                                         </p:tgtEl>
@@ -15145,7 +15537,7 @@
                             </p:stCondLst>
                             <p:childTnLst>
                               <p:par>
-                                <p:cTn id="25" presetID="9" presetClass="entr" presetSubtype="0" fill="hold" grpId="0" nodeType="clickEffect">
+                                <p:cTn id="25" presetID="10" presetClass="entr" presetSubtype="0" fill="hold" grpId="0" nodeType="clickEffect">
                                   <p:stCondLst>
                                     <p:cond delay="0"/>
                                   </p:stCondLst>
@@ -15158,9 +15550,9 @@
                                           </p:stCondLst>
                                         </p:cTn>
                                         <p:tgtEl>
-                                          <p:spTgt spid="7">
+                                          <p:spTgt spid="6">
                                             <p:txEl>
-                                              <p:pRg st="4" end="4"/>
+                                              <p:pRg st="1" end="1"/>
                                             </p:txEl>
                                           </p:spTgt>
                                         </p:tgtEl>
@@ -15172,13 +15564,13 @@
                                         <p:strVal val="visible"/>
                                       </p:to>
                                     </p:set>
-                                    <p:animEffect transition="in" filter="dissolve">
+                                    <p:animEffect transition="in" filter="fade">
                                       <p:cBhvr>
                                         <p:cTn id="27" dur="500"/>
                                         <p:tgtEl>
-                                          <p:spTgt spid="7">
+                                          <p:spTgt spid="6">
                                             <p:txEl>
-                                              <p:pRg st="4" end="4"/>
+                                              <p:pRg st="1" end="1"/>
                                             </p:txEl>
                                           </p:spTgt>
                                         </p:tgtEl>
@@ -15221,7 +15613,7 @@
                                         <p:tgtEl>
                                           <p:spTgt spid="7">
                                             <p:txEl>
-                                              <p:pRg st="5" end="5"/>
+                                              <p:pRg st="3" end="3"/>
                                             </p:txEl>
                                           </p:spTgt>
                                         </p:tgtEl>
@@ -15239,7 +15631,312 @@
                                         <p:tgtEl>
                                           <p:spTgt spid="7">
                                             <p:txEl>
+                                              <p:pRg st="3" end="3"/>
+                                            </p:txEl>
+                                          </p:spTgt>
+                                        </p:tgtEl>
+                                      </p:cBhvr>
+                                    </p:animEffect>
+                                  </p:childTnLst>
+                                </p:cTn>
+                              </p:par>
+                            </p:childTnLst>
+                          </p:cTn>
+                        </p:par>
+                      </p:childTnLst>
+                    </p:cTn>
+                  </p:par>
+                  <p:par>
+                    <p:cTn id="33" fill="hold">
+                      <p:stCondLst>
+                        <p:cond delay="indefinite"/>
+                      </p:stCondLst>
+                      <p:childTnLst>
+                        <p:par>
+                          <p:cTn id="34" fill="hold">
+                            <p:stCondLst>
+                              <p:cond delay="0"/>
+                            </p:stCondLst>
+                            <p:childTnLst>
+                              <p:par>
+                                <p:cTn id="35" presetID="10" presetClass="entr" presetSubtype="0" fill="hold" grpId="0" nodeType="clickEffect">
+                                  <p:stCondLst>
+                                    <p:cond delay="0"/>
+                                  </p:stCondLst>
+                                  <p:childTnLst>
+                                    <p:set>
+                                      <p:cBhvr>
+                                        <p:cTn id="36" dur="1" fill="hold">
+                                          <p:stCondLst>
+                                            <p:cond delay="0"/>
+                                          </p:stCondLst>
+                                        </p:cTn>
+                                        <p:tgtEl>
+                                          <p:spTgt spid="6">
+                                            <p:txEl>
+                                              <p:pRg st="2" end="2"/>
+                                            </p:txEl>
+                                          </p:spTgt>
+                                        </p:tgtEl>
+                                        <p:attrNameLst>
+                                          <p:attrName>style.visibility</p:attrName>
+                                        </p:attrNameLst>
+                                      </p:cBhvr>
+                                      <p:to>
+                                        <p:strVal val="visible"/>
+                                      </p:to>
+                                    </p:set>
+                                    <p:animEffect transition="in" filter="fade">
+                                      <p:cBhvr>
+                                        <p:cTn id="37" dur="500"/>
+                                        <p:tgtEl>
+                                          <p:spTgt spid="6">
+                                            <p:txEl>
+                                              <p:pRg st="2" end="2"/>
+                                            </p:txEl>
+                                          </p:spTgt>
+                                        </p:tgtEl>
+                                      </p:cBhvr>
+                                    </p:animEffect>
+                                  </p:childTnLst>
+                                </p:cTn>
+                              </p:par>
+                            </p:childTnLst>
+                          </p:cTn>
+                        </p:par>
+                      </p:childTnLst>
+                    </p:cTn>
+                  </p:par>
+                  <p:par>
+                    <p:cTn id="38" fill="hold">
+                      <p:stCondLst>
+                        <p:cond delay="indefinite"/>
+                      </p:stCondLst>
+                      <p:childTnLst>
+                        <p:par>
+                          <p:cTn id="39" fill="hold">
+                            <p:stCondLst>
+                              <p:cond delay="0"/>
+                            </p:stCondLst>
+                            <p:childTnLst>
+                              <p:par>
+                                <p:cTn id="40" presetID="9" presetClass="entr" presetSubtype="0" fill="hold" grpId="0" nodeType="clickEffect">
+                                  <p:stCondLst>
+                                    <p:cond delay="0"/>
+                                  </p:stCondLst>
+                                  <p:childTnLst>
+                                    <p:set>
+                                      <p:cBhvr>
+                                        <p:cTn id="41" dur="1" fill="hold">
+                                          <p:stCondLst>
+                                            <p:cond delay="0"/>
+                                          </p:stCondLst>
+                                        </p:cTn>
+                                        <p:tgtEl>
+                                          <p:spTgt spid="7">
+                                            <p:txEl>
+                                              <p:pRg st="4" end="4"/>
+                                            </p:txEl>
+                                          </p:spTgt>
+                                        </p:tgtEl>
+                                        <p:attrNameLst>
+                                          <p:attrName>style.visibility</p:attrName>
+                                        </p:attrNameLst>
+                                      </p:cBhvr>
+                                      <p:to>
+                                        <p:strVal val="visible"/>
+                                      </p:to>
+                                    </p:set>
+                                    <p:animEffect transition="in" filter="dissolve">
+                                      <p:cBhvr>
+                                        <p:cTn id="42" dur="500"/>
+                                        <p:tgtEl>
+                                          <p:spTgt spid="7">
+                                            <p:txEl>
+                                              <p:pRg st="4" end="4"/>
+                                            </p:txEl>
+                                          </p:spTgt>
+                                        </p:tgtEl>
+                                      </p:cBhvr>
+                                    </p:animEffect>
+                                  </p:childTnLst>
+                                </p:cTn>
+                              </p:par>
+                            </p:childTnLst>
+                          </p:cTn>
+                        </p:par>
+                      </p:childTnLst>
+                    </p:cTn>
+                  </p:par>
+                  <p:par>
+                    <p:cTn id="43" fill="hold">
+                      <p:stCondLst>
+                        <p:cond delay="indefinite"/>
+                      </p:stCondLst>
+                      <p:childTnLst>
+                        <p:par>
+                          <p:cTn id="44" fill="hold">
+                            <p:stCondLst>
+                              <p:cond delay="0"/>
+                            </p:stCondLst>
+                            <p:childTnLst>
+                              <p:par>
+                                <p:cTn id="45" presetID="10" presetClass="entr" presetSubtype="0" fill="hold" grpId="0" nodeType="clickEffect">
+                                  <p:stCondLst>
+                                    <p:cond delay="0"/>
+                                  </p:stCondLst>
+                                  <p:childTnLst>
+                                    <p:set>
+                                      <p:cBhvr>
+                                        <p:cTn id="46" dur="1" fill="hold">
+                                          <p:stCondLst>
+                                            <p:cond delay="0"/>
+                                          </p:stCondLst>
+                                        </p:cTn>
+                                        <p:tgtEl>
+                                          <p:spTgt spid="6">
+                                            <p:txEl>
+                                              <p:pRg st="3" end="3"/>
+                                            </p:txEl>
+                                          </p:spTgt>
+                                        </p:tgtEl>
+                                        <p:attrNameLst>
+                                          <p:attrName>style.visibility</p:attrName>
+                                        </p:attrNameLst>
+                                      </p:cBhvr>
+                                      <p:to>
+                                        <p:strVal val="visible"/>
+                                      </p:to>
+                                    </p:set>
+                                    <p:animEffect transition="in" filter="fade">
+                                      <p:cBhvr>
+                                        <p:cTn id="47" dur="500"/>
+                                        <p:tgtEl>
+                                          <p:spTgt spid="6">
+                                            <p:txEl>
+                                              <p:pRg st="3" end="3"/>
+                                            </p:txEl>
+                                          </p:spTgt>
+                                        </p:tgtEl>
+                                      </p:cBhvr>
+                                    </p:animEffect>
+                                  </p:childTnLst>
+                                </p:cTn>
+                              </p:par>
+                            </p:childTnLst>
+                          </p:cTn>
+                        </p:par>
+                      </p:childTnLst>
+                    </p:cTn>
+                  </p:par>
+                  <p:par>
+                    <p:cTn id="48" fill="hold">
+                      <p:stCondLst>
+                        <p:cond delay="indefinite"/>
+                      </p:stCondLst>
+                      <p:childTnLst>
+                        <p:par>
+                          <p:cTn id="49" fill="hold">
+                            <p:stCondLst>
+                              <p:cond delay="0"/>
+                            </p:stCondLst>
+                            <p:childTnLst>
+                              <p:par>
+                                <p:cTn id="50" presetID="9" presetClass="entr" presetSubtype="0" fill="hold" grpId="0" nodeType="clickEffect">
+                                  <p:stCondLst>
+                                    <p:cond delay="0"/>
+                                  </p:stCondLst>
+                                  <p:childTnLst>
+                                    <p:set>
+                                      <p:cBhvr>
+                                        <p:cTn id="51" dur="1" fill="hold">
+                                          <p:stCondLst>
+                                            <p:cond delay="0"/>
+                                          </p:stCondLst>
+                                        </p:cTn>
+                                        <p:tgtEl>
+                                          <p:spTgt spid="7">
+                                            <p:txEl>
                                               <p:pRg st="5" end="5"/>
+                                            </p:txEl>
+                                          </p:spTgt>
+                                        </p:tgtEl>
+                                        <p:attrNameLst>
+                                          <p:attrName>style.visibility</p:attrName>
+                                        </p:attrNameLst>
+                                      </p:cBhvr>
+                                      <p:to>
+                                        <p:strVal val="visible"/>
+                                      </p:to>
+                                    </p:set>
+                                    <p:animEffect transition="in" filter="dissolve">
+                                      <p:cBhvr>
+                                        <p:cTn id="52" dur="500"/>
+                                        <p:tgtEl>
+                                          <p:spTgt spid="7">
+                                            <p:txEl>
+                                              <p:pRg st="5" end="5"/>
+                                            </p:txEl>
+                                          </p:spTgt>
+                                        </p:tgtEl>
+                                      </p:cBhvr>
+                                    </p:animEffect>
+                                  </p:childTnLst>
+                                </p:cTn>
+                              </p:par>
+                            </p:childTnLst>
+                          </p:cTn>
+                        </p:par>
+                      </p:childTnLst>
+                    </p:cTn>
+                  </p:par>
+                  <p:par>
+                    <p:cTn id="53" fill="hold">
+                      <p:stCondLst>
+                        <p:cond delay="indefinite"/>
+                      </p:stCondLst>
+                      <p:childTnLst>
+                        <p:par>
+                          <p:cTn id="54" fill="hold">
+                            <p:stCondLst>
+                              <p:cond delay="0"/>
+                            </p:stCondLst>
+                            <p:childTnLst>
+                              <p:par>
+                                <p:cTn id="55" presetID="10" presetClass="entr" presetSubtype="0" fill="hold" grpId="0" nodeType="clickEffect">
+                                  <p:stCondLst>
+                                    <p:cond delay="0"/>
+                                  </p:stCondLst>
+                                  <p:childTnLst>
+                                    <p:set>
+                                      <p:cBhvr>
+                                        <p:cTn id="56" dur="1" fill="hold">
+                                          <p:stCondLst>
+                                            <p:cond delay="0"/>
+                                          </p:stCondLst>
+                                        </p:cTn>
+                                        <p:tgtEl>
+                                          <p:spTgt spid="6">
+                                            <p:txEl>
+                                              <p:pRg st="4" end="4"/>
+                                            </p:txEl>
+                                          </p:spTgt>
+                                        </p:tgtEl>
+                                        <p:attrNameLst>
+                                          <p:attrName>style.visibility</p:attrName>
+                                        </p:attrNameLst>
+                                      </p:cBhvr>
+                                      <p:to>
+                                        <p:strVal val="visible"/>
+                                      </p:to>
+                                    </p:set>
+                                    <p:animEffect transition="in" filter="fade">
+                                      <p:cBhvr>
+                                        <p:cTn id="57" dur="500"/>
+                                        <p:tgtEl>
+                                          <p:spTgt spid="6">
+                                            <p:txEl>
+                                              <p:pRg st="4" end="4"/>
                                             </p:txEl>
                                           </p:spTgt>
                                         </p:tgtEl>
@@ -15276,7 +15973,8 @@
       </p:par>
     </p:tnLst>
     <p:bldLst>
-      <p:bldP spid="7" grpId="0" build="p"/>
+      <p:bldP spid="7" grpId="0" uiExpand="1" build="p"/>
+      <p:bldP spid="6" grpId="0" uiExpand="1" build="p"/>
     </p:bldLst>
   </p:timing>
 </p:sld>

</xml_diff>